<commit_message>
Created powerpoint file for images.
</commit_message>
<xml_diff>
--- a/Frederick Python Meetup.pptx
+++ b/Frederick Python Meetup.pptx
@@ -8,6 +8,7 @@
     <p:sldId id="256" r:id="rId2"/>
     <p:sldId id="258" r:id="rId3"/>
     <p:sldId id="257" r:id="rId4"/>
+    <p:sldId id="259" r:id="rId5"/>
   </p:sldIdLst>
   <p:sldSz cx="12192000" cy="6858000"/>
   <p:notesSz cx="6858000" cy="9144000"/>
@@ -106,7 +107,288 @@
       </a:defRPr>
     </a:lvl9pPr>
   </p:defaultTextStyle>
+  <p:extLst>
+    <p:ext uri="{EFAFB233-063F-42B5-8137-9DF3F51BA10A}">
+      <p15:sldGuideLst xmlns:p15="http://schemas.microsoft.com/office/powerpoint/2012/main"/>
+    </p:ext>
+  </p:extLst>
 </p:presentation>
+</file>
+
+<file path=ppt/revisionInfo.xml><?xml version="1.0" encoding="utf-8"?>
+<p1510:revInfo xmlns:a="http://schemas.openxmlformats.org/drawingml/2006/main" xmlns:r="http://schemas.openxmlformats.org/officeDocument/2006/relationships" xmlns:p1510="http://schemas.microsoft.com/office/powerpoint/2015/10/main">
+  <p1510:revLst>
+    <p1510:client id="{B6D096D9-5D12-4270-91A6-2CABDC65E384}" v="14" dt="2024-08-11T23:17:46.079"/>
+  </p1510:revLst>
+</p1510:revInfo>
+</file>
+
+<file path=ppt/changesInfos/changesInfo1.xml><?xml version="1.0" encoding="utf-8"?>
+<pc:chgInfo xmlns:a="http://schemas.openxmlformats.org/drawingml/2006/main" xmlns:r="http://schemas.openxmlformats.org/officeDocument/2006/relationships" xmlns:ac="http://schemas.microsoft.com/office/drawing/2013/main/command" xmlns:pc="http://schemas.microsoft.com/office/powerpoint/2013/main/command">
+  <pc:docChgLst>
+    <pc:chgData name="Raju Rayavarapu" userId="d72698f5c7d4af69" providerId="LiveId" clId="{B6D096D9-5D12-4270-91A6-2CABDC65E384}"/>
+    <pc:docChg chg="undo custSel addSld modSld">
+      <pc:chgData name="Raju Rayavarapu" userId="d72698f5c7d4af69" providerId="LiveId" clId="{B6D096D9-5D12-4270-91A6-2CABDC65E384}" dt="2024-08-11T23:18:39.906" v="256" actId="20577"/>
+      <pc:docMkLst>
+        <pc:docMk/>
+      </pc:docMkLst>
+      <pc:sldChg chg="addSp delSp modSp mod">
+        <pc:chgData name="Raju Rayavarapu" userId="d72698f5c7d4af69" providerId="LiveId" clId="{B6D096D9-5D12-4270-91A6-2CABDC65E384}" dt="2024-08-11T23:18:39.906" v="256" actId="20577"/>
+        <pc:sldMkLst>
+          <pc:docMk/>
+          <pc:sldMk cId="3391586308" sldId="257"/>
+        </pc:sldMkLst>
+        <pc:spChg chg="mod">
+          <ac:chgData name="Raju Rayavarapu" userId="d72698f5c7d4af69" providerId="LiveId" clId="{B6D096D9-5D12-4270-91A6-2CABDC65E384}" dt="2024-08-11T23:18:39.906" v="256" actId="20577"/>
+          <ac:spMkLst>
+            <pc:docMk/>
+            <pc:sldMk cId="3391586308" sldId="257"/>
+            <ac:spMk id="2" creationId="{5D35052D-B0F3-32BF-DD7E-B90AB0D41A23}"/>
+          </ac:spMkLst>
+        </pc:spChg>
+        <pc:spChg chg="add mod">
+          <ac:chgData name="Raju Rayavarapu" userId="d72698f5c7d4af69" providerId="LiveId" clId="{B6D096D9-5D12-4270-91A6-2CABDC65E384}" dt="2024-08-11T23:10:01.211" v="50" actId="1076"/>
+          <ac:spMkLst>
+            <pc:docMk/>
+            <pc:sldMk cId="3391586308" sldId="257"/>
+            <ac:spMk id="12" creationId="{1D96362B-FF15-3E18-C7DD-C2B8BA9025C2}"/>
+          </ac:spMkLst>
+        </pc:spChg>
+        <pc:spChg chg="add mod">
+          <ac:chgData name="Raju Rayavarapu" userId="d72698f5c7d4af69" providerId="LiveId" clId="{B6D096D9-5D12-4270-91A6-2CABDC65E384}" dt="2024-08-11T23:10:01.211" v="50" actId="1076"/>
+          <ac:spMkLst>
+            <pc:docMk/>
+            <pc:sldMk cId="3391586308" sldId="257"/>
+            <ac:spMk id="14" creationId="{401260A8-F25D-C16A-1236-812491A942F1}"/>
+          </ac:spMkLst>
+        </pc:spChg>
+        <pc:spChg chg="add mod">
+          <ac:chgData name="Raju Rayavarapu" userId="d72698f5c7d4af69" providerId="LiveId" clId="{B6D096D9-5D12-4270-91A6-2CABDC65E384}" dt="2024-08-11T23:10:49.353" v="67" actId="14100"/>
+          <ac:spMkLst>
+            <pc:docMk/>
+            <pc:sldMk cId="3391586308" sldId="257"/>
+            <ac:spMk id="26" creationId="{4166D07B-E436-BD8D-3671-B21006602114}"/>
+          </ac:spMkLst>
+        </pc:spChg>
+        <pc:spChg chg="add mod">
+          <ac:chgData name="Raju Rayavarapu" userId="d72698f5c7d4af69" providerId="LiveId" clId="{B6D096D9-5D12-4270-91A6-2CABDC65E384}" dt="2024-08-11T23:10:40.492" v="64" actId="1076"/>
+          <ac:spMkLst>
+            <pc:docMk/>
+            <pc:sldMk cId="3391586308" sldId="257"/>
+            <ac:spMk id="27" creationId="{F1FA706A-98C7-B7F4-2A73-DC740F229D06}"/>
+          </ac:spMkLst>
+        </pc:spChg>
+        <pc:spChg chg="add mod">
+          <ac:chgData name="Raju Rayavarapu" userId="d72698f5c7d4af69" providerId="LiveId" clId="{B6D096D9-5D12-4270-91A6-2CABDC65E384}" dt="2024-08-11T23:12:18.947" v="70" actId="1076"/>
+          <ac:spMkLst>
+            <pc:docMk/>
+            <pc:sldMk cId="3391586308" sldId="257"/>
+            <ac:spMk id="30" creationId="{A4B900D9-D74B-11E5-4C62-62544E30A819}"/>
+          </ac:spMkLst>
+        </pc:spChg>
+        <pc:spChg chg="add mod">
+          <ac:chgData name="Raju Rayavarapu" userId="d72698f5c7d4af69" providerId="LiveId" clId="{B6D096D9-5D12-4270-91A6-2CABDC65E384}" dt="2024-08-11T23:12:36.466" v="110" actId="1076"/>
+          <ac:spMkLst>
+            <pc:docMk/>
+            <pc:sldMk cId="3391586308" sldId="257"/>
+            <ac:spMk id="31" creationId="{B3288B1E-F6E5-1120-C76D-3E16011B2B07}"/>
+          </ac:spMkLst>
+        </pc:spChg>
+        <pc:spChg chg="add mod">
+          <ac:chgData name="Raju Rayavarapu" userId="d72698f5c7d4af69" providerId="LiveId" clId="{B6D096D9-5D12-4270-91A6-2CABDC65E384}" dt="2024-08-11T23:12:18.947" v="70" actId="1076"/>
+          <ac:spMkLst>
+            <pc:docMk/>
+            <pc:sldMk cId="3391586308" sldId="257"/>
+            <ac:spMk id="34" creationId="{39F66580-BC56-3A02-80AE-8B1AE2C40CAE}"/>
+          </ac:spMkLst>
+        </pc:spChg>
+        <pc:spChg chg="add mod">
+          <ac:chgData name="Raju Rayavarapu" userId="d72698f5c7d4af69" providerId="LiveId" clId="{B6D096D9-5D12-4270-91A6-2CABDC65E384}" dt="2024-08-11T23:12:18.947" v="70" actId="1076"/>
+          <ac:spMkLst>
+            <pc:docMk/>
+            <pc:sldMk cId="3391586308" sldId="257"/>
+            <ac:spMk id="35" creationId="{2CBAD7E7-F6DA-1B90-9564-5AFC6D3F7CE4}"/>
+          </ac:spMkLst>
+        </pc:spChg>
+        <pc:spChg chg="add mod">
+          <ac:chgData name="Raju Rayavarapu" userId="d72698f5c7d4af69" providerId="LiveId" clId="{B6D096D9-5D12-4270-91A6-2CABDC65E384}" dt="2024-08-11T23:12:52.931" v="112" actId="1076"/>
+          <ac:spMkLst>
+            <pc:docMk/>
+            <pc:sldMk cId="3391586308" sldId="257"/>
+            <ac:spMk id="36" creationId="{60778220-247C-7082-FEE0-6291FD380D55}"/>
+          </ac:spMkLst>
+        </pc:spChg>
+        <pc:spChg chg="add mod">
+          <ac:chgData name="Raju Rayavarapu" userId="d72698f5c7d4af69" providerId="LiveId" clId="{B6D096D9-5D12-4270-91A6-2CABDC65E384}" dt="2024-08-11T23:12:56.204" v="118" actId="20577"/>
+          <ac:spMkLst>
+            <pc:docMk/>
+            <pc:sldMk cId="3391586308" sldId="257"/>
+            <ac:spMk id="37" creationId="{025CB498-CB6A-4391-1DF5-E7133275309A}"/>
+          </ac:spMkLst>
+        </pc:spChg>
+        <pc:spChg chg="add mod">
+          <ac:chgData name="Raju Rayavarapu" userId="d72698f5c7d4af69" providerId="LiveId" clId="{B6D096D9-5D12-4270-91A6-2CABDC65E384}" dt="2024-08-11T23:12:52.931" v="112" actId="1076"/>
+          <ac:spMkLst>
+            <pc:docMk/>
+            <pc:sldMk cId="3391586308" sldId="257"/>
+            <ac:spMk id="40" creationId="{C6ECBE1C-DCE3-83C1-3DC4-4229DDA5F219}"/>
+          </ac:spMkLst>
+        </pc:spChg>
+        <pc:spChg chg="add mod">
+          <ac:chgData name="Raju Rayavarapu" userId="d72698f5c7d4af69" providerId="LiveId" clId="{B6D096D9-5D12-4270-91A6-2CABDC65E384}" dt="2024-08-11T23:12:52.931" v="112" actId="1076"/>
+          <ac:spMkLst>
+            <pc:docMk/>
+            <pc:sldMk cId="3391586308" sldId="257"/>
+            <ac:spMk id="41" creationId="{0C599B12-11DE-79FF-D92E-81442506B23C}"/>
+          </ac:spMkLst>
+        </pc:spChg>
+        <pc:spChg chg="add mod">
+          <ac:chgData name="Raju Rayavarapu" userId="d72698f5c7d4af69" providerId="LiveId" clId="{B6D096D9-5D12-4270-91A6-2CABDC65E384}" dt="2024-08-11T23:14:33.901" v="170" actId="207"/>
+          <ac:spMkLst>
+            <pc:docMk/>
+            <pc:sldMk cId="3391586308" sldId="257"/>
+            <ac:spMk id="42" creationId="{DCD0EDC6-0B25-70AC-AB7F-F5B6110BB98D}"/>
+          </ac:spMkLst>
+        </pc:spChg>
+        <pc:spChg chg="add mod">
+          <ac:chgData name="Raju Rayavarapu" userId="d72698f5c7d4af69" providerId="LiveId" clId="{B6D096D9-5D12-4270-91A6-2CABDC65E384}" dt="2024-08-11T23:14:25.688" v="169" actId="120"/>
+          <ac:spMkLst>
+            <pc:docMk/>
+            <pc:sldMk cId="3391586308" sldId="257"/>
+            <ac:spMk id="43" creationId="{DAFFB3EA-26A2-6C27-E8E4-DC2F55537F88}"/>
+          </ac:spMkLst>
+        </pc:spChg>
+        <pc:spChg chg="add mod">
+          <ac:chgData name="Raju Rayavarapu" userId="d72698f5c7d4af69" providerId="LiveId" clId="{B6D096D9-5D12-4270-91A6-2CABDC65E384}" dt="2024-08-11T23:14:54.719" v="172" actId="1076"/>
+          <ac:spMkLst>
+            <pc:docMk/>
+            <pc:sldMk cId="3391586308" sldId="257"/>
+            <ac:spMk id="44" creationId="{DDC8B154-82D2-2F36-3B51-CFBE93484E18}"/>
+          </ac:spMkLst>
+        </pc:spChg>
+        <pc:spChg chg="add mod">
+          <ac:chgData name="Raju Rayavarapu" userId="d72698f5c7d4af69" providerId="LiveId" clId="{B6D096D9-5D12-4270-91A6-2CABDC65E384}" dt="2024-08-11T23:15:42.318" v="181" actId="1076"/>
+          <ac:spMkLst>
+            <pc:docMk/>
+            <pc:sldMk cId="3391586308" sldId="257"/>
+            <ac:spMk id="45" creationId="{4F7D2A2D-58B7-7655-A85A-DA5AE55673CF}"/>
+          </ac:spMkLst>
+        </pc:spChg>
+        <pc:spChg chg="add del mod">
+          <ac:chgData name="Raju Rayavarapu" userId="d72698f5c7d4af69" providerId="LiveId" clId="{B6D096D9-5D12-4270-91A6-2CABDC65E384}" dt="2024-08-11T23:17:05.967" v="243" actId="478"/>
+          <ac:spMkLst>
+            <pc:docMk/>
+            <pc:sldMk cId="3391586308" sldId="257"/>
+            <ac:spMk id="46" creationId="{D03C272A-F72B-40BD-DEC0-42E6A4324560}"/>
+          </ac:spMkLst>
+        </pc:spChg>
+        <pc:spChg chg="add del mod">
+          <ac:chgData name="Raju Rayavarapu" userId="d72698f5c7d4af69" providerId="LiveId" clId="{B6D096D9-5D12-4270-91A6-2CABDC65E384}" dt="2024-08-11T23:17:08.626" v="244" actId="478"/>
+          <ac:spMkLst>
+            <pc:docMk/>
+            <pc:sldMk cId="3391586308" sldId="257"/>
+            <ac:spMk id="47" creationId="{0DEFA1CF-1703-E24C-93FE-55988E05D5E2}"/>
+          </ac:spMkLst>
+        </pc:spChg>
+        <pc:spChg chg="add mod">
+          <ac:chgData name="Raju Rayavarapu" userId="d72698f5c7d4af69" providerId="LiveId" clId="{B6D096D9-5D12-4270-91A6-2CABDC65E384}" dt="2024-08-11T23:15:06.547" v="176" actId="1076"/>
+          <ac:spMkLst>
+            <pc:docMk/>
+            <pc:sldMk cId="3391586308" sldId="257"/>
+            <ac:spMk id="48" creationId="{B0A6761E-2220-75C2-9F2A-CA1F6F315507}"/>
+          </ac:spMkLst>
+        </pc:spChg>
+        <pc:spChg chg="add mod">
+          <ac:chgData name="Raju Rayavarapu" userId="d72698f5c7d4af69" providerId="LiveId" clId="{B6D096D9-5D12-4270-91A6-2CABDC65E384}" dt="2024-08-11T23:15:17.692" v="178" actId="1076"/>
+          <ac:spMkLst>
+            <pc:docMk/>
+            <pc:sldMk cId="3391586308" sldId="257"/>
+            <ac:spMk id="49" creationId="{29019D50-DC22-9D05-175A-713B58D72DB4}"/>
+          </ac:spMkLst>
+        </pc:spChg>
+        <pc:spChg chg="add mod">
+          <ac:chgData name="Raju Rayavarapu" userId="d72698f5c7d4af69" providerId="LiveId" clId="{B6D096D9-5D12-4270-91A6-2CABDC65E384}" dt="2024-08-11T23:17:39.249" v="250" actId="14100"/>
+          <ac:spMkLst>
+            <pc:docMk/>
+            <pc:sldMk cId="3391586308" sldId="257"/>
+            <ac:spMk id="50" creationId="{FD22E7B1-6ABC-1AD7-FAC2-10A229A55D58}"/>
+          </ac:spMkLst>
+        </pc:spChg>
+        <pc:spChg chg="add mod">
+          <ac:chgData name="Raju Rayavarapu" userId="d72698f5c7d4af69" providerId="LiveId" clId="{B6D096D9-5D12-4270-91A6-2CABDC65E384}" dt="2024-08-11T23:17:40.641" v="251" actId="1076"/>
+          <ac:spMkLst>
+            <pc:docMk/>
+            <pc:sldMk cId="3391586308" sldId="257"/>
+            <ac:spMk id="51" creationId="{6AFA9E76-8C98-C192-5844-781754A7A139}"/>
+          </ac:spMkLst>
+        </pc:spChg>
+        <pc:cxnChg chg="add mod">
+          <ac:chgData name="Raju Rayavarapu" userId="d72698f5c7d4af69" providerId="LiveId" clId="{B6D096D9-5D12-4270-91A6-2CABDC65E384}" dt="2024-08-11T23:07:39.661" v="3" actId="14100"/>
+          <ac:cxnSpMkLst>
+            <pc:docMk/>
+            <pc:sldMk cId="3391586308" sldId="257"/>
+            <ac:cxnSpMk id="5" creationId="{C2D3E783-AE59-DB74-6D7F-A205DE1950F9}"/>
+          </ac:cxnSpMkLst>
+        </pc:cxnChg>
+        <pc:cxnChg chg="add mod">
+          <ac:chgData name="Raju Rayavarapu" userId="d72698f5c7d4af69" providerId="LiveId" clId="{B6D096D9-5D12-4270-91A6-2CABDC65E384}" dt="2024-08-11T23:10:33.540" v="62" actId="14100"/>
+          <ac:cxnSpMkLst>
+            <pc:docMk/>
+            <pc:sldMk cId="3391586308" sldId="257"/>
+            <ac:cxnSpMk id="17" creationId="{B7793141-5B39-608A-873F-42DD23626518}"/>
+          </ac:cxnSpMkLst>
+        </pc:cxnChg>
+        <pc:cxnChg chg="add mod">
+          <ac:chgData name="Raju Rayavarapu" userId="d72698f5c7d4af69" providerId="LiveId" clId="{B6D096D9-5D12-4270-91A6-2CABDC65E384}" dt="2024-08-11T23:10:52.298" v="68" actId="14100"/>
+          <ac:cxnSpMkLst>
+            <pc:docMk/>
+            <pc:sldMk cId="3391586308" sldId="257"/>
+            <ac:cxnSpMk id="21" creationId="{59FA3ECE-116C-24EE-3D00-9F271091C97A}"/>
+          </ac:cxnSpMkLst>
+        </pc:cxnChg>
+        <pc:cxnChg chg="add mod">
+          <ac:chgData name="Raju Rayavarapu" userId="d72698f5c7d4af69" providerId="LiveId" clId="{B6D096D9-5D12-4270-91A6-2CABDC65E384}" dt="2024-08-11T23:12:18.947" v="70" actId="1076"/>
+          <ac:cxnSpMkLst>
+            <pc:docMk/>
+            <pc:sldMk cId="3391586308" sldId="257"/>
+            <ac:cxnSpMk id="32" creationId="{140887D8-4944-6CFF-67D9-169B03257B49}"/>
+          </ac:cxnSpMkLst>
+        </pc:cxnChg>
+        <pc:cxnChg chg="add mod">
+          <ac:chgData name="Raju Rayavarapu" userId="d72698f5c7d4af69" providerId="LiveId" clId="{B6D096D9-5D12-4270-91A6-2CABDC65E384}" dt="2024-08-11T23:12:18.947" v="70" actId="1076"/>
+          <ac:cxnSpMkLst>
+            <pc:docMk/>
+            <pc:sldMk cId="3391586308" sldId="257"/>
+            <ac:cxnSpMk id="33" creationId="{F8749B16-B61B-4E64-C388-C6745372191B}"/>
+          </ac:cxnSpMkLst>
+        </pc:cxnChg>
+        <pc:cxnChg chg="add mod">
+          <ac:chgData name="Raju Rayavarapu" userId="d72698f5c7d4af69" providerId="LiveId" clId="{B6D096D9-5D12-4270-91A6-2CABDC65E384}" dt="2024-08-11T23:12:52.931" v="112" actId="1076"/>
+          <ac:cxnSpMkLst>
+            <pc:docMk/>
+            <pc:sldMk cId="3391586308" sldId="257"/>
+            <ac:cxnSpMk id="38" creationId="{4230F2A4-E281-852F-67B2-81656F278150}"/>
+          </ac:cxnSpMkLst>
+        </pc:cxnChg>
+        <pc:cxnChg chg="add mod">
+          <ac:chgData name="Raju Rayavarapu" userId="d72698f5c7d4af69" providerId="LiveId" clId="{B6D096D9-5D12-4270-91A6-2CABDC65E384}" dt="2024-08-11T23:12:52.931" v="112" actId="1076"/>
+          <ac:cxnSpMkLst>
+            <pc:docMk/>
+            <pc:sldMk cId="3391586308" sldId="257"/>
+            <ac:cxnSpMk id="39" creationId="{1DF482AE-26D1-FF9A-11E0-60F636EF6DC1}"/>
+          </ac:cxnSpMkLst>
+        </pc:cxnChg>
+      </pc:sldChg>
+      <pc:sldChg chg="add">
+        <pc:chgData name="Raju Rayavarapu" userId="d72698f5c7d4af69" providerId="LiveId" clId="{B6D096D9-5D12-4270-91A6-2CABDC65E384}" dt="2024-08-11T23:17:46.071" v="252"/>
+        <pc:sldMkLst>
+          <pc:docMk/>
+          <pc:sldMk cId="2551086154" sldId="259"/>
+        </pc:sldMkLst>
+      </pc:sldChg>
+    </pc:docChg>
+  </pc:docChgLst>
+</pc:chgInfo>
 </file>
 
 <file path=ppt/slideLayouts/slideLayout1.xml><?xml version="1.0" encoding="utf-8"?>
@@ -3515,7 +3797,7 @@
           <a:p>
             <a:r>
               <a:rPr lang="en-US" dirty="0"/>
-              <a:t>The PDF Data Flow</a:t>
+              <a:t>The PDF Page Flow</a:t>
             </a:r>
           </a:p>
         </p:txBody>
@@ -4051,10 +4333,2931 @@
           </p:style>
         </p:cxnSp>
       </p:grpSp>
+      <p:cxnSp>
+        <p:nvCxnSpPr>
+          <p:cNvPr id="5" name="Straight Arrow Connector 4">
+            <a:extLst>
+              <a:ext uri="{FF2B5EF4-FFF2-40B4-BE49-F238E27FC236}">
+                <a16:creationId xmlns:a16="http://schemas.microsoft.com/office/drawing/2014/main" id="{C2D3E783-AE59-DB74-6D7F-A205DE1950F9}"/>
+              </a:ext>
+            </a:extLst>
+          </p:cNvPr>
+          <p:cNvCxnSpPr>
+            <a:cxnSpLocks/>
+          </p:cNvCxnSpPr>
+          <p:nvPr/>
+        </p:nvCxnSpPr>
+        <p:spPr>
+          <a:xfrm>
+            <a:off x="1601734" y="2452664"/>
+            <a:ext cx="1031002" cy="0"/>
+          </a:xfrm>
+          <a:prstGeom prst="straightConnector1">
+            <a:avLst/>
+          </a:prstGeom>
+          <a:ln>
+            <a:tailEnd type="triangle"/>
+          </a:ln>
+        </p:spPr>
+        <p:style>
+          <a:lnRef idx="2">
+            <a:schemeClr val="accent1"/>
+          </a:lnRef>
+          <a:fillRef idx="0">
+            <a:schemeClr val="accent1"/>
+          </a:fillRef>
+          <a:effectRef idx="1">
+            <a:schemeClr val="accent1"/>
+          </a:effectRef>
+          <a:fontRef idx="minor">
+            <a:schemeClr val="tx1"/>
+          </a:fontRef>
+        </p:style>
+      </p:cxnSp>
+      <p:sp>
+        <p:nvSpPr>
+          <p:cNvPr id="12" name="Rectangle 11">
+            <a:extLst>
+              <a:ext uri="{FF2B5EF4-FFF2-40B4-BE49-F238E27FC236}">
+                <a16:creationId xmlns:a16="http://schemas.microsoft.com/office/drawing/2014/main" id="{1D96362B-FF15-3E18-C7DD-C2B8BA9025C2}"/>
+              </a:ext>
+            </a:extLst>
+          </p:cNvPr>
+          <p:cNvSpPr>
+            <a:spLocks noChangeAspect="1"/>
+          </p:cNvSpPr>
+          <p:nvPr/>
+        </p:nvSpPr>
+        <p:spPr>
+          <a:xfrm rot="18944431">
+            <a:off x="2874737" y="1868254"/>
+            <a:ext cx="1168817" cy="1168817"/>
+          </a:xfrm>
+          <a:prstGeom prst="rect">
+            <a:avLst/>
+          </a:prstGeom>
+          <a:solidFill>
+            <a:schemeClr val="bg1"/>
+          </a:solidFill>
+        </p:spPr>
+        <p:style>
+          <a:lnRef idx="2">
+            <a:schemeClr val="accent1">
+              <a:shade val="15000"/>
+            </a:schemeClr>
+          </a:lnRef>
+          <a:fillRef idx="1">
+            <a:schemeClr val="accent1"/>
+          </a:fillRef>
+          <a:effectRef idx="0">
+            <a:schemeClr val="accent1"/>
+          </a:effectRef>
+          <a:fontRef idx="minor">
+            <a:schemeClr val="lt1"/>
+          </a:fontRef>
+        </p:style>
+        <p:txBody>
+          <a:bodyPr rtlCol="0" anchor="ctr"/>
+          <a:lstStyle/>
+          <a:p>
+            <a:pPr algn="ctr"/>
+            <a:endParaRPr lang="en-US"/>
+          </a:p>
+        </p:txBody>
+      </p:sp>
+      <p:sp>
+        <p:nvSpPr>
+          <p:cNvPr id="14" name="TextBox 13">
+            <a:extLst>
+              <a:ext uri="{FF2B5EF4-FFF2-40B4-BE49-F238E27FC236}">
+                <a16:creationId xmlns:a16="http://schemas.microsoft.com/office/drawing/2014/main" id="{401260A8-F25D-C16A-1236-812491A942F1}"/>
+              </a:ext>
+            </a:extLst>
+          </p:cNvPr>
+          <p:cNvSpPr txBox="1"/>
+          <p:nvPr/>
+        </p:nvSpPr>
+        <p:spPr>
+          <a:xfrm>
+            <a:off x="2759989" y="2173452"/>
+            <a:ext cx="1460024" cy="646331"/>
+          </a:xfrm>
+          <a:prstGeom prst="rect">
+            <a:avLst/>
+          </a:prstGeom>
+          <a:noFill/>
+        </p:spPr>
+        <p:txBody>
+          <a:bodyPr wrap="square" rtlCol="0">
+            <a:spAutoFit/>
+          </a:bodyPr>
+          <a:lstStyle/>
+          <a:p>
+            <a:pPr algn="ctr"/>
+            <a:r>
+              <a:rPr lang="en-US" dirty="0"/>
+              <a:t>Is it machine readable? </a:t>
+            </a:r>
+          </a:p>
+        </p:txBody>
+      </p:sp>
+      <p:cxnSp>
+        <p:nvCxnSpPr>
+          <p:cNvPr id="17" name="Straight Arrow Connector 16">
+            <a:extLst>
+              <a:ext uri="{FF2B5EF4-FFF2-40B4-BE49-F238E27FC236}">
+                <a16:creationId xmlns:a16="http://schemas.microsoft.com/office/drawing/2014/main" id="{B7793141-5B39-608A-873F-42DD23626518}"/>
+              </a:ext>
+            </a:extLst>
+          </p:cNvPr>
+          <p:cNvCxnSpPr>
+            <a:cxnSpLocks/>
+          </p:cNvCxnSpPr>
+          <p:nvPr/>
+        </p:nvCxnSpPr>
+        <p:spPr>
+          <a:xfrm>
+            <a:off x="3440290" y="3279072"/>
+            <a:ext cx="0" cy="728572"/>
+          </a:xfrm>
+          <a:prstGeom prst="straightConnector1">
+            <a:avLst/>
+          </a:prstGeom>
+          <a:ln>
+            <a:tailEnd type="triangle"/>
+          </a:ln>
+        </p:spPr>
+        <p:style>
+          <a:lnRef idx="2">
+            <a:schemeClr val="accent1"/>
+          </a:lnRef>
+          <a:fillRef idx="0">
+            <a:schemeClr val="accent1"/>
+          </a:fillRef>
+          <a:effectRef idx="1">
+            <a:schemeClr val="accent1"/>
+          </a:effectRef>
+          <a:fontRef idx="minor">
+            <a:schemeClr val="tx1"/>
+          </a:fontRef>
+        </p:style>
+      </p:cxnSp>
+      <p:cxnSp>
+        <p:nvCxnSpPr>
+          <p:cNvPr id="21" name="Straight Arrow Connector 20">
+            <a:extLst>
+              <a:ext uri="{FF2B5EF4-FFF2-40B4-BE49-F238E27FC236}">
+                <a16:creationId xmlns:a16="http://schemas.microsoft.com/office/drawing/2014/main" id="{59FA3ECE-116C-24EE-3D00-9F271091C97A}"/>
+              </a:ext>
+            </a:extLst>
+          </p:cNvPr>
+          <p:cNvCxnSpPr>
+            <a:cxnSpLocks/>
+          </p:cNvCxnSpPr>
+          <p:nvPr/>
+        </p:nvCxnSpPr>
+        <p:spPr>
+          <a:xfrm>
+            <a:off x="4285555" y="2452663"/>
+            <a:ext cx="765076" cy="1"/>
+          </a:xfrm>
+          <a:prstGeom prst="straightConnector1">
+            <a:avLst/>
+          </a:prstGeom>
+          <a:ln>
+            <a:tailEnd type="triangle"/>
+          </a:ln>
+        </p:spPr>
+        <p:style>
+          <a:lnRef idx="2">
+            <a:schemeClr val="accent1"/>
+          </a:lnRef>
+          <a:fillRef idx="0">
+            <a:schemeClr val="accent1"/>
+          </a:fillRef>
+          <a:effectRef idx="1">
+            <a:schemeClr val="accent1"/>
+          </a:effectRef>
+          <a:fontRef idx="minor">
+            <a:schemeClr val="tx1"/>
+          </a:fontRef>
+        </p:style>
+      </p:cxnSp>
+      <p:sp>
+        <p:nvSpPr>
+          <p:cNvPr id="26" name="TextBox 25">
+            <a:extLst>
+              <a:ext uri="{FF2B5EF4-FFF2-40B4-BE49-F238E27FC236}">
+                <a16:creationId xmlns:a16="http://schemas.microsoft.com/office/drawing/2014/main" id="{4166D07B-E436-BD8D-3671-B21006602114}"/>
+              </a:ext>
+            </a:extLst>
+          </p:cNvPr>
+          <p:cNvSpPr txBox="1"/>
+          <p:nvPr/>
+        </p:nvSpPr>
+        <p:spPr>
+          <a:xfrm>
+            <a:off x="4220013" y="2148586"/>
+            <a:ext cx="780612" cy="369332"/>
+          </a:xfrm>
+          <a:prstGeom prst="rect">
+            <a:avLst/>
+          </a:prstGeom>
+          <a:noFill/>
+        </p:spPr>
+        <p:txBody>
+          <a:bodyPr wrap="square" rtlCol="0">
+            <a:spAutoFit/>
+          </a:bodyPr>
+          <a:lstStyle/>
+          <a:p>
+            <a:pPr algn="ctr"/>
+            <a:r>
+              <a:rPr lang="en-US" dirty="0"/>
+              <a:t>Yes</a:t>
+            </a:r>
+          </a:p>
+        </p:txBody>
+      </p:sp>
+      <p:sp>
+        <p:nvSpPr>
+          <p:cNvPr id="27" name="TextBox 26">
+            <a:extLst>
+              <a:ext uri="{FF2B5EF4-FFF2-40B4-BE49-F238E27FC236}">
+                <a16:creationId xmlns:a16="http://schemas.microsoft.com/office/drawing/2014/main" id="{F1FA706A-98C7-B7F4-2A73-DC740F229D06}"/>
+              </a:ext>
+            </a:extLst>
+          </p:cNvPr>
+          <p:cNvSpPr txBox="1"/>
+          <p:nvPr/>
+        </p:nvSpPr>
+        <p:spPr>
+          <a:xfrm rot="5400000">
+            <a:off x="3169128" y="3436105"/>
+            <a:ext cx="834663" cy="369332"/>
+          </a:xfrm>
+          <a:prstGeom prst="rect">
+            <a:avLst/>
+          </a:prstGeom>
+          <a:noFill/>
+        </p:spPr>
+        <p:txBody>
+          <a:bodyPr wrap="square" rtlCol="0">
+            <a:spAutoFit/>
+          </a:bodyPr>
+          <a:lstStyle/>
+          <a:p>
+            <a:pPr algn="ctr"/>
+            <a:r>
+              <a:rPr lang="en-US" dirty="0"/>
+              <a:t>No</a:t>
+            </a:r>
+          </a:p>
+        </p:txBody>
+      </p:sp>
+      <p:sp>
+        <p:nvSpPr>
+          <p:cNvPr id="30" name="Rectangle 29">
+            <a:extLst>
+              <a:ext uri="{FF2B5EF4-FFF2-40B4-BE49-F238E27FC236}">
+                <a16:creationId xmlns:a16="http://schemas.microsoft.com/office/drawing/2014/main" id="{A4B900D9-D74B-11E5-4C62-62544E30A819}"/>
+              </a:ext>
+            </a:extLst>
+          </p:cNvPr>
+          <p:cNvSpPr>
+            <a:spLocks noChangeAspect="1"/>
+          </p:cNvSpPr>
+          <p:nvPr/>
+        </p:nvSpPr>
+        <p:spPr>
+          <a:xfrm rot="18944431">
+            <a:off x="5308168" y="1868254"/>
+            <a:ext cx="1168817" cy="1168817"/>
+          </a:xfrm>
+          <a:prstGeom prst="rect">
+            <a:avLst/>
+          </a:prstGeom>
+          <a:solidFill>
+            <a:schemeClr val="bg1"/>
+          </a:solidFill>
+        </p:spPr>
+        <p:style>
+          <a:lnRef idx="2">
+            <a:schemeClr val="accent1">
+              <a:shade val="15000"/>
+            </a:schemeClr>
+          </a:lnRef>
+          <a:fillRef idx="1">
+            <a:schemeClr val="accent1"/>
+          </a:fillRef>
+          <a:effectRef idx="0">
+            <a:schemeClr val="accent1"/>
+          </a:effectRef>
+          <a:fontRef idx="minor">
+            <a:schemeClr val="lt1"/>
+          </a:fontRef>
+        </p:style>
+        <p:txBody>
+          <a:bodyPr rtlCol="0" anchor="ctr"/>
+          <a:lstStyle/>
+          <a:p>
+            <a:pPr algn="ctr"/>
+            <a:endParaRPr lang="en-US"/>
+          </a:p>
+        </p:txBody>
+      </p:sp>
+      <p:sp>
+        <p:nvSpPr>
+          <p:cNvPr id="31" name="TextBox 30">
+            <a:extLst>
+              <a:ext uri="{FF2B5EF4-FFF2-40B4-BE49-F238E27FC236}">
+                <a16:creationId xmlns:a16="http://schemas.microsoft.com/office/drawing/2014/main" id="{B3288B1E-F6E5-1120-C76D-3E16011B2B07}"/>
+              </a:ext>
+            </a:extLst>
+          </p:cNvPr>
+          <p:cNvSpPr txBox="1"/>
+          <p:nvPr/>
+        </p:nvSpPr>
+        <p:spPr>
+          <a:xfrm>
+            <a:off x="5143414" y="2028486"/>
+            <a:ext cx="1460024" cy="923330"/>
+          </a:xfrm>
+          <a:prstGeom prst="rect">
+            <a:avLst/>
+          </a:prstGeom>
+          <a:noFill/>
+        </p:spPr>
+        <p:txBody>
+          <a:bodyPr wrap="square" rtlCol="0">
+            <a:spAutoFit/>
+          </a:bodyPr>
+          <a:lstStyle/>
+          <a:p>
+            <a:pPr algn="ctr"/>
+            <a:r>
+              <a:rPr lang="en-US" dirty="0"/>
+              <a:t>Does it contain tables?</a:t>
+            </a:r>
+          </a:p>
+        </p:txBody>
+      </p:sp>
+      <p:cxnSp>
+        <p:nvCxnSpPr>
+          <p:cNvPr id="32" name="Straight Arrow Connector 31">
+            <a:extLst>
+              <a:ext uri="{FF2B5EF4-FFF2-40B4-BE49-F238E27FC236}">
+                <a16:creationId xmlns:a16="http://schemas.microsoft.com/office/drawing/2014/main" id="{140887D8-4944-6CFF-67D9-169B03257B49}"/>
+              </a:ext>
+            </a:extLst>
+          </p:cNvPr>
+          <p:cNvCxnSpPr>
+            <a:cxnSpLocks/>
+          </p:cNvCxnSpPr>
+          <p:nvPr/>
+        </p:nvCxnSpPr>
+        <p:spPr>
+          <a:xfrm>
+            <a:off x="5873721" y="3279072"/>
+            <a:ext cx="0" cy="728572"/>
+          </a:xfrm>
+          <a:prstGeom prst="straightConnector1">
+            <a:avLst/>
+          </a:prstGeom>
+          <a:ln>
+            <a:tailEnd type="triangle"/>
+          </a:ln>
+        </p:spPr>
+        <p:style>
+          <a:lnRef idx="2">
+            <a:schemeClr val="accent1"/>
+          </a:lnRef>
+          <a:fillRef idx="0">
+            <a:schemeClr val="accent1"/>
+          </a:fillRef>
+          <a:effectRef idx="1">
+            <a:schemeClr val="accent1"/>
+          </a:effectRef>
+          <a:fontRef idx="minor">
+            <a:schemeClr val="tx1"/>
+          </a:fontRef>
+        </p:style>
+      </p:cxnSp>
+      <p:cxnSp>
+        <p:nvCxnSpPr>
+          <p:cNvPr id="33" name="Straight Arrow Connector 32">
+            <a:extLst>
+              <a:ext uri="{FF2B5EF4-FFF2-40B4-BE49-F238E27FC236}">
+                <a16:creationId xmlns:a16="http://schemas.microsoft.com/office/drawing/2014/main" id="{F8749B16-B61B-4E64-C388-C6745372191B}"/>
+              </a:ext>
+            </a:extLst>
+          </p:cNvPr>
+          <p:cNvCxnSpPr>
+            <a:cxnSpLocks/>
+          </p:cNvCxnSpPr>
+          <p:nvPr/>
+        </p:nvCxnSpPr>
+        <p:spPr>
+          <a:xfrm>
+            <a:off x="6718986" y="2452663"/>
+            <a:ext cx="765076" cy="1"/>
+          </a:xfrm>
+          <a:prstGeom prst="straightConnector1">
+            <a:avLst/>
+          </a:prstGeom>
+          <a:ln>
+            <a:tailEnd type="triangle"/>
+          </a:ln>
+        </p:spPr>
+        <p:style>
+          <a:lnRef idx="2">
+            <a:schemeClr val="accent1"/>
+          </a:lnRef>
+          <a:fillRef idx="0">
+            <a:schemeClr val="accent1"/>
+          </a:fillRef>
+          <a:effectRef idx="1">
+            <a:schemeClr val="accent1"/>
+          </a:effectRef>
+          <a:fontRef idx="minor">
+            <a:schemeClr val="tx1"/>
+          </a:fontRef>
+        </p:style>
+      </p:cxnSp>
+      <p:sp>
+        <p:nvSpPr>
+          <p:cNvPr id="34" name="TextBox 33">
+            <a:extLst>
+              <a:ext uri="{FF2B5EF4-FFF2-40B4-BE49-F238E27FC236}">
+                <a16:creationId xmlns:a16="http://schemas.microsoft.com/office/drawing/2014/main" id="{39F66580-BC56-3A02-80AE-8B1AE2C40CAE}"/>
+              </a:ext>
+            </a:extLst>
+          </p:cNvPr>
+          <p:cNvSpPr txBox="1"/>
+          <p:nvPr/>
+        </p:nvSpPr>
+        <p:spPr>
+          <a:xfrm>
+            <a:off x="6653444" y="2148586"/>
+            <a:ext cx="780612" cy="369332"/>
+          </a:xfrm>
+          <a:prstGeom prst="rect">
+            <a:avLst/>
+          </a:prstGeom>
+          <a:noFill/>
+        </p:spPr>
+        <p:txBody>
+          <a:bodyPr wrap="square" rtlCol="0">
+            <a:spAutoFit/>
+          </a:bodyPr>
+          <a:lstStyle/>
+          <a:p>
+            <a:pPr algn="ctr"/>
+            <a:r>
+              <a:rPr lang="en-US" dirty="0"/>
+              <a:t>Yes</a:t>
+            </a:r>
+          </a:p>
+        </p:txBody>
+      </p:sp>
+      <p:sp>
+        <p:nvSpPr>
+          <p:cNvPr id="35" name="TextBox 34">
+            <a:extLst>
+              <a:ext uri="{FF2B5EF4-FFF2-40B4-BE49-F238E27FC236}">
+                <a16:creationId xmlns:a16="http://schemas.microsoft.com/office/drawing/2014/main" id="{2CBAD7E7-F6DA-1B90-9564-5AFC6D3F7CE4}"/>
+              </a:ext>
+            </a:extLst>
+          </p:cNvPr>
+          <p:cNvSpPr txBox="1"/>
+          <p:nvPr/>
+        </p:nvSpPr>
+        <p:spPr>
+          <a:xfrm rot="5400000">
+            <a:off x="5602559" y="3436105"/>
+            <a:ext cx="834663" cy="369332"/>
+          </a:xfrm>
+          <a:prstGeom prst="rect">
+            <a:avLst/>
+          </a:prstGeom>
+          <a:noFill/>
+        </p:spPr>
+        <p:txBody>
+          <a:bodyPr wrap="square" rtlCol="0">
+            <a:spAutoFit/>
+          </a:bodyPr>
+          <a:lstStyle/>
+          <a:p>
+            <a:pPr algn="ctr"/>
+            <a:r>
+              <a:rPr lang="en-US" dirty="0"/>
+              <a:t>No</a:t>
+            </a:r>
+          </a:p>
+        </p:txBody>
+      </p:sp>
+      <p:sp>
+        <p:nvSpPr>
+          <p:cNvPr id="36" name="Rectangle 35">
+            <a:extLst>
+              <a:ext uri="{FF2B5EF4-FFF2-40B4-BE49-F238E27FC236}">
+                <a16:creationId xmlns:a16="http://schemas.microsoft.com/office/drawing/2014/main" id="{60778220-247C-7082-FEE0-6291FD380D55}"/>
+              </a:ext>
+            </a:extLst>
+          </p:cNvPr>
+          <p:cNvSpPr>
+            <a:spLocks noChangeAspect="1"/>
+          </p:cNvSpPr>
+          <p:nvPr/>
+        </p:nvSpPr>
+        <p:spPr>
+          <a:xfrm rot="18944431">
+            <a:off x="7718133" y="1876845"/>
+            <a:ext cx="1168817" cy="1168817"/>
+          </a:xfrm>
+          <a:prstGeom prst="rect">
+            <a:avLst/>
+          </a:prstGeom>
+          <a:solidFill>
+            <a:schemeClr val="bg1"/>
+          </a:solidFill>
+        </p:spPr>
+        <p:style>
+          <a:lnRef idx="2">
+            <a:schemeClr val="accent1">
+              <a:shade val="15000"/>
+            </a:schemeClr>
+          </a:lnRef>
+          <a:fillRef idx="1">
+            <a:schemeClr val="accent1"/>
+          </a:fillRef>
+          <a:effectRef idx="0">
+            <a:schemeClr val="accent1"/>
+          </a:effectRef>
+          <a:fontRef idx="minor">
+            <a:schemeClr val="lt1"/>
+          </a:fontRef>
+        </p:style>
+        <p:txBody>
+          <a:bodyPr rtlCol="0" anchor="ctr"/>
+          <a:lstStyle/>
+          <a:p>
+            <a:pPr algn="ctr"/>
+            <a:endParaRPr lang="en-US"/>
+          </a:p>
+        </p:txBody>
+      </p:sp>
+      <p:sp>
+        <p:nvSpPr>
+          <p:cNvPr id="37" name="TextBox 36">
+            <a:extLst>
+              <a:ext uri="{FF2B5EF4-FFF2-40B4-BE49-F238E27FC236}">
+                <a16:creationId xmlns:a16="http://schemas.microsoft.com/office/drawing/2014/main" id="{025CB498-CB6A-4391-1DF5-E7133275309A}"/>
+              </a:ext>
+            </a:extLst>
+          </p:cNvPr>
+          <p:cNvSpPr txBox="1"/>
+          <p:nvPr/>
+        </p:nvSpPr>
+        <p:spPr>
+          <a:xfrm>
+            <a:off x="7553379" y="2037077"/>
+            <a:ext cx="1460024" cy="923330"/>
+          </a:xfrm>
+          <a:prstGeom prst="rect">
+            <a:avLst/>
+          </a:prstGeom>
+          <a:noFill/>
+        </p:spPr>
+        <p:txBody>
+          <a:bodyPr wrap="square" rtlCol="0">
+            <a:spAutoFit/>
+          </a:bodyPr>
+          <a:lstStyle/>
+          <a:p>
+            <a:pPr algn="ctr"/>
+            <a:r>
+              <a:rPr lang="en-US" dirty="0"/>
+              <a:t>Does it contain Images?</a:t>
+            </a:r>
+          </a:p>
+        </p:txBody>
+      </p:sp>
+      <p:cxnSp>
+        <p:nvCxnSpPr>
+          <p:cNvPr id="38" name="Straight Arrow Connector 37">
+            <a:extLst>
+              <a:ext uri="{FF2B5EF4-FFF2-40B4-BE49-F238E27FC236}">
+                <a16:creationId xmlns:a16="http://schemas.microsoft.com/office/drawing/2014/main" id="{4230F2A4-E281-852F-67B2-81656F278150}"/>
+              </a:ext>
+            </a:extLst>
+          </p:cNvPr>
+          <p:cNvCxnSpPr>
+            <a:cxnSpLocks/>
+          </p:cNvCxnSpPr>
+          <p:nvPr/>
+        </p:nvCxnSpPr>
+        <p:spPr>
+          <a:xfrm>
+            <a:off x="8283686" y="3287663"/>
+            <a:ext cx="0" cy="728572"/>
+          </a:xfrm>
+          <a:prstGeom prst="straightConnector1">
+            <a:avLst/>
+          </a:prstGeom>
+          <a:ln>
+            <a:tailEnd type="triangle"/>
+          </a:ln>
+        </p:spPr>
+        <p:style>
+          <a:lnRef idx="2">
+            <a:schemeClr val="accent1"/>
+          </a:lnRef>
+          <a:fillRef idx="0">
+            <a:schemeClr val="accent1"/>
+          </a:fillRef>
+          <a:effectRef idx="1">
+            <a:schemeClr val="accent1"/>
+          </a:effectRef>
+          <a:fontRef idx="minor">
+            <a:schemeClr val="tx1"/>
+          </a:fontRef>
+        </p:style>
+      </p:cxnSp>
+      <p:cxnSp>
+        <p:nvCxnSpPr>
+          <p:cNvPr id="39" name="Straight Arrow Connector 38">
+            <a:extLst>
+              <a:ext uri="{FF2B5EF4-FFF2-40B4-BE49-F238E27FC236}">
+                <a16:creationId xmlns:a16="http://schemas.microsoft.com/office/drawing/2014/main" id="{1DF482AE-26D1-FF9A-11E0-60F636EF6DC1}"/>
+              </a:ext>
+            </a:extLst>
+          </p:cNvPr>
+          <p:cNvCxnSpPr>
+            <a:cxnSpLocks/>
+          </p:cNvCxnSpPr>
+          <p:nvPr/>
+        </p:nvCxnSpPr>
+        <p:spPr>
+          <a:xfrm>
+            <a:off x="9128951" y="2461254"/>
+            <a:ext cx="765076" cy="1"/>
+          </a:xfrm>
+          <a:prstGeom prst="straightConnector1">
+            <a:avLst/>
+          </a:prstGeom>
+          <a:ln>
+            <a:tailEnd type="triangle"/>
+          </a:ln>
+        </p:spPr>
+        <p:style>
+          <a:lnRef idx="2">
+            <a:schemeClr val="accent1"/>
+          </a:lnRef>
+          <a:fillRef idx="0">
+            <a:schemeClr val="accent1"/>
+          </a:fillRef>
+          <a:effectRef idx="1">
+            <a:schemeClr val="accent1"/>
+          </a:effectRef>
+          <a:fontRef idx="minor">
+            <a:schemeClr val="tx1"/>
+          </a:fontRef>
+        </p:style>
+      </p:cxnSp>
+      <p:sp>
+        <p:nvSpPr>
+          <p:cNvPr id="40" name="TextBox 39">
+            <a:extLst>
+              <a:ext uri="{FF2B5EF4-FFF2-40B4-BE49-F238E27FC236}">
+                <a16:creationId xmlns:a16="http://schemas.microsoft.com/office/drawing/2014/main" id="{C6ECBE1C-DCE3-83C1-3DC4-4229DDA5F219}"/>
+              </a:ext>
+            </a:extLst>
+          </p:cNvPr>
+          <p:cNvSpPr txBox="1"/>
+          <p:nvPr/>
+        </p:nvSpPr>
+        <p:spPr>
+          <a:xfrm>
+            <a:off x="9063409" y="2157177"/>
+            <a:ext cx="780612" cy="369332"/>
+          </a:xfrm>
+          <a:prstGeom prst="rect">
+            <a:avLst/>
+          </a:prstGeom>
+          <a:noFill/>
+        </p:spPr>
+        <p:txBody>
+          <a:bodyPr wrap="square" rtlCol="0">
+            <a:spAutoFit/>
+          </a:bodyPr>
+          <a:lstStyle/>
+          <a:p>
+            <a:pPr algn="ctr"/>
+            <a:r>
+              <a:rPr lang="en-US" dirty="0"/>
+              <a:t>Yes</a:t>
+            </a:r>
+          </a:p>
+        </p:txBody>
+      </p:sp>
+      <p:sp>
+        <p:nvSpPr>
+          <p:cNvPr id="41" name="TextBox 40">
+            <a:extLst>
+              <a:ext uri="{FF2B5EF4-FFF2-40B4-BE49-F238E27FC236}">
+                <a16:creationId xmlns:a16="http://schemas.microsoft.com/office/drawing/2014/main" id="{0C599B12-11DE-79FF-D92E-81442506B23C}"/>
+              </a:ext>
+            </a:extLst>
+          </p:cNvPr>
+          <p:cNvSpPr txBox="1"/>
+          <p:nvPr/>
+        </p:nvSpPr>
+        <p:spPr>
+          <a:xfrm rot="5400000">
+            <a:off x="8012524" y="3444696"/>
+            <a:ext cx="834663" cy="369332"/>
+          </a:xfrm>
+          <a:prstGeom prst="rect">
+            <a:avLst/>
+          </a:prstGeom>
+          <a:noFill/>
+        </p:spPr>
+        <p:txBody>
+          <a:bodyPr wrap="square" rtlCol="0">
+            <a:spAutoFit/>
+          </a:bodyPr>
+          <a:lstStyle/>
+          <a:p>
+            <a:pPr algn="ctr"/>
+            <a:r>
+              <a:rPr lang="en-US" dirty="0"/>
+              <a:t>No</a:t>
+            </a:r>
+          </a:p>
+        </p:txBody>
+      </p:sp>
+      <p:sp>
+        <p:nvSpPr>
+          <p:cNvPr id="42" name="Rectangle 41">
+            <a:extLst>
+              <a:ext uri="{FF2B5EF4-FFF2-40B4-BE49-F238E27FC236}">
+                <a16:creationId xmlns:a16="http://schemas.microsoft.com/office/drawing/2014/main" id="{DCD0EDC6-0B25-70AC-AB7F-F5B6110BB98D}"/>
+              </a:ext>
+            </a:extLst>
+          </p:cNvPr>
+          <p:cNvSpPr/>
+          <p:nvPr/>
+        </p:nvSpPr>
+        <p:spPr>
+          <a:xfrm>
+            <a:off x="9930507" y="1863304"/>
+            <a:ext cx="1600200" cy="1178716"/>
+          </a:xfrm>
+          <a:prstGeom prst="rect">
+            <a:avLst/>
+          </a:prstGeom>
+          <a:solidFill>
+            <a:schemeClr val="accent6"/>
+          </a:solidFill>
+        </p:spPr>
+        <p:style>
+          <a:lnRef idx="2">
+            <a:schemeClr val="accent1">
+              <a:shade val="15000"/>
+            </a:schemeClr>
+          </a:lnRef>
+          <a:fillRef idx="1">
+            <a:schemeClr val="accent1"/>
+          </a:fillRef>
+          <a:effectRef idx="0">
+            <a:schemeClr val="accent1"/>
+          </a:effectRef>
+          <a:fontRef idx="minor">
+            <a:schemeClr val="lt1"/>
+          </a:fontRef>
+        </p:style>
+        <p:txBody>
+          <a:bodyPr rtlCol="0" anchor="ctr"/>
+          <a:lstStyle/>
+          <a:p>
+            <a:pPr algn="ctr"/>
+            <a:endParaRPr lang="en-US"/>
+          </a:p>
+        </p:txBody>
+      </p:sp>
+      <p:sp>
+        <p:nvSpPr>
+          <p:cNvPr id="43" name="TextBox 42">
+            <a:extLst>
+              <a:ext uri="{FF2B5EF4-FFF2-40B4-BE49-F238E27FC236}">
+                <a16:creationId xmlns:a16="http://schemas.microsoft.com/office/drawing/2014/main" id="{DAFFB3EA-26A2-6C27-E8E4-DC2F55537F88}"/>
+              </a:ext>
+            </a:extLst>
+          </p:cNvPr>
+          <p:cNvSpPr txBox="1"/>
+          <p:nvPr/>
+        </p:nvSpPr>
+        <p:spPr>
+          <a:xfrm>
+            <a:off x="9844021" y="1921851"/>
+            <a:ext cx="1793148" cy="738664"/>
+          </a:xfrm>
+          <a:prstGeom prst="rect">
+            <a:avLst/>
+          </a:prstGeom>
+          <a:noFill/>
+        </p:spPr>
+        <p:txBody>
+          <a:bodyPr wrap="square" rtlCol="0">
+            <a:spAutoFit/>
+          </a:bodyPr>
+          <a:lstStyle/>
+          <a:p>
+            <a:pPr marL="342900" indent="-342900">
+              <a:buAutoNum type="arabicParenR"/>
+            </a:pPr>
+            <a:r>
+              <a:rPr lang="en-US" sz="1400" dirty="0" err="1"/>
+              <a:t>PyPDF</a:t>
+            </a:r>
+            <a:r>
+              <a:rPr lang="en-US" sz="1400" dirty="0"/>
+              <a:t>/</a:t>
+            </a:r>
+            <a:r>
+              <a:rPr lang="en-US" sz="1400" dirty="0" err="1"/>
+              <a:t>PyMuDF</a:t>
+            </a:r>
+            <a:endParaRPr lang="en-US" sz="1400" dirty="0"/>
+          </a:p>
+          <a:p>
+            <a:pPr marL="342900" indent="-342900">
+              <a:buAutoNum type="arabicParenR"/>
+            </a:pPr>
+            <a:r>
+              <a:rPr lang="en-US" sz="1400" dirty="0"/>
+              <a:t>Tabula/Camelot</a:t>
+            </a:r>
+          </a:p>
+          <a:p>
+            <a:pPr marL="342900" indent="-342900">
+              <a:buAutoNum type="arabicParenR"/>
+            </a:pPr>
+            <a:r>
+              <a:rPr lang="en-US" sz="1400" dirty="0"/>
+              <a:t>Tesseract</a:t>
+            </a:r>
+          </a:p>
+        </p:txBody>
+      </p:sp>
+      <p:sp>
+        <p:nvSpPr>
+          <p:cNvPr id="44" name="Rectangle 43">
+            <a:extLst>
+              <a:ext uri="{FF2B5EF4-FFF2-40B4-BE49-F238E27FC236}">
+                <a16:creationId xmlns:a16="http://schemas.microsoft.com/office/drawing/2014/main" id="{DDC8B154-82D2-2F36-3B51-CFBE93484E18}"/>
+              </a:ext>
+            </a:extLst>
+          </p:cNvPr>
+          <p:cNvSpPr/>
+          <p:nvPr/>
+        </p:nvSpPr>
+        <p:spPr>
+          <a:xfrm>
+            <a:off x="2698584" y="4113736"/>
+            <a:ext cx="1600200" cy="1178716"/>
+          </a:xfrm>
+          <a:prstGeom prst="rect">
+            <a:avLst/>
+          </a:prstGeom>
+          <a:solidFill>
+            <a:schemeClr val="accent6"/>
+          </a:solidFill>
+        </p:spPr>
+        <p:style>
+          <a:lnRef idx="2">
+            <a:schemeClr val="accent1">
+              <a:shade val="15000"/>
+            </a:schemeClr>
+          </a:lnRef>
+          <a:fillRef idx="1">
+            <a:schemeClr val="accent1"/>
+          </a:fillRef>
+          <a:effectRef idx="0">
+            <a:schemeClr val="accent1"/>
+          </a:effectRef>
+          <a:fontRef idx="minor">
+            <a:schemeClr val="lt1"/>
+          </a:fontRef>
+        </p:style>
+        <p:txBody>
+          <a:bodyPr rtlCol="0" anchor="ctr"/>
+          <a:lstStyle/>
+          <a:p>
+            <a:pPr algn="ctr"/>
+            <a:endParaRPr lang="en-US"/>
+          </a:p>
+        </p:txBody>
+      </p:sp>
+      <p:sp>
+        <p:nvSpPr>
+          <p:cNvPr id="45" name="TextBox 44">
+            <a:extLst>
+              <a:ext uri="{FF2B5EF4-FFF2-40B4-BE49-F238E27FC236}">
+                <a16:creationId xmlns:a16="http://schemas.microsoft.com/office/drawing/2014/main" id="{4F7D2A2D-58B7-7655-A85A-DA5AE55673CF}"/>
+              </a:ext>
+            </a:extLst>
+          </p:cNvPr>
+          <p:cNvSpPr txBox="1"/>
+          <p:nvPr/>
+        </p:nvSpPr>
+        <p:spPr>
+          <a:xfrm>
+            <a:off x="2771476" y="4480060"/>
+            <a:ext cx="1793148" cy="307777"/>
+          </a:xfrm>
+          <a:prstGeom prst="rect">
+            <a:avLst/>
+          </a:prstGeom>
+          <a:noFill/>
+        </p:spPr>
+        <p:txBody>
+          <a:bodyPr wrap="square" rtlCol="0">
+            <a:spAutoFit/>
+          </a:bodyPr>
+          <a:lstStyle/>
+          <a:p>
+            <a:pPr marL="342900" indent="-342900">
+              <a:buAutoNum type="arabicParenR"/>
+            </a:pPr>
+            <a:r>
+              <a:rPr lang="en-US" sz="1400" dirty="0"/>
+              <a:t>Tesseract</a:t>
+            </a:r>
+          </a:p>
+        </p:txBody>
+      </p:sp>
+      <p:sp>
+        <p:nvSpPr>
+          <p:cNvPr id="48" name="Rectangle 47">
+            <a:extLst>
+              <a:ext uri="{FF2B5EF4-FFF2-40B4-BE49-F238E27FC236}">
+                <a16:creationId xmlns:a16="http://schemas.microsoft.com/office/drawing/2014/main" id="{B0A6761E-2220-75C2-9F2A-CA1F6F315507}"/>
+              </a:ext>
+            </a:extLst>
+          </p:cNvPr>
+          <p:cNvSpPr/>
+          <p:nvPr/>
+        </p:nvSpPr>
+        <p:spPr>
+          <a:xfrm>
+            <a:off x="7520542" y="4122327"/>
+            <a:ext cx="1600200" cy="1178716"/>
+          </a:xfrm>
+          <a:prstGeom prst="rect">
+            <a:avLst/>
+          </a:prstGeom>
+          <a:solidFill>
+            <a:schemeClr val="accent6"/>
+          </a:solidFill>
+        </p:spPr>
+        <p:style>
+          <a:lnRef idx="2">
+            <a:schemeClr val="accent1">
+              <a:shade val="15000"/>
+            </a:schemeClr>
+          </a:lnRef>
+          <a:fillRef idx="1">
+            <a:schemeClr val="accent1"/>
+          </a:fillRef>
+          <a:effectRef idx="0">
+            <a:schemeClr val="accent1"/>
+          </a:effectRef>
+          <a:fontRef idx="minor">
+            <a:schemeClr val="lt1"/>
+          </a:fontRef>
+        </p:style>
+        <p:txBody>
+          <a:bodyPr rtlCol="0" anchor="ctr"/>
+          <a:lstStyle/>
+          <a:p>
+            <a:pPr algn="ctr"/>
+            <a:endParaRPr lang="en-US"/>
+          </a:p>
+        </p:txBody>
+      </p:sp>
+      <p:sp>
+        <p:nvSpPr>
+          <p:cNvPr id="49" name="TextBox 48">
+            <a:extLst>
+              <a:ext uri="{FF2B5EF4-FFF2-40B4-BE49-F238E27FC236}">
+                <a16:creationId xmlns:a16="http://schemas.microsoft.com/office/drawing/2014/main" id="{29019D50-DC22-9D05-175A-713B58D72DB4}"/>
+              </a:ext>
+            </a:extLst>
+          </p:cNvPr>
+          <p:cNvSpPr txBox="1"/>
+          <p:nvPr/>
+        </p:nvSpPr>
+        <p:spPr>
+          <a:xfrm>
+            <a:off x="7434056" y="4405337"/>
+            <a:ext cx="1793148" cy="523220"/>
+          </a:xfrm>
+          <a:prstGeom prst="rect">
+            <a:avLst/>
+          </a:prstGeom>
+          <a:noFill/>
+        </p:spPr>
+        <p:txBody>
+          <a:bodyPr wrap="square" rtlCol="0">
+            <a:spAutoFit/>
+          </a:bodyPr>
+          <a:lstStyle/>
+          <a:p>
+            <a:pPr marL="342900" indent="-342900">
+              <a:buAutoNum type="arabicParenR"/>
+            </a:pPr>
+            <a:r>
+              <a:rPr lang="en-US" sz="1400" dirty="0" err="1"/>
+              <a:t>PyPDF</a:t>
+            </a:r>
+            <a:r>
+              <a:rPr lang="en-US" sz="1400" dirty="0"/>
+              <a:t>/</a:t>
+            </a:r>
+            <a:r>
+              <a:rPr lang="en-US" sz="1400" dirty="0" err="1"/>
+              <a:t>PyMuDF</a:t>
+            </a:r>
+            <a:endParaRPr lang="en-US" sz="1400" dirty="0"/>
+          </a:p>
+          <a:p>
+            <a:pPr marL="342900" indent="-342900">
+              <a:buAutoNum type="arabicParenR"/>
+            </a:pPr>
+            <a:r>
+              <a:rPr lang="en-US" sz="1400" dirty="0"/>
+              <a:t>Tabula/Camelot</a:t>
+            </a:r>
+          </a:p>
+        </p:txBody>
+      </p:sp>
+      <p:sp>
+        <p:nvSpPr>
+          <p:cNvPr id="50" name="Rectangle 49">
+            <a:extLst>
+              <a:ext uri="{FF2B5EF4-FFF2-40B4-BE49-F238E27FC236}">
+                <a16:creationId xmlns:a16="http://schemas.microsoft.com/office/drawing/2014/main" id="{FD22E7B1-6ABC-1AD7-FAC2-10A229A55D58}"/>
+              </a:ext>
+            </a:extLst>
+          </p:cNvPr>
+          <p:cNvSpPr/>
+          <p:nvPr/>
+        </p:nvSpPr>
+        <p:spPr>
+          <a:xfrm>
+            <a:off x="5066167" y="4109357"/>
+            <a:ext cx="1600200" cy="1178716"/>
+          </a:xfrm>
+          <a:prstGeom prst="rect">
+            <a:avLst/>
+          </a:prstGeom>
+          <a:solidFill>
+            <a:schemeClr val="accent6"/>
+          </a:solidFill>
+        </p:spPr>
+        <p:style>
+          <a:lnRef idx="2">
+            <a:schemeClr val="accent1">
+              <a:shade val="15000"/>
+            </a:schemeClr>
+          </a:lnRef>
+          <a:fillRef idx="1">
+            <a:schemeClr val="accent1"/>
+          </a:fillRef>
+          <a:effectRef idx="0">
+            <a:schemeClr val="accent1"/>
+          </a:effectRef>
+          <a:fontRef idx="minor">
+            <a:schemeClr val="lt1"/>
+          </a:fontRef>
+        </p:style>
+        <p:txBody>
+          <a:bodyPr rtlCol="0" anchor="ctr"/>
+          <a:lstStyle/>
+          <a:p>
+            <a:pPr algn="ctr"/>
+            <a:endParaRPr lang="en-US"/>
+          </a:p>
+        </p:txBody>
+      </p:sp>
+      <p:sp>
+        <p:nvSpPr>
+          <p:cNvPr id="51" name="TextBox 50">
+            <a:extLst>
+              <a:ext uri="{FF2B5EF4-FFF2-40B4-BE49-F238E27FC236}">
+                <a16:creationId xmlns:a16="http://schemas.microsoft.com/office/drawing/2014/main" id="{6AFA9E76-8C98-C192-5844-781754A7A139}"/>
+              </a:ext>
+            </a:extLst>
+          </p:cNvPr>
+          <p:cNvSpPr txBox="1"/>
+          <p:nvPr/>
+        </p:nvSpPr>
+        <p:spPr>
+          <a:xfrm>
+            <a:off x="4979681" y="4392367"/>
+            <a:ext cx="1793148" cy="307777"/>
+          </a:xfrm>
+          <a:prstGeom prst="rect">
+            <a:avLst/>
+          </a:prstGeom>
+          <a:noFill/>
+        </p:spPr>
+        <p:txBody>
+          <a:bodyPr wrap="square" rtlCol="0">
+            <a:spAutoFit/>
+          </a:bodyPr>
+          <a:lstStyle/>
+          <a:p>
+            <a:pPr marL="342900" indent="-342900">
+              <a:buAutoNum type="arabicParenR"/>
+            </a:pPr>
+            <a:r>
+              <a:rPr lang="en-US" sz="1400" dirty="0" err="1"/>
+              <a:t>PyPDF</a:t>
+            </a:r>
+            <a:r>
+              <a:rPr lang="en-US" sz="1400" dirty="0"/>
+              <a:t>/</a:t>
+            </a:r>
+            <a:r>
+              <a:rPr lang="en-US" sz="1400" dirty="0" err="1"/>
+              <a:t>PyMuDF</a:t>
+            </a:r>
+            <a:endParaRPr lang="en-US" sz="1400" dirty="0"/>
+          </a:p>
+        </p:txBody>
+      </p:sp>
     </p:spTree>
     <p:extLst>
       <p:ext uri="{BB962C8B-B14F-4D97-AF65-F5344CB8AC3E}">
         <p14:creationId xmlns:p14="http://schemas.microsoft.com/office/powerpoint/2010/main" val="3391586308"/>
+      </p:ext>
+    </p:extLst>
+  </p:cSld>
+  <p:clrMapOvr>
+    <a:masterClrMapping/>
+  </p:clrMapOvr>
+</p:sld>
+</file>
+
+<file path=ppt/slides/slide4.xml><?xml version="1.0" encoding="utf-8"?>
+<p:sld xmlns:a="http://schemas.openxmlformats.org/drawingml/2006/main" xmlns:r="http://schemas.openxmlformats.org/officeDocument/2006/relationships" xmlns:p="http://schemas.openxmlformats.org/presentationml/2006/main">
+  <p:cSld>
+    <p:spTree>
+      <p:nvGrpSpPr>
+        <p:cNvPr id="1" name=""/>
+        <p:cNvGrpSpPr/>
+        <p:nvPr/>
+      </p:nvGrpSpPr>
+      <p:grpSpPr>
+        <a:xfrm>
+          <a:off x="0" y="0"/>
+          <a:ext cx="0" cy="0"/>
+          <a:chOff x="0" y="0"/>
+          <a:chExt cx="0" cy="0"/>
+        </a:xfrm>
+      </p:grpSpPr>
+      <p:sp>
+        <p:nvSpPr>
+          <p:cNvPr id="2" name="Title 1">
+            <a:extLst>
+              <a:ext uri="{FF2B5EF4-FFF2-40B4-BE49-F238E27FC236}">
+                <a16:creationId xmlns:a16="http://schemas.microsoft.com/office/drawing/2014/main" id="{5D35052D-B0F3-32BF-DD7E-B90AB0D41A23}"/>
+              </a:ext>
+            </a:extLst>
+          </p:cNvPr>
+          <p:cNvSpPr>
+            <a:spLocks noGrp="1"/>
+          </p:cNvSpPr>
+          <p:nvPr>
+            <p:ph type="title"/>
+          </p:nvPr>
+        </p:nvSpPr>
+        <p:spPr/>
+        <p:txBody>
+          <a:bodyPr/>
+          <a:lstStyle/>
+          <a:p>
+            <a:r>
+              <a:rPr lang="en-US" dirty="0"/>
+              <a:t>The PDF Data Flow</a:t>
+            </a:r>
+          </a:p>
+        </p:txBody>
+      </p:sp>
+      <p:grpSp>
+        <p:nvGrpSpPr>
+          <p:cNvPr id="25" name="Group 24">
+            <a:extLst>
+              <a:ext uri="{FF2B5EF4-FFF2-40B4-BE49-F238E27FC236}">
+                <a16:creationId xmlns:a16="http://schemas.microsoft.com/office/drawing/2014/main" id="{6D98842C-7E35-A429-647B-9EBE55404137}"/>
+              </a:ext>
+            </a:extLst>
+          </p:cNvPr>
+          <p:cNvGrpSpPr/>
+          <p:nvPr/>
+        </p:nvGrpSpPr>
+        <p:grpSpPr>
+          <a:xfrm>
+            <a:off x="751148" y="1976086"/>
+            <a:ext cx="776943" cy="920537"/>
+            <a:chOff x="751148" y="1976086"/>
+            <a:chExt cx="776943" cy="920537"/>
+          </a:xfrm>
+        </p:grpSpPr>
+        <p:sp>
+          <p:nvSpPr>
+            <p:cNvPr id="4" name="Rectangle 3">
+              <a:extLst>
+                <a:ext uri="{FF2B5EF4-FFF2-40B4-BE49-F238E27FC236}">
+                  <a16:creationId xmlns:a16="http://schemas.microsoft.com/office/drawing/2014/main" id="{F18140EF-C289-BE52-E96B-E22062E2B818}"/>
+                </a:ext>
+              </a:extLst>
+            </p:cNvPr>
+            <p:cNvSpPr/>
+            <p:nvPr/>
+          </p:nvSpPr>
+          <p:spPr>
+            <a:xfrm>
+              <a:off x="754840" y="1976086"/>
+              <a:ext cx="773251" cy="920537"/>
+            </a:xfrm>
+            <a:prstGeom prst="rect">
+              <a:avLst/>
+            </a:prstGeom>
+            <a:noFill/>
+          </p:spPr>
+          <p:style>
+            <a:lnRef idx="2">
+              <a:schemeClr val="accent1">
+                <a:shade val="15000"/>
+              </a:schemeClr>
+            </a:lnRef>
+            <a:fillRef idx="1">
+              <a:schemeClr val="accent1"/>
+            </a:fillRef>
+            <a:effectRef idx="0">
+              <a:schemeClr val="accent1"/>
+            </a:effectRef>
+            <a:fontRef idx="minor">
+              <a:schemeClr val="lt1"/>
+            </a:fontRef>
+          </p:style>
+          <p:txBody>
+            <a:bodyPr rtlCol="0" anchor="ctr"/>
+            <a:lstStyle/>
+            <a:p>
+              <a:pPr algn="ctr"/>
+              <a:endParaRPr lang="en-US"/>
+            </a:p>
+          </p:txBody>
+        </p:sp>
+        <p:cxnSp>
+          <p:nvCxnSpPr>
+            <p:cNvPr id="6" name="Straight Connector 5">
+              <a:extLst>
+                <a:ext uri="{FF2B5EF4-FFF2-40B4-BE49-F238E27FC236}">
+                  <a16:creationId xmlns:a16="http://schemas.microsoft.com/office/drawing/2014/main" id="{8C46865D-AE25-1393-0FC5-EF3FDB0D5155}"/>
+                </a:ext>
+              </a:extLst>
+            </p:cNvPr>
+            <p:cNvCxnSpPr>
+              <a:cxnSpLocks/>
+            </p:cNvCxnSpPr>
+            <p:nvPr/>
+          </p:nvCxnSpPr>
+          <p:spPr>
+            <a:xfrm>
+              <a:off x="871441" y="2061109"/>
+              <a:ext cx="540048" cy="0"/>
+            </a:xfrm>
+            <a:prstGeom prst="line">
+              <a:avLst/>
+            </a:prstGeom>
+          </p:spPr>
+          <p:style>
+            <a:lnRef idx="2">
+              <a:schemeClr val="accent1"/>
+            </a:lnRef>
+            <a:fillRef idx="0">
+              <a:schemeClr val="accent1"/>
+            </a:fillRef>
+            <a:effectRef idx="1">
+              <a:schemeClr val="accent1"/>
+            </a:effectRef>
+            <a:fontRef idx="minor">
+              <a:schemeClr val="tx1"/>
+            </a:fontRef>
+          </p:style>
+        </p:cxnSp>
+        <p:cxnSp>
+          <p:nvCxnSpPr>
+            <p:cNvPr id="8" name="Straight Connector 7">
+              <a:extLst>
+                <a:ext uri="{FF2B5EF4-FFF2-40B4-BE49-F238E27FC236}">
+                  <a16:creationId xmlns:a16="http://schemas.microsoft.com/office/drawing/2014/main" id="{58541D3B-53E8-499D-C1F7-1DC4EBDD489F}"/>
+                </a:ext>
+              </a:extLst>
+            </p:cNvPr>
+            <p:cNvCxnSpPr>
+              <a:cxnSpLocks/>
+            </p:cNvCxnSpPr>
+            <p:nvPr/>
+          </p:nvCxnSpPr>
+          <p:spPr>
+            <a:xfrm>
+              <a:off x="871441" y="2154771"/>
+              <a:ext cx="540048" cy="0"/>
+            </a:xfrm>
+            <a:prstGeom prst="line">
+              <a:avLst/>
+            </a:prstGeom>
+          </p:spPr>
+          <p:style>
+            <a:lnRef idx="2">
+              <a:schemeClr val="accent1"/>
+            </a:lnRef>
+            <a:fillRef idx="0">
+              <a:schemeClr val="accent1"/>
+            </a:fillRef>
+            <a:effectRef idx="1">
+              <a:schemeClr val="accent1"/>
+            </a:effectRef>
+            <a:fontRef idx="minor">
+              <a:schemeClr val="tx1"/>
+            </a:fontRef>
+          </p:style>
+        </p:cxnSp>
+        <p:cxnSp>
+          <p:nvCxnSpPr>
+            <p:cNvPr id="9" name="Straight Connector 8">
+              <a:extLst>
+                <a:ext uri="{FF2B5EF4-FFF2-40B4-BE49-F238E27FC236}">
+                  <a16:creationId xmlns:a16="http://schemas.microsoft.com/office/drawing/2014/main" id="{C498810E-CFB9-513A-6FE0-14F44C845A52}"/>
+                </a:ext>
+              </a:extLst>
+            </p:cNvPr>
+            <p:cNvCxnSpPr>
+              <a:cxnSpLocks/>
+            </p:cNvCxnSpPr>
+            <p:nvPr/>
+          </p:nvCxnSpPr>
+          <p:spPr>
+            <a:xfrm>
+              <a:off x="874614" y="2246846"/>
+              <a:ext cx="540048" cy="0"/>
+            </a:xfrm>
+            <a:prstGeom prst="line">
+              <a:avLst/>
+            </a:prstGeom>
+          </p:spPr>
+          <p:style>
+            <a:lnRef idx="2">
+              <a:schemeClr val="accent1"/>
+            </a:lnRef>
+            <a:fillRef idx="0">
+              <a:schemeClr val="accent1"/>
+            </a:fillRef>
+            <a:effectRef idx="1">
+              <a:schemeClr val="accent1"/>
+            </a:effectRef>
+            <a:fontRef idx="minor">
+              <a:schemeClr val="tx1"/>
+            </a:fontRef>
+          </p:style>
+        </p:cxnSp>
+        <p:cxnSp>
+          <p:nvCxnSpPr>
+            <p:cNvPr id="10" name="Straight Connector 9">
+              <a:extLst>
+                <a:ext uri="{FF2B5EF4-FFF2-40B4-BE49-F238E27FC236}">
+                  <a16:creationId xmlns:a16="http://schemas.microsoft.com/office/drawing/2014/main" id="{9DAECB26-B7ED-D771-5070-6B4A432155E7}"/>
+                </a:ext>
+              </a:extLst>
+            </p:cNvPr>
+            <p:cNvCxnSpPr>
+              <a:cxnSpLocks/>
+            </p:cNvCxnSpPr>
+            <p:nvPr/>
+          </p:nvCxnSpPr>
+          <p:spPr>
+            <a:xfrm>
+              <a:off x="876202" y="2348446"/>
+              <a:ext cx="540048" cy="0"/>
+            </a:xfrm>
+            <a:prstGeom prst="line">
+              <a:avLst/>
+            </a:prstGeom>
+          </p:spPr>
+          <p:style>
+            <a:lnRef idx="2">
+              <a:schemeClr val="accent1"/>
+            </a:lnRef>
+            <a:fillRef idx="0">
+              <a:schemeClr val="accent1"/>
+            </a:fillRef>
+            <a:effectRef idx="1">
+              <a:schemeClr val="accent1"/>
+            </a:effectRef>
+            <a:fontRef idx="minor">
+              <a:schemeClr val="tx1"/>
+            </a:fontRef>
+          </p:style>
+        </p:cxnSp>
+        <p:pic>
+          <p:nvPicPr>
+            <p:cNvPr id="15" name="Graphic 14" descr="Unicorn">
+              <a:extLst>
+                <a:ext uri="{FF2B5EF4-FFF2-40B4-BE49-F238E27FC236}">
+                  <a16:creationId xmlns:a16="http://schemas.microsoft.com/office/drawing/2014/main" id="{F89D9CE4-C0A5-6471-5D55-F3A90902B373}"/>
+                </a:ext>
+              </a:extLst>
+            </p:cNvPr>
+            <p:cNvPicPr>
+              <a:picLocks noChangeAspect="1"/>
+            </p:cNvPicPr>
+            <p:nvPr/>
+          </p:nvPicPr>
+          <p:blipFill>
+            <a:blip r:embed="rId2">
+              <a:extLst>
+                <a:ext uri="{96DAC541-7B7A-43D3-8B79-37D633B846F1}">
+                  <asvg:svgBlip xmlns:asvg="http://schemas.microsoft.com/office/drawing/2016/SVG/main" r:embed="rId3"/>
+                </a:ext>
+              </a:extLst>
+            </a:blip>
+            <a:stretch>
+              <a:fillRect/>
+            </a:stretch>
+          </p:blipFill>
+          <p:spPr>
+            <a:xfrm>
+              <a:off x="751148" y="2361538"/>
+              <a:ext cx="392646" cy="392646"/>
+            </a:xfrm>
+            <a:prstGeom prst="rect">
+              <a:avLst/>
+            </a:prstGeom>
+          </p:spPr>
+        </p:pic>
+        <p:cxnSp>
+          <p:nvCxnSpPr>
+            <p:cNvPr id="16" name="Straight Connector 15">
+              <a:extLst>
+                <a:ext uri="{FF2B5EF4-FFF2-40B4-BE49-F238E27FC236}">
+                  <a16:creationId xmlns:a16="http://schemas.microsoft.com/office/drawing/2014/main" id="{B4FB91DB-31BC-4E73-E6FC-618D676E1EF1}"/>
+                </a:ext>
+              </a:extLst>
+            </p:cNvPr>
+            <p:cNvCxnSpPr>
+              <a:cxnSpLocks/>
+            </p:cNvCxnSpPr>
+            <p:nvPr/>
+          </p:nvCxnSpPr>
+          <p:spPr>
+            <a:xfrm>
+              <a:off x="790042" y="2737383"/>
+              <a:ext cx="314858" cy="0"/>
+            </a:xfrm>
+            <a:prstGeom prst="line">
+              <a:avLst/>
+            </a:prstGeom>
+          </p:spPr>
+          <p:style>
+            <a:lnRef idx="2">
+              <a:schemeClr val="accent1"/>
+            </a:lnRef>
+            <a:fillRef idx="0">
+              <a:schemeClr val="accent1"/>
+            </a:fillRef>
+            <a:effectRef idx="1">
+              <a:schemeClr val="accent1"/>
+            </a:effectRef>
+            <a:fontRef idx="minor">
+              <a:schemeClr val="tx1"/>
+            </a:fontRef>
+          </p:style>
+        </p:cxnSp>
+        <p:cxnSp>
+          <p:nvCxnSpPr>
+            <p:cNvPr id="18" name="Straight Connector 17">
+              <a:extLst>
+                <a:ext uri="{FF2B5EF4-FFF2-40B4-BE49-F238E27FC236}">
+                  <a16:creationId xmlns:a16="http://schemas.microsoft.com/office/drawing/2014/main" id="{6B4E4592-8A53-ACED-8478-2F026AE33404}"/>
+                </a:ext>
+              </a:extLst>
+            </p:cNvPr>
+            <p:cNvCxnSpPr>
+              <a:cxnSpLocks/>
+            </p:cNvCxnSpPr>
+            <p:nvPr/>
+          </p:nvCxnSpPr>
+          <p:spPr>
+            <a:xfrm>
+              <a:off x="1190358" y="2557861"/>
+              <a:ext cx="260214" cy="0"/>
+            </a:xfrm>
+            <a:prstGeom prst="line">
+              <a:avLst/>
+            </a:prstGeom>
+          </p:spPr>
+          <p:style>
+            <a:lnRef idx="2">
+              <a:schemeClr val="accent1"/>
+            </a:lnRef>
+            <a:fillRef idx="0">
+              <a:schemeClr val="accent1"/>
+            </a:fillRef>
+            <a:effectRef idx="1">
+              <a:schemeClr val="accent1"/>
+            </a:effectRef>
+            <a:fontRef idx="minor">
+              <a:schemeClr val="tx1"/>
+            </a:fontRef>
+          </p:style>
+        </p:cxnSp>
+        <p:cxnSp>
+          <p:nvCxnSpPr>
+            <p:cNvPr id="19" name="Straight Connector 18">
+              <a:extLst>
+                <a:ext uri="{FF2B5EF4-FFF2-40B4-BE49-F238E27FC236}">
+                  <a16:creationId xmlns:a16="http://schemas.microsoft.com/office/drawing/2014/main" id="{CDF49319-D158-BAD5-AB67-2BA9C6303A91}"/>
+                </a:ext>
+              </a:extLst>
+            </p:cNvPr>
+            <p:cNvCxnSpPr>
+              <a:cxnSpLocks/>
+            </p:cNvCxnSpPr>
+            <p:nvPr/>
+          </p:nvCxnSpPr>
+          <p:spPr>
+            <a:xfrm>
+              <a:off x="1312124" y="2452664"/>
+              <a:ext cx="0" cy="392517"/>
+            </a:xfrm>
+            <a:prstGeom prst="line">
+              <a:avLst/>
+            </a:prstGeom>
+          </p:spPr>
+          <p:style>
+            <a:lnRef idx="2">
+              <a:schemeClr val="accent1"/>
+            </a:lnRef>
+            <a:fillRef idx="0">
+              <a:schemeClr val="accent1"/>
+            </a:fillRef>
+            <a:effectRef idx="1">
+              <a:schemeClr val="accent1"/>
+            </a:effectRef>
+            <a:fontRef idx="minor">
+              <a:schemeClr val="tx1"/>
+            </a:fontRef>
+          </p:style>
+        </p:cxnSp>
+        <p:sp>
+          <p:nvSpPr>
+            <p:cNvPr id="13" name="Rectangle 12">
+              <a:extLst>
+                <a:ext uri="{FF2B5EF4-FFF2-40B4-BE49-F238E27FC236}">
+                  <a16:creationId xmlns:a16="http://schemas.microsoft.com/office/drawing/2014/main" id="{D3837663-D65A-DADF-D43B-92AF84E8B7A4}"/>
+                </a:ext>
+              </a:extLst>
+            </p:cNvPr>
+            <p:cNvSpPr/>
+            <p:nvPr/>
+          </p:nvSpPr>
+          <p:spPr>
+            <a:xfrm>
+              <a:off x="1182688" y="2456215"/>
+              <a:ext cx="272378" cy="397545"/>
+            </a:xfrm>
+            <a:prstGeom prst="rect">
+              <a:avLst/>
+            </a:prstGeom>
+            <a:noFill/>
+          </p:spPr>
+          <p:style>
+            <a:lnRef idx="2">
+              <a:schemeClr val="accent1">
+                <a:shade val="15000"/>
+              </a:schemeClr>
+            </a:lnRef>
+            <a:fillRef idx="1">
+              <a:schemeClr val="accent1"/>
+            </a:fillRef>
+            <a:effectRef idx="0">
+              <a:schemeClr val="accent1"/>
+            </a:effectRef>
+            <a:fontRef idx="minor">
+              <a:schemeClr val="lt1"/>
+            </a:fontRef>
+          </p:style>
+          <p:txBody>
+            <a:bodyPr rtlCol="0" anchor="ctr"/>
+            <a:lstStyle/>
+            <a:p>
+              <a:pPr algn="ctr"/>
+              <a:endParaRPr lang="en-US"/>
+            </a:p>
+          </p:txBody>
+        </p:sp>
+        <p:cxnSp>
+          <p:nvCxnSpPr>
+            <p:cNvPr id="22" name="Straight Connector 21">
+              <a:extLst>
+                <a:ext uri="{FF2B5EF4-FFF2-40B4-BE49-F238E27FC236}">
+                  <a16:creationId xmlns:a16="http://schemas.microsoft.com/office/drawing/2014/main" id="{957F016F-E5AB-B5A0-E9F1-04593C8AB97B}"/>
+                </a:ext>
+              </a:extLst>
+            </p:cNvPr>
+            <p:cNvCxnSpPr>
+              <a:cxnSpLocks/>
+            </p:cNvCxnSpPr>
+            <p:nvPr/>
+          </p:nvCxnSpPr>
+          <p:spPr>
+            <a:xfrm>
+              <a:off x="1190358" y="2626124"/>
+              <a:ext cx="260214" cy="0"/>
+            </a:xfrm>
+            <a:prstGeom prst="line">
+              <a:avLst/>
+            </a:prstGeom>
+          </p:spPr>
+          <p:style>
+            <a:lnRef idx="2">
+              <a:schemeClr val="accent1"/>
+            </a:lnRef>
+            <a:fillRef idx="0">
+              <a:schemeClr val="accent1"/>
+            </a:fillRef>
+            <a:effectRef idx="1">
+              <a:schemeClr val="accent1"/>
+            </a:effectRef>
+            <a:fontRef idx="minor">
+              <a:schemeClr val="tx1"/>
+            </a:fontRef>
+          </p:style>
+        </p:cxnSp>
+        <p:cxnSp>
+          <p:nvCxnSpPr>
+            <p:cNvPr id="23" name="Straight Connector 22">
+              <a:extLst>
+                <a:ext uri="{FF2B5EF4-FFF2-40B4-BE49-F238E27FC236}">
+                  <a16:creationId xmlns:a16="http://schemas.microsoft.com/office/drawing/2014/main" id="{82A56E81-A132-A4D3-AA66-AD5B12BD3B48}"/>
+                </a:ext>
+              </a:extLst>
+            </p:cNvPr>
+            <p:cNvCxnSpPr>
+              <a:cxnSpLocks/>
+            </p:cNvCxnSpPr>
+            <p:nvPr/>
+          </p:nvCxnSpPr>
+          <p:spPr>
+            <a:xfrm>
+              <a:off x="1190358" y="2702324"/>
+              <a:ext cx="260214" cy="0"/>
+            </a:xfrm>
+            <a:prstGeom prst="line">
+              <a:avLst/>
+            </a:prstGeom>
+          </p:spPr>
+          <p:style>
+            <a:lnRef idx="2">
+              <a:schemeClr val="accent1"/>
+            </a:lnRef>
+            <a:fillRef idx="0">
+              <a:schemeClr val="accent1"/>
+            </a:fillRef>
+            <a:effectRef idx="1">
+              <a:schemeClr val="accent1"/>
+            </a:effectRef>
+            <a:fontRef idx="minor">
+              <a:schemeClr val="tx1"/>
+            </a:fontRef>
+          </p:style>
+        </p:cxnSp>
+        <p:cxnSp>
+          <p:nvCxnSpPr>
+            <p:cNvPr id="24" name="Straight Connector 23">
+              <a:extLst>
+                <a:ext uri="{FF2B5EF4-FFF2-40B4-BE49-F238E27FC236}">
+                  <a16:creationId xmlns:a16="http://schemas.microsoft.com/office/drawing/2014/main" id="{DD9D59DA-F1B0-F104-2A33-8F1E36BE0D15}"/>
+                </a:ext>
+              </a:extLst>
+            </p:cNvPr>
+            <p:cNvCxnSpPr>
+              <a:cxnSpLocks/>
+            </p:cNvCxnSpPr>
+            <p:nvPr/>
+          </p:nvCxnSpPr>
+          <p:spPr>
+            <a:xfrm>
+              <a:off x="1190358" y="2770587"/>
+              <a:ext cx="260214" cy="0"/>
+            </a:xfrm>
+            <a:prstGeom prst="line">
+              <a:avLst/>
+            </a:prstGeom>
+          </p:spPr>
+          <p:style>
+            <a:lnRef idx="2">
+              <a:schemeClr val="accent1"/>
+            </a:lnRef>
+            <a:fillRef idx="0">
+              <a:schemeClr val="accent1"/>
+            </a:fillRef>
+            <a:effectRef idx="1">
+              <a:schemeClr val="accent1"/>
+            </a:effectRef>
+            <a:fontRef idx="minor">
+              <a:schemeClr val="tx1"/>
+            </a:fontRef>
+          </p:style>
+        </p:cxnSp>
+      </p:grpSp>
+      <p:cxnSp>
+        <p:nvCxnSpPr>
+          <p:cNvPr id="5" name="Straight Arrow Connector 4">
+            <a:extLst>
+              <a:ext uri="{FF2B5EF4-FFF2-40B4-BE49-F238E27FC236}">
+                <a16:creationId xmlns:a16="http://schemas.microsoft.com/office/drawing/2014/main" id="{C2D3E783-AE59-DB74-6D7F-A205DE1950F9}"/>
+              </a:ext>
+            </a:extLst>
+          </p:cNvPr>
+          <p:cNvCxnSpPr>
+            <a:cxnSpLocks/>
+          </p:cNvCxnSpPr>
+          <p:nvPr/>
+        </p:nvCxnSpPr>
+        <p:spPr>
+          <a:xfrm>
+            <a:off x="1601734" y="2452664"/>
+            <a:ext cx="1031002" cy="0"/>
+          </a:xfrm>
+          <a:prstGeom prst="straightConnector1">
+            <a:avLst/>
+          </a:prstGeom>
+          <a:ln>
+            <a:tailEnd type="triangle"/>
+          </a:ln>
+        </p:spPr>
+        <p:style>
+          <a:lnRef idx="2">
+            <a:schemeClr val="accent1"/>
+          </a:lnRef>
+          <a:fillRef idx="0">
+            <a:schemeClr val="accent1"/>
+          </a:fillRef>
+          <a:effectRef idx="1">
+            <a:schemeClr val="accent1"/>
+          </a:effectRef>
+          <a:fontRef idx="minor">
+            <a:schemeClr val="tx1"/>
+          </a:fontRef>
+        </p:style>
+      </p:cxnSp>
+      <p:sp>
+        <p:nvSpPr>
+          <p:cNvPr id="12" name="Rectangle 11">
+            <a:extLst>
+              <a:ext uri="{FF2B5EF4-FFF2-40B4-BE49-F238E27FC236}">
+                <a16:creationId xmlns:a16="http://schemas.microsoft.com/office/drawing/2014/main" id="{1D96362B-FF15-3E18-C7DD-C2B8BA9025C2}"/>
+              </a:ext>
+            </a:extLst>
+          </p:cNvPr>
+          <p:cNvSpPr>
+            <a:spLocks noChangeAspect="1"/>
+          </p:cNvSpPr>
+          <p:nvPr/>
+        </p:nvSpPr>
+        <p:spPr>
+          <a:xfrm rot="18944431">
+            <a:off x="2874737" y="1868254"/>
+            <a:ext cx="1168817" cy="1168817"/>
+          </a:xfrm>
+          <a:prstGeom prst="rect">
+            <a:avLst/>
+          </a:prstGeom>
+          <a:solidFill>
+            <a:schemeClr val="bg1"/>
+          </a:solidFill>
+        </p:spPr>
+        <p:style>
+          <a:lnRef idx="2">
+            <a:schemeClr val="accent1">
+              <a:shade val="15000"/>
+            </a:schemeClr>
+          </a:lnRef>
+          <a:fillRef idx="1">
+            <a:schemeClr val="accent1"/>
+          </a:fillRef>
+          <a:effectRef idx="0">
+            <a:schemeClr val="accent1"/>
+          </a:effectRef>
+          <a:fontRef idx="minor">
+            <a:schemeClr val="lt1"/>
+          </a:fontRef>
+        </p:style>
+        <p:txBody>
+          <a:bodyPr rtlCol="0" anchor="ctr"/>
+          <a:lstStyle/>
+          <a:p>
+            <a:pPr algn="ctr"/>
+            <a:endParaRPr lang="en-US"/>
+          </a:p>
+        </p:txBody>
+      </p:sp>
+      <p:sp>
+        <p:nvSpPr>
+          <p:cNvPr id="14" name="TextBox 13">
+            <a:extLst>
+              <a:ext uri="{FF2B5EF4-FFF2-40B4-BE49-F238E27FC236}">
+                <a16:creationId xmlns:a16="http://schemas.microsoft.com/office/drawing/2014/main" id="{401260A8-F25D-C16A-1236-812491A942F1}"/>
+              </a:ext>
+            </a:extLst>
+          </p:cNvPr>
+          <p:cNvSpPr txBox="1"/>
+          <p:nvPr/>
+        </p:nvSpPr>
+        <p:spPr>
+          <a:xfrm>
+            <a:off x="2759989" y="2173452"/>
+            <a:ext cx="1460024" cy="646331"/>
+          </a:xfrm>
+          <a:prstGeom prst="rect">
+            <a:avLst/>
+          </a:prstGeom>
+          <a:noFill/>
+        </p:spPr>
+        <p:txBody>
+          <a:bodyPr wrap="square" rtlCol="0">
+            <a:spAutoFit/>
+          </a:bodyPr>
+          <a:lstStyle/>
+          <a:p>
+            <a:pPr algn="ctr"/>
+            <a:r>
+              <a:rPr lang="en-US" dirty="0"/>
+              <a:t>Is it machine readable? </a:t>
+            </a:r>
+          </a:p>
+        </p:txBody>
+      </p:sp>
+      <p:cxnSp>
+        <p:nvCxnSpPr>
+          <p:cNvPr id="17" name="Straight Arrow Connector 16">
+            <a:extLst>
+              <a:ext uri="{FF2B5EF4-FFF2-40B4-BE49-F238E27FC236}">
+                <a16:creationId xmlns:a16="http://schemas.microsoft.com/office/drawing/2014/main" id="{B7793141-5B39-608A-873F-42DD23626518}"/>
+              </a:ext>
+            </a:extLst>
+          </p:cNvPr>
+          <p:cNvCxnSpPr>
+            <a:cxnSpLocks/>
+          </p:cNvCxnSpPr>
+          <p:nvPr/>
+        </p:nvCxnSpPr>
+        <p:spPr>
+          <a:xfrm>
+            <a:off x="3440290" y="3279072"/>
+            <a:ext cx="0" cy="728572"/>
+          </a:xfrm>
+          <a:prstGeom prst="straightConnector1">
+            <a:avLst/>
+          </a:prstGeom>
+          <a:ln>
+            <a:tailEnd type="triangle"/>
+          </a:ln>
+        </p:spPr>
+        <p:style>
+          <a:lnRef idx="2">
+            <a:schemeClr val="accent1"/>
+          </a:lnRef>
+          <a:fillRef idx="0">
+            <a:schemeClr val="accent1"/>
+          </a:fillRef>
+          <a:effectRef idx="1">
+            <a:schemeClr val="accent1"/>
+          </a:effectRef>
+          <a:fontRef idx="minor">
+            <a:schemeClr val="tx1"/>
+          </a:fontRef>
+        </p:style>
+      </p:cxnSp>
+      <p:cxnSp>
+        <p:nvCxnSpPr>
+          <p:cNvPr id="21" name="Straight Arrow Connector 20">
+            <a:extLst>
+              <a:ext uri="{FF2B5EF4-FFF2-40B4-BE49-F238E27FC236}">
+                <a16:creationId xmlns:a16="http://schemas.microsoft.com/office/drawing/2014/main" id="{59FA3ECE-116C-24EE-3D00-9F271091C97A}"/>
+              </a:ext>
+            </a:extLst>
+          </p:cNvPr>
+          <p:cNvCxnSpPr>
+            <a:cxnSpLocks/>
+          </p:cNvCxnSpPr>
+          <p:nvPr/>
+        </p:nvCxnSpPr>
+        <p:spPr>
+          <a:xfrm>
+            <a:off x="4285555" y="2452663"/>
+            <a:ext cx="765076" cy="1"/>
+          </a:xfrm>
+          <a:prstGeom prst="straightConnector1">
+            <a:avLst/>
+          </a:prstGeom>
+          <a:ln>
+            <a:tailEnd type="triangle"/>
+          </a:ln>
+        </p:spPr>
+        <p:style>
+          <a:lnRef idx="2">
+            <a:schemeClr val="accent1"/>
+          </a:lnRef>
+          <a:fillRef idx="0">
+            <a:schemeClr val="accent1"/>
+          </a:fillRef>
+          <a:effectRef idx="1">
+            <a:schemeClr val="accent1"/>
+          </a:effectRef>
+          <a:fontRef idx="minor">
+            <a:schemeClr val="tx1"/>
+          </a:fontRef>
+        </p:style>
+      </p:cxnSp>
+      <p:sp>
+        <p:nvSpPr>
+          <p:cNvPr id="26" name="TextBox 25">
+            <a:extLst>
+              <a:ext uri="{FF2B5EF4-FFF2-40B4-BE49-F238E27FC236}">
+                <a16:creationId xmlns:a16="http://schemas.microsoft.com/office/drawing/2014/main" id="{4166D07B-E436-BD8D-3671-B21006602114}"/>
+              </a:ext>
+            </a:extLst>
+          </p:cNvPr>
+          <p:cNvSpPr txBox="1"/>
+          <p:nvPr/>
+        </p:nvSpPr>
+        <p:spPr>
+          <a:xfrm>
+            <a:off x="4220013" y="2148586"/>
+            <a:ext cx="780612" cy="369332"/>
+          </a:xfrm>
+          <a:prstGeom prst="rect">
+            <a:avLst/>
+          </a:prstGeom>
+          <a:noFill/>
+        </p:spPr>
+        <p:txBody>
+          <a:bodyPr wrap="square" rtlCol="0">
+            <a:spAutoFit/>
+          </a:bodyPr>
+          <a:lstStyle/>
+          <a:p>
+            <a:pPr algn="ctr"/>
+            <a:r>
+              <a:rPr lang="en-US" dirty="0"/>
+              <a:t>Yes</a:t>
+            </a:r>
+          </a:p>
+        </p:txBody>
+      </p:sp>
+      <p:sp>
+        <p:nvSpPr>
+          <p:cNvPr id="27" name="TextBox 26">
+            <a:extLst>
+              <a:ext uri="{FF2B5EF4-FFF2-40B4-BE49-F238E27FC236}">
+                <a16:creationId xmlns:a16="http://schemas.microsoft.com/office/drawing/2014/main" id="{F1FA706A-98C7-B7F4-2A73-DC740F229D06}"/>
+              </a:ext>
+            </a:extLst>
+          </p:cNvPr>
+          <p:cNvSpPr txBox="1"/>
+          <p:nvPr/>
+        </p:nvSpPr>
+        <p:spPr>
+          <a:xfrm rot="5400000">
+            <a:off x="3169128" y="3436105"/>
+            <a:ext cx="834663" cy="369332"/>
+          </a:xfrm>
+          <a:prstGeom prst="rect">
+            <a:avLst/>
+          </a:prstGeom>
+          <a:noFill/>
+        </p:spPr>
+        <p:txBody>
+          <a:bodyPr wrap="square" rtlCol="0">
+            <a:spAutoFit/>
+          </a:bodyPr>
+          <a:lstStyle/>
+          <a:p>
+            <a:pPr algn="ctr"/>
+            <a:r>
+              <a:rPr lang="en-US" dirty="0"/>
+              <a:t>No</a:t>
+            </a:r>
+          </a:p>
+        </p:txBody>
+      </p:sp>
+      <p:sp>
+        <p:nvSpPr>
+          <p:cNvPr id="30" name="Rectangle 29">
+            <a:extLst>
+              <a:ext uri="{FF2B5EF4-FFF2-40B4-BE49-F238E27FC236}">
+                <a16:creationId xmlns:a16="http://schemas.microsoft.com/office/drawing/2014/main" id="{A4B900D9-D74B-11E5-4C62-62544E30A819}"/>
+              </a:ext>
+            </a:extLst>
+          </p:cNvPr>
+          <p:cNvSpPr>
+            <a:spLocks noChangeAspect="1"/>
+          </p:cNvSpPr>
+          <p:nvPr/>
+        </p:nvSpPr>
+        <p:spPr>
+          <a:xfrm rot="18944431">
+            <a:off x="5308168" y="1868254"/>
+            <a:ext cx="1168817" cy="1168817"/>
+          </a:xfrm>
+          <a:prstGeom prst="rect">
+            <a:avLst/>
+          </a:prstGeom>
+          <a:solidFill>
+            <a:schemeClr val="bg1"/>
+          </a:solidFill>
+        </p:spPr>
+        <p:style>
+          <a:lnRef idx="2">
+            <a:schemeClr val="accent1">
+              <a:shade val="15000"/>
+            </a:schemeClr>
+          </a:lnRef>
+          <a:fillRef idx="1">
+            <a:schemeClr val="accent1"/>
+          </a:fillRef>
+          <a:effectRef idx="0">
+            <a:schemeClr val="accent1"/>
+          </a:effectRef>
+          <a:fontRef idx="minor">
+            <a:schemeClr val="lt1"/>
+          </a:fontRef>
+        </p:style>
+        <p:txBody>
+          <a:bodyPr rtlCol="0" anchor="ctr"/>
+          <a:lstStyle/>
+          <a:p>
+            <a:pPr algn="ctr"/>
+            <a:endParaRPr lang="en-US"/>
+          </a:p>
+        </p:txBody>
+      </p:sp>
+      <p:sp>
+        <p:nvSpPr>
+          <p:cNvPr id="31" name="TextBox 30">
+            <a:extLst>
+              <a:ext uri="{FF2B5EF4-FFF2-40B4-BE49-F238E27FC236}">
+                <a16:creationId xmlns:a16="http://schemas.microsoft.com/office/drawing/2014/main" id="{B3288B1E-F6E5-1120-C76D-3E16011B2B07}"/>
+              </a:ext>
+            </a:extLst>
+          </p:cNvPr>
+          <p:cNvSpPr txBox="1"/>
+          <p:nvPr/>
+        </p:nvSpPr>
+        <p:spPr>
+          <a:xfrm>
+            <a:off x="5143414" y="2028486"/>
+            <a:ext cx="1460024" cy="923330"/>
+          </a:xfrm>
+          <a:prstGeom prst="rect">
+            <a:avLst/>
+          </a:prstGeom>
+          <a:noFill/>
+        </p:spPr>
+        <p:txBody>
+          <a:bodyPr wrap="square" rtlCol="0">
+            <a:spAutoFit/>
+          </a:bodyPr>
+          <a:lstStyle/>
+          <a:p>
+            <a:pPr algn="ctr"/>
+            <a:r>
+              <a:rPr lang="en-US" dirty="0"/>
+              <a:t>Does it contain tables?</a:t>
+            </a:r>
+          </a:p>
+        </p:txBody>
+      </p:sp>
+      <p:cxnSp>
+        <p:nvCxnSpPr>
+          <p:cNvPr id="32" name="Straight Arrow Connector 31">
+            <a:extLst>
+              <a:ext uri="{FF2B5EF4-FFF2-40B4-BE49-F238E27FC236}">
+                <a16:creationId xmlns:a16="http://schemas.microsoft.com/office/drawing/2014/main" id="{140887D8-4944-6CFF-67D9-169B03257B49}"/>
+              </a:ext>
+            </a:extLst>
+          </p:cNvPr>
+          <p:cNvCxnSpPr>
+            <a:cxnSpLocks/>
+          </p:cNvCxnSpPr>
+          <p:nvPr/>
+        </p:nvCxnSpPr>
+        <p:spPr>
+          <a:xfrm>
+            <a:off x="5873721" y="3279072"/>
+            <a:ext cx="0" cy="728572"/>
+          </a:xfrm>
+          <a:prstGeom prst="straightConnector1">
+            <a:avLst/>
+          </a:prstGeom>
+          <a:ln>
+            <a:tailEnd type="triangle"/>
+          </a:ln>
+        </p:spPr>
+        <p:style>
+          <a:lnRef idx="2">
+            <a:schemeClr val="accent1"/>
+          </a:lnRef>
+          <a:fillRef idx="0">
+            <a:schemeClr val="accent1"/>
+          </a:fillRef>
+          <a:effectRef idx="1">
+            <a:schemeClr val="accent1"/>
+          </a:effectRef>
+          <a:fontRef idx="minor">
+            <a:schemeClr val="tx1"/>
+          </a:fontRef>
+        </p:style>
+      </p:cxnSp>
+      <p:cxnSp>
+        <p:nvCxnSpPr>
+          <p:cNvPr id="33" name="Straight Arrow Connector 32">
+            <a:extLst>
+              <a:ext uri="{FF2B5EF4-FFF2-40B4-BE49-F238E27FC236}">
+                <a16:creationId xmlns:a16="http://schemas.microsoft.com/office/drawing/2014/main" id="{F8749B16-B61B-4E64-C388-C6745372191B}"/>
+              </a:ext>
+            </a:extLst>
+          </p:cNvPr>
+          <p:cNvCxnSpPr>
+            <a:cxnSpLocks/>
+          </p:cNvCxnSpPr>
+          <p:nvPr/>
+        </p:nvCxnSpPr>
+        <p:spPr>
+          <a:xfrm>
+            <a:off x="6718986" y="2452663"/>
+            <a:ext cx="765076" cy="1"/>
+          </a:xfrm>
+          <a:prstGeom prst="straightConnector1">
+            <a:avLst/>
+          </a:prstGeom>
+          <a:ln>
+            <a:tailEnd type="triangle"/>
+          </a:ln>
+        </p:spPr>
+        <p:style>
+          <a:lnRef idx="2">
+            <a:schemeClr val="accent1"/>
+          </a:lnRef>
+          <a:fillRef idx="0">
+            <a:schemeClr val="accent1"/>
+          </a:fillRef>
+          <a:effectRef idx="1">
+            <a:schemeClr val="accent1"/>
+          </a:effectRef>
+          <a:fontRef idx="minor">
+            <a:schemeClr val="tx1"/>
+          </a:fontRef>
+        </p:style>
+      </p:cxnSp>
+      <p:sp>
+        <p:nvSpPr>
+          <p:cNvPr id="34" name="TextBox 33">
+            <a:extLst>
+              <a:ext uri="{FF2B5EF4-FFF2-40B4-BE49-F238E27FC236}">
+                <a16:creationId xmlns:a16="http://schemas.microsoft.com/office/drawing/2014/main" id="{39F66580-BC56-3A02-80AE-8B1AE2C40CAE}"/>
+              </a:ext>
+            </a:extLst>
+          </p:cNvPr>
+          <p:cNvSpPr txBox="1"/>
+          <p:nvPr/>
+        </p:nvSpPr>
+        <p:spPr>
+          <a:xfrm>
+            <a:off x="6653444" y="2148586"/>
+            <a:ext cx="780612" cy="369332"/>
+          </a:xfrm>
+          <a:prstGeom prst="rect">
+            <a:avLst/>
+          </a:prstGeom>
+          <a:noFill/>
+        </p:spPr>
+        <p:txBody>
+          <a:bodyPr wrap="square" rtlCol="0">
+            <a:spAutoFit/>
+          </a:bodyPr>
+          <a:lstStyle/>
+          <a:p>
+            <a:pPr algn="ctr"/>
+            <a:r>
+              <a:rPr lang="en-US" dirty="0"/>
+              <a:t>Yes</a:t>
+            </a:r>
+          </a:p>
+        </p:txBody>
+      </p:sp>
+      <p:sp>
+        <p:nvSpPr>
+          <p:cNvPr id="35" name="TextBox 34">
+            <a:extLst>
+              <a:ext uri="{FF2B5EF4-FFF2-40B4-BE49-F238E27FC236}">
+                <a16:creationId xmlns:a16="http://schemas.microsoft.com/office/drawing/2014/main" id="{2CBAD7E7-F6DA-1B90-9564-5AFC6D3F7CE4}"/>
+              </a:ext>
+            </a:extLst>
+          </p:cNvPr>
+          <p:cNvSpPr txBox="1"/>
+          <p:nvPr/>
+        </p:nvSpPr>
+        <p:spPr>
+          <a:xfrm rot="5400000">
+            <a:off x="5602559" y="3436105"/>
+            <a:ext cx="834663" cy="369332"/>
+          </a:xfrm>
+          <a:prstGeom prst="rect">
+            <a:avLst/>
+          </a:prstGeom>
+          <a:noFill/>
+        </p:spPr>
+        <p:txBody>
+          <a:bodyPr wrap="square" rtlCol="0">
+            <a:spAutoFit/>
+          </a:bodyPr>
+          <a:lstStyle/>
+          <a:p>
+            <a:pPr algn="ctr"/>
+            <a:r>
+              <a:rPr lang="en-US" dirty="0"/>
+              <a:t>No</a:t>
+            </a:r>
+          </a:p>
+        </p:txBody>
+      </p:sp>
+      <p:sp>
+        <p:nvSpPr>
+          <p:cNvPr id="36" name="Rectangle 35">
+            <a:extLst>
+              <a:ext uri="{FF2B5EF4-FFF2-40B4-BE49-F238E27FC236}">
+                <a16:creationId xmlns:a16="http://schemas.microsoft.com/office/drawing/2014/main" id="{60778220-247C-7082-FEE0-6291FD380D55}"/>
+              </a:ext>
+            </a:extLst>
+          </p:cNvPr>
+          <p:cNvSpPr>
+            <a:spLocks noChangeAspect="1"/>
+          </p:cNvSpPr>
+          <p:nvPr/>
+        </p:nvSpPr>
+        <p:spPr>
+          <a:xfrm rot="18944431">
+            <a:off x="7718133" y="1876845"/>
+            <a:ext cx="1168817" cy="1168817"/>
+          </a:xfrm>
+          <a:prstGeom prst="rect">
+            <a:avLst/>
+          </a:prstGeom>
+          <a:solidFill>
+            <a:schemeClr val="bg1"/>
+          </a:solidFill>
+        </p:spPr>
+        <p:style>
+          <a:lnRef idx="2">
+            <a:schemeClr val="accent1">
+              <a:shade val="15000"/>
+            </a:schemeClr>
+          </a:lnRef>
+          <a:fillRef idx="1">
+            <a:schemeClr val="accent1"/>
+          </a:fillRef>
+          <a:effectRef idx="0">
+            <a:schemeClr val="accent1"/>
+          </a:effectRef>
+          <a:fontRef idx="minor">
+            <a:schemeClr val="lt1"/>
+          </a:fontRef>
+        </p:style>
+        <p:txBody>
+          <a:bodyPr rtlCol="0" anchor="ctr"/>
+          <a:lstStyle/>
+          <a:p>
+            <a:pPr algn="ctr"/>
+            <a:endParaRPr lang="en-US"/>
+          </a:p>
+        </p:txBody>
+      </p:sp>
+      <p:sp>
+        <p:nvSpPr>
+          <p:cNvPr id="37" name="TextBox 36">
+            <a:extLst>
+              <a:ext uri="{FF2B5EF4-FFF2-40B4-BE49-F238E27FC236}">
+                <a16:creationId xmlns:a16="http://schemas.microsoft.com/office/drawing/2014/main" id="{025CB498-CB6A-4391-1DF5-E7133275309A}"/>
+              </a:ext>
+            </a:extLst>
+          </p:cNvPr>
+          <p:cNvSpPr txBox="1"/>
+          <p:nvPr/>
+        </p:nvSpPr>
+        <p:spPr>
+          <a:xfrm>
+            <a:off x="7553379" y="2037077"/>
+            <a:ext cx="1460024" cy="923330"/>
+          </a:xfrm>
+          <a:prstGeom prst="rect">
+            <a:avLst/>
+          </a:prstGeom>
+          <a:noFill/>
+        </p:spPr>
+        <p:txBody>
+          <a:bodyPr wrap="square" rtlCol="0">
+            <a:spAutoFit/>
+          </a:bodyPr>
+          <a:lstStyle/>
+          <a:p>
+            <a:pPr algn="ctr"/>
+            <a:r>
+              <a:rPr lang="en-US" dirty="0"/>
+              <a:t>Does it contain Images?</a:t>
+            </a:r>
+          </a:p>
+        </p:txBody>
+      </p:sp>
+      <p:cxnSp>
+        <p:nvCxnSpPr>
+          <p:cNvPr id="38" name="Straight Arrow Connector 37">
+            <a:extLst>
+              <a:ext uri="{FF2B5EF4-FFF2-40B4-BE49-F238E27FC236}">
+                <a16:creationId xmlns:a16="http://schemas.microsoft.com/office/drawing/2014/main" id="{4230F2A4-E281-852F-67B2-81656F278150}"/>
+              </a:ext>
+            </a:extLst>
+          </p:cNvPr>
+          <p:cNvCxnSpPr>
+            <a:cxnSpLocks/>
+          </p:cNvCxnSpPr>
+          <p:nvPr/>
+        </p:nvCxnSpPr>
+        <p:spPr>
+          <a:xfrm>
+            <a:off x="8283686" y="3287663"/>
+            <a:ext cx="0" cy="728572"/>
+          </a:xfrm>
+          <a:prstGeom prst="straightConnector1">
+            <a:avLst/>
+          </a:prstGeom>
+          <a:ln>
+            <a:tailEnd type="triangle"/>
+          </a:ln>
+        </p:spPr>
+        <p:style>
+          <a:lnRef idx="2">
+            <a:schemeClr val="accent1"/>
+          </a:lnRef>
+          <a:fillRef idx="0">
+            <a:schemeClr val="accent1"/>
+          </a:fillRef>
+          <a:effectRef idx="1">
+            <a:schemeClr val="accent1"/>
+          </a:effectRef>
+          <a:fontRef idx="minor">
+            <a:schemeClr val="tx1"/>
+          </a:fontRef>
+        </p:style>
+      </p:cxnSp>
+      <p:cxnSp>
+        <p:nvCxnSpPr>
+          <p:cNvPr id="39" name="Straight Arrow Connector 38">
+            <a:extLst>
+              <a:ext uri="{FF2B5EF4-FFF2-40B4-BE49-F238E27FC236}">
+                <a16:creationId xmlns:a16="http://schemas.microsoft.com/office/drawing/2014/main" id="{1DF482AE-26D1-FF9A-11E0-60F636EF6DC1}"/>
+              </a:ext>
+            </a:extLst>
+          </p:cNvPr>
+          <p:cNvCxnSpPr>
+            <a:cxnSpLocks/>
+          </p:cNvCxnSpPr>
+          <p:nvPr/>
+        </p:nvCxnSpPr>
+        <p:spPr>
+          <a:xfrm>
+            <a:off x="9128951" y="2461254"/>
+            <a:ext cx="765076" cy="1"/>
+          </a:xfrm>
+          <a:prstGeom prst="straightConnector1">
+            <a:avLst/>
+          </a:prstGeom>
+          <a:ln>
+            <a:tailEnd type="triangle"/>
+          </a:ln>
+        </p:spPr>
+        <p:style>
+          <a:lnRef idx="2">
+            <a:schemeClr val="accent1"/>
+          </a:lnRef>
+          <a:fillRef idx="0">
+            <a:schemeClr val="accent1"/>
+          </a:fillRef>
+          <a:effectRef idx="1">
+            <a:schemeClr val="accent1"/>
+          </a:effectRef>
+          <a:fontRef idx="minor">
+            <a:schemeClr val="tx1"/>
+          </a:fontRef>
+        </p:style>
+      </p:cxnSp>
+      <p:sp>
+        <p:nvSpPr>
+          <p:cNvPr id="40" name="TextBox 39">
+            <a:extLst>
+              <a:ext uri="{FF2B5EF4-FFF2-40B4-BE49-F238E27FC236}">
+                <a16:creationId xmlns:a16="http://schemas.microsoft.com/office/drawing/2014/main" id="{C6ECBE1C-DCE3-83C1-3DC4-4229DDA5F219}"/>
+              </a:ext>
+            </a:extLst>
+          </p:cNvPr>
+          <p:cNvSpPr txBox="1"/>
+          <p:nvPr/>
+        </p:nvSpPr>
+        <p:spPr>
+          <a:xfrm>
+            <a:off x="9063409" y="2157177"/>
+            <a:ext cx="780612" cy="369332"/>
+          </a:xfrm>
+          <a:prstGeom prst="rect">
+            <a:avLst/>
+          </a:prstGeom>
+          <a:noFill/>
+        </p:spPr>
+        <p:txBody>
+          <a:bodyPr wrap="square" rtlCol="0">
+            <a:spAutoFit/>
+          </a:bodyPr>
+          <a:lstStyle/>
+          <a:p>
+            <a:pPr algn="ctr"/>
+            <a:r>
+              <a:rPr lang="en-US" dirty="0"/>
+              <a:t>Yes</a:t>
+            </a:r>
+          </a:p>
+        </p:txBody>
+      </p:sp>
+      <p:sp>
+        <p:nvSpPr>
+          <p:cNvPr id="41" name="TextBox 40">
+            <a:extLst>
+              <a:ext uri="{FF2B5EF4-FFF2-40B4-BE49-F238E27FC236}">
+                <a16:creationId xmlns:a16="http://schemas.microsoft.com/office/drawing/2014/main" id="{0C599B12-11DE-79FF-D92E-81442506B23C}"/>
+              </a:ext>
+            </a:extLst>
+          </p:cNvPr>
+          <p:cNvSpPr txBox="1"/>
+          <p:nvPr/>
+        </p:nvSpPr>
+        <p:spPr>
+          <a:xfrm rot="5400000">
+            <a:off x="8012524" y="3444696"/>
+            <a:ext cx="834663" cy="369332"/>
+          </a:xfrm>
+          <a:prstGeom prst="rect">
+            <a:avLst/>
+          </a:prstGeom>
+          <a:noFill/>
+        </p:spPr>
+        <p:txBody>
+          <a:bodyPr wrap="square" rtlCol="0">
+            <a:spAutoFit/>
+          </a:bodyPr>
+          <a:lstStyle/>
+          <a:p>
+            <a:pPr algn="ctr"/>
+            <a:r>
+              <a:rPr lang="en-US" dirty="0"/>
+              <a:t>No</a:t>
+            </a:r>
+          </a:p>
+        </p:txBody>
+      </p:sp>
+      <p:sp>
+        <p:nvSpPr>
+          <p:cNvPr id="42" name="Rectangle 41">
+            <a:extLst>
+              <a:ext uri="{FF2B5EF4-FFF2-40B4-BE49-F238E27FC236}">
+                <a16:creationId xmlns:a16="http://schemas.microsoft.com/office/drawing/2014/main" id="{DCD0EDC6-0B25-70AC-AB7F-F5B6110BB98D}"/>
+              </a:ext>
+            </a:extLst>
+          </p:cNvPr>
+          <p:cNvSpPr/>
+          <p:nvPr/>
+        </p:nvSpPr>
+        <p:spPr>
+          <a:xfrm>
+            <a:off x="9930507" y="1863304"/>
+            <a:ext cx="1600200" cy="1178716"/>
+          </a:xfrm>
+          <a:prstGeom prst="rect">
+            <a:avLst/>
+          </a:prstGeom>
+          <a:solidFill>
+            <a:schemeClr val="accent6"/>
+          </a:solidFill>
+        </p:spPr>
+        <p:style>
+          <a:lnRef idx="2">
+            <a:schemeClr val="accent1">
+              <a:shade val="15000"/>
+            </a:schemeClr>
+          </a:lnRef>
+          <a:fillRef idx="1">
+            <a:schemeClr val="accent1"/>
+          </a:fillRef>
+          <a:effectRef idx="0">
+            <a:schemeClr val="accent1"/>
+          </a:effectRef>
+          <a:fontRef idx="minor">
+            <a:schemeClr val="lt1"/>
+          </a:fontRef>
+        </p:style>
+        <p:txBody>
+          <a:bodyPr rtlCol="0" anchor="ctr"/>
+          <a:lstStyle/>
+          <a:p>
+            <a:pPr algn="ctr"/>
+            <a:endParaRPr lang="en-US"/>
+          </a:p>
+        </p:txBody>
+      </p:sp>
+      <p:sp>
+        <p:nvSpPr>
+          <p:cNvPr id="43" name="TextBox 42">
+            <a:extLst>
+              <a:ext uri="{FF2B5EF4-FFF2-40B4-BE49-F238E27FC236}">
+                <a16:creationId xmlns:a16="http://schemas.microsoft.com/office/drawing/2014/main" id="{DAFFB3EA-26A2-6C27-E8E4-DC2F55537F88}"/>
+              </a:ext>
+            </a:extLst>
+          </p:cNvPr>
+          <p:cNvSpPr txBox="1"/>
+          <p:nvPr/>
+        </p:nvSpPr>
+        <p:spPr>
+          <a:xfrm>
+            <a:off x="9844021" y="1921851"/>
+            <a:ext cx="1793148" cy="738664"/>
+          </a:xfrm>
+          <a:prstGeom prst="rect">
+            <a:avLst/>
+          </a:prstGeom>
+          <a:noFill/>
+        </p:spPr>
+        <p:txBody>
+          <a:bodyPr wrap="square" rtlCol="0">
+            <a:spAutoFit/>
+          </a:bodyPr>
+          <a:lstStyle/>
+          <a:p>
+            <a:pPr marL="342900" indent="-342900">
+              <a:buAutoNum type="arabicParenR"/>
+            </a:pPr>
+            <a:r>
+              <a:rPr lang="en-US" sz="1400" dirty="0" err="1"/>
+              <a:t>PyPDF</a:t>
+            </a:r>
+            <a:r>
+              <a:rPr lang="en-US" sz="1400" dirty="0"/>
+              <a:t>/</a:t>
+            </a:r>
+            <a:r>
+              <a:rPr lang="en-US" sz="1400" dirty="0" err="1"/>
+              <a:t>PyMuDF</a:t>
+            </a:r>
+            <a:endParaRPr lang="en-US" sz="1400" dirty="0"/>
+          </a:p>
+          <a:p>
+            <a:pPr marL="342900" indent="-342900">
+              <a:buAutoNum type="arabicParenR"/>
+            </a:pPr>
+            <a:r>
+              <a:rPr lang="en-US" sz="1400" dirty="0"/>
+              <a:t>Tabula/Camelot</a:t>
+            </a:r>
+          </a:p>
+          <a:p>
+            <a:pPr marL="342900" indent="-342900">
+              <a:buAutoNum type="arabicParenR"/>
+            </a:pPr>
+            <a:r>
+              <a:rPr lang="en-US" sz="1400" dirty="0"/>
+              <a:t>Tesseract</a:t>
+            </a:r>
+          </a:p>
+        </p:txBody>
+      </p:sp>
+      <p:sp>
+        <p:nvSpPr>
+          <p:cNvPr id="44" name="Rectangle 43">
+            <a:extLst>
+              <a:ext uri="{FF2B5EF4-FFF2-40B4-BE49-F238E27FC236}">
+                <a16:creationId xmlns:a16="http://schemas.microsoft.com/office/drawing/2014/main" id="{DDC8B154-82D2-2F36-3B51-CFBE93484E18}"/>
+              </a:ext>
+            </a:extLst>
+          </p:cNvPr>
+          <p:cNvSpPr/>
+          <p:nvPr/>
+        </p:nvSpPr>
+        <p:spPr>
+          <a:xfrm>
+            <a:off x="2698584" y="4113736"/>
+            <a:ext cx="1600200" cy="1178716"/>
+          </a:xfrm>
+          <a:prstGeom prst="rect">
+            <a:avLst/>
+          </a:prstGeom>
+          <a:solidFill>
+            <a:schemeClr val="accent6"/>
+          </a:solidFill>
+        </p:spPr>
+        <p:style>
+          <a:lnRef idx="2">
+            <a:schemeClr val="accent1">
+              <a:shade val="15000"/>
+            </a:schemeClr>
+          </a:lnRef>
+          <a:fillRef idx="1">
+            <a:schemeClr val="accent1"/>
+          </a:fillRef>
+          <a:effectRef idx="0">
+            <a:schemeClr val="accent1"/>
+          </a:effectRef>
+          <a:fontRef idx="minor">
+            <a:schemeClr val="lt1"/>
+          </a:fontRef>
+        </p:style>
+        <p:txBody>
+          <a:bodyPr rtlCol="0" anchor="ctr"/>
+          <a:lstStyle/>
+          <a:p>
+            <a:pPr algn="ctr"/>
+            <a:endParaRPr lang="en-US"/>
+          </a:p>
+        </p:txBody>
+      </p:sp>
+      <p:sp>
+        <p:nvSpPr>
+          <p:cNvPr id="45" name="TextBox 44">
+            <a:extLst>
+              <a:ext uri="{FF2B5EF4-FFF2-40B4-BE49-F238E27FC236}">
+                <a16:creationId xmlns:a16="http://schemas.microsoft.com/office/drawing/2014/main" id="{4F7D2A2D-58B7-7655-A85A-DA5AE55673CF}"/>
+              </a:ext>
+            </a:extLst>
+          </p:cNvPr>
+          <p:cNvSpPr txBox="1"/>
+          <p:nvPr/>
+        </p:nvSpPr>
+        <p:spPr>
+          <a:xfrm>
+            <a:off x="2771476" y="4480060"/>
+            <a:ext cx="1793148" cy="307777"/>
+          </a:xfrm>
+          <a:prstGeom prst="rect">
+            <a:avLst/>
+          </a:prstGeom>
+          <a:noFill/>
+        </p:spPr>
+        <p:txBody>
+          <a:bodyPr wrap="square" rtlCol="0">
+            <a:spAutoFit/>
+          </a:bodyPr>
+          <a:lstStyle/>
+          <a:p>
+            <a:pPr marL="342900" indent="-342900">
+              <a:buAutoNum type="arabicParenR"/>
+            </a:pPr>
+            <a:r>
+              <a:rPr lang="en-US" sz="1400" dirty="0"/>
+              <a:t>Tesseract</a:t>
+            </a:r>
+          </a:p>
+        </p:txBody>
+      </p:sp>
+      <p:sp>
+        <p:nvSpPr>
+          <p:cNvPr id="48" name="Rectangle 47">
+            <a:extLst>
+              <a:ext uri="{FF2B5EF4-FFF2-40B4-BE49-F238E27FC236}">
+                <a16:creationId xmlns:a16="http://schemas.microsoft.com/office/drawing/2014/main" id="{B0A6761E-2220-75C2-9F2A-CA1F6F315507}"/>
+              </a:ext>
+            </a:extLst>
+          </p:cNvPr>
+          <p:cNvSpPr/>
+          <p:nvPr/>
+        </p:nvSpPr>
+        <p:spPr>
+          <a:xfrm>
+            <a:off x="7520542" y="4122327"/>
+            <a:ext cx="1600200" cy="1178716"/>
+          </a:xfrm>
+          <a:prstGeom prst="rect">
+            <a:avLst/>
+          </a:prstGeom>
+          <a:solidFill>
+            <a:schemeClr val="accent6"/>
+          </a:solidFill>
+        </p:spPr>
+        <p:style>
+          <a:lnRef idx="2">
+            <a:schemeClr val="accent1">
+              <a:shade val="15000"/>
+            </a:schemeClr>
+          </a:lnRef>
+          <a:fillRef idx="1">
+            <a:schemeClr val="accent1"/>
+          </a:fillRef>
+          <a:effectRef idx="0">
+            <a:schemeClr val="accent1"/>
+          </a:effectRef>
+          <a:fontRef idx="minor">
+            <a:schemeClr val="lt1"/>
+          </a:fontRef>
+        </p:style>
+        <p:txBody>
+          <a:bodyPr rtlCol="0" anchor="ctr"/>
+          <a:lstStyle/>
+          <a:p>
+            <a:pPr algn="ctr"/>
+            <a:endParaRPr lang="en-US"/>
+          </a:p>
+        </p:txBody>
+      </p:sp>
+      <p:sp>
+        <p:nvSpPr>
+          <p:cNvPr id="49" name="TextBox 48">
+            <a:extLst>
+              <a:ext uri="{FF2B5EF4-FFF2-40B4-BE49-F238E27FC236}">
+                <a16:creationId xmlns:a16="http://schemas.microsoft.com/office/drawing/2014/main" id="{29019D50-DC22-9D05-175A-713B58D72DB4}"/>
+              </a:ext>
+            </a:extLst>
+          </p:cNvPr>
+          <p:cNvSpPr txBox="1"/>
+          <p:nvPr/>
+        </p:nvSpPr>
+        <p:spPr>
+          <a:xfrm>
+            <a:off x="7434056" y="4405337"/>
+            <a:ext cx="1793148" cy="523220"/>
+          </a:xfrm>
+          <a:prstGeom prst="rect">
+            <a:avLst/>
+          </a:prstGeom>
+          <a:noFill/>
+        </p:spPr>
+        <p:txBody>
+          <a:bodyPr wrap="square" rtlCol="0">
+            <a:spAutoFit/>
+          </a:bodyPr>
+          <a:lstStyle/>
+          <a:p>
+            <a:pPr marL="342900" indent="-342900">
+              <a:buAutoNum type="arabicParenR"/>
+            </a:pPr>
+            <a:r>
+              <a:rPr lang="en-US" sz="1400" dirty="0" err="1"/>
+              <a:t>PyPDF</a:t>
+            </a:r>
+            <a:r>
+              <a:rPr lang="en-US" sz="1400" dirty="0"/>
+              <a:t>/</a:t>
+            </a:r>
+            <a:r>
+              <a:rPr lang="en-US" sz="1400" dirty="0" err="1"/>
+              <a:t>PyMuDF</a:t>
+            </a:r>
+            <a:endParaRPr lang="en-US" sz="1400" dirty="0"/>
+          </a:p>
+          <a:p>
+            <a:pPr marL="342900" indent="-342900">
+              <a:buAutoNum type="arabicParenR"/>
+            </a:pPr>
+            <a:r>
+              <a:rPr lang="en-US" sz="1400" dirty="0"/>
+              <a:t>Tabula/Camelot</a:t>
+            </a:r>
+          </a:p>
+        </p:txBody>
+      </p:sp>
+      <p:sp>
+        <p:nvSpPr>
+          <p:cNvPr id="50" name="Rectangle 49">
+            <a:extLst>
+              <a:ext uri="{FF2B5EF4-FFF2-40B4-BE49-F238E27FC236}">
+                <a16:creationId xmlns:a16="http://schemas.microsoft.com/office/drawing/2014/main" id="{FD22E7B1-6ABC-1AD7-FAC2-10A229A55D58}"/>
+              </a:ext>
+            </a:extLst>
+          </p:cNvPr>
+          <p:cNvSpPr/>
+          <p:nvPr/>
+        </p:nvSpPr>
+        <p:spPr>
+          <a:xfrm>
+            <a:off x="5066167" y="4109357"/>
+            <a:ext cx="1600200" cy="1178716"/>
+          </a:xfrm>
+          <a:prstGeom prst="rect">
+            <a:avLst/>
+          </a:prstGeom>
+          <a:solidFill>
+            <a:schemeClr val="accent6"/>
+          </a:solidFill>
+        </p:spPr>
+        <p:style>
+          <a:lnRef idx="2">
+            <a:schemeClr val="accent1">
+              <a:shade val="15000"/>
+            </a:schemeClr>
+          </a:lnRef>
+          <a:fillRef idx="1">
+            <a:schemeClr val="accent1"/>
+          </a:fillRef>
+          <a:effectRef idx="0">
+            <a:schemeClr val="accent1"/>
+          </a:effectRef>
+          <a:fontRef idx="minor">
+            <a:schemeClr val="lt1"/>
+          </a:fontRef>
+        </p:style>
+        <p:txBody>
+          <a:bodyPr rtlCol="0" anchor="ctr"/>
+          <a:lstStyle/>
+          <a:p>
+            <a:pPr algn="ctr"/>
+            <a:endParaRPr lang="en-US"/>
+          </a:p>
+        </p:txBody>
+      </p:sp>
+      <p:sp>
+        <p:nvSpPr>
+          <p:cNvPr id="51" name="TextBox 50">
+            <a:extLst>
+              <a:ext uri="{FF2B5EF4-FFF2-40B4-BE49-F238E27FC236}">
+                <a16:creationId xmlns:a16="http://schemas.microsoft.com/office/drawing/2014/main" id="{6AFA9E76-8C98-C192-5844-781754A7A139}"/>
+              </a:ext>
+            </a:extLst>
+          </p:cNvPr>
+          <p:cNvSpPr txBox="1"/>
+          <p:nvPr/>
+        </p:nvSpPr>
+        <p:spPr>
+          <a:xfrm>
+            <a:off x="4979681" y="4392367"/>
+            <a:ext cx="1793148" cy="307777"/>
+          </a:xfrm>
+          <a:prstGeom prst="rect">
+            <a:avLst/>
+          </a:prstGeom>
+          <a:noFill/>
+        </p:spPr>
+        <p:txBody>
+          <a:bodyPr wrap="square" rtlCol="0">
+            <a:spAutoFit/>
+          </a:bodyPr>
+          <a:lstStyle/>
+          <a:p>
+            <a:pPr marL="342900" indent="-342900">
+              <a:buAutoNum type="arabicParenR"/>
+            </a:pPr>
+            <a:r>
+              <a:rPr lang="en-US" sz="1400" dirty="0" err="1"/>
+              <a:t>PyPDF</a:t>
+            </a:r>
+            <a:r>
+              <a:rPr lang="en-US" sz="1400" dirty="0"/>
+              <a:t>/</a:t>
+            </a:r>
+            <a:r>
+              <a:rPr lang="en-US" sz="1400" dirty="0" err="1"/>
+              <a:t>PyMuDF</a:t>
+            </a:r>
+            <a:endParaRPr lang="en-US" sz="1400" dirty="0"/>
+          </a:p>
+        </p:txBody>
+      </p:sp>
+    </p:spTree>
+    <p:extLst>
+      <p:ext uri="{BB962C8B-B14F-4D97-AF65-F5344CB8AC3E}">
+        <p14:creationId xmlns:p14="http://schemas.microsoft.com/office/powerpoint/2010/main" val="2551086154"/>
       </p:ext>
     </p:extLst>
   </p:cSld>

</xml_diff>

<commit_message>
Completed the Frederick Python Notebooks.
</commit_message>
<xml_diff>
--- a/Frederick Python Meetup.pptx
+++ b/Frederick Python Meetup.pptx
@@ -9,6 +9,7 @@
     <p:sldId id="258" r:id="rId3"/>
     <p:sldId id="257" r:id="rId4"/>
     <p:sldId id="259" r:id="rId5"/>
+    <p:sldId id="260" r:id="rId6"/>
   </p:sldIdLst>
   <p:sldSz cx="12192000" cy="6858000"/>
   <p:notesSz cx="6858000" cy="9144000"/>
@@ -118,7 +119,7 @@
 <file path=ppt/revisionInfo.xml><?xml version="1.0" encoding="utf-8"?>
 <p1510:revInfo xmlns:a="http://schemas.openxmlformats.org/drawingml/2006/main" xmlns:r="http://schemas.openxmlformats.org/officeDocument/2006/relationships" xmlns:p1510="http://schemas.microsoft.com/office/powerpoint/2015/10/main">
   <p1510:revLst>
-    <p1510:client id="{B6D096D9-5D12-4270-91A6-2CABDC65E384}" v="14" dt="2024-08-11T23:17:46.079"/>
+    <p1510:client id="{B6D096D9-5D12-4270-91A6-2CABDC65E384}" v="16" dt="2024-08-12T02:23:53.015"/>
   </p1510:revLst>
 </p1510:revInfo>
 </file>
@@ -128,18 +129,18 @@
   <pc:docChgLst>
     <pc:chgData name="Raju Rayavarapu" userId="d72698f5c7d4af69" providerId="LiveId" clId="{B6D096D9-5D12-4270-91A6-2CABDC65E384}"/>
     <pc:docChg chg="undo custSel addSld modSld">
-      <pc:chgData name="Raju Rayavarapu" userId="d72698f5c7d4af69" providerId="LiveId" clId="{B6D096D9-5D12-4270-91A6-2CABDC65E384}" dt="2024-08-11T23:18:39.906" v="256" actId="20577"/>
+      <pc:chgData name="Raju Rayavarapu" userId="d72698f5c7d4af69" providerId="LiveId" clId="{B6D096D9-5D12-4270-91A6-2CABDC65E384}" dt="2024-08-12T02:25:57.714" v="1063" actId="20577"/>
       <pc:docMkLst>
         <pc:docMk/>
       </pc:docMkLst>
       <pc:sldChg chg="addSp delSp modSp mod">
-        <pc:chgData name="Raju Rayavarapu" userId="d72698f5c7d4af69" providerId="LiveId" clId="{B6D096D9-5D12-4270-91A6-2CABDC65E384}" dt="2024-08-11T23:18:39.906" v="256" actId="20577"/>
+        <pc:chgData name="Raju Rayavarapu" userId="d72698f5c7d4af69" providerId="LiveId" clId="{B6D096D9-5D12-4270-91A6-2CABDC65E384}" dt="2024-08-12T02:21:13.512" v="769" actId="20577"/>
         <pc:sldMkLst>
           <pc:docMk/>
           <pc:sldMk cId="3391586308" sldId="257"/>
         </pc:sldMkLst>
         <pc:spChg chg="mod">
-          <ac:chgData name="Raju Rayavarapu" userId="d72698f5c7d4af69" providerId="LiveId" clId="{B6D096D9-5D12-4270-91A6-2CABDC65E384}" dt="2024-08-11T23:18:39.906" v="256" actId="20577"/>
+          <ac:chgData name="Raju Rayavarapu" userId="d72698f5c7d4af69" providerId="LiveId" clId="{B6D096D9-5D12-4270-91A6-2CABDC65E384}" dt="2024-08-11T23:25:51.705" v="266" actId="20577"/>
           <ac:spMkLst>
             <pc:docMk/>
             <pc:sldMk cId="3391586308" sldId="257"/>
@@ -251,7 +252,7 @@
           </ac:spMkLst>
         </pc:spChg>
         <pc:spChg chg="add mod">
-          <ac:chgData name="Raju Rayavarapu" userId="d72698f5c7d4af69" providerId="LiveId" clId="{B6D096D9-5D12-4270-91A6-2CABDC65E384}" dt="2024-08-11T23:14:25.688" v="169" actId="120"/>
+          <ac:chgData name="Raju Rayavarapu" userId="d72698f5c7d4af69" providerId="LiveId" clId="{B6D096D9-5D12-4270-91A6-2CABDC65E384}" dt="2024-08-12T02:21:05.311" v="756" actId="20577"/>
           <ac:spMkLst>
             <pc:docMk/>
             <pc:sldMk cId="3391586308" sldId="257"/>
@@ -299,7 +300,7 @@
           </ac:spMkLst>
         </pc:spChg>
         <pc:spChg chg="add mod">
-          <ac:chgData name="Raju Rayavarapu" userId="d72698f5c7d4af69" providerId="LiveId" clId="{B6D096D9-5D12-4270-91A6-2CABDC65E384}" dt="2024-08-11T23:15:17.692" v="178" actId="1076"/>
+          <ac:chgData name="Raju Rayavarapu" userId="d72698f5c7d4af69" providerId="LiveId" clId="{B6D096D9-5D12-4270-91A6-2CABDC65E384}" dt="2024-08-12T02:21:13.512" v="769" actId="20577"/>
           <ac:spMkLst>
             <pc:docMk/>
             <pc:sldMk cId="3391586308" sldId="257"/>
@@ -379,12 +380,139 @@
           </ac:cxnSpMkLst>
         </pc:cxnChg>
       </pc:sldChg>
-      <pc:sldChg chg="add">
-        <pc:chgData name="Raju Rayavarapu" userId="d72698f5c7d4af69" providerId="LiveId" clId="{B6D096D9-5D12-4270-91A6-2CABDC65E384}" dt="2024-08-11T23:17:46.071" v="252"/>
+      <pc:sldChg chg="addSp modSp add mod">
+        <pc:chgData name="Raju Rayavarapu" userId="d72698f5c7d4af69" providerId="LiveId" clId="{B6D096D9-5D12-4270-91A6-2CABDC65E384}" dt="2024-08-12T02:21:31.268" v="775" actId="20577"/>
         <pc:sldMkLst>
           <pc:docMk/>
           <pc:sldMk cId="2551086154" sldId="259"/>
         </pc:sldMkLst>
+        <pc:spChg chg="mod">
+          <ac:chgData name="Raju Rayavarapu" userId="d72698f5c7d4af69" providerId="LiveId" clId="{B6D096D9-5D12-4270-91A6-2CABDC65E384}" dt="2024-08-11T23:25:59.550" v="282" actId="20577"/>
+          <ac:spMkLst>
+            <pc:docMk/>
+            <pc:sldMk cId="2551086154" sldId="259"/>
+            <ac:spMk id="2" creationId="{5D35052D-B0F3-32BF-DD7E-B90AB0D41A23}"/>
+          </ac:spMkLst>
+        </pc:spChg>
+        <pc:spChg chg="add mod">
+          <ac:chgData name="Raju Rayavarapu" userId="d72698f5c7d4af69" providerId="LiveId" clId="{B6D096D9-5D12-4270-91A6-2CABDC65E384}" dt="2024-08-12T02:21:31.268" v="775" actId="20577"/>
+          <ac:spMkLst>
+            <pc:docMk/>
+            <pc:sldMk cId="2551086154" sldId="259"/>
+            <ac:spMk id="3" creationId="{FC224A32-ACFC-4D94-F3D0-15C02D6C99B7}"/>
+          </ac:spMkLst>
+        </pc:spChg>
+        <pc:spChg chg="mod">
+          <ac:chgData name="Raju Rayavarapu" userId="d72698f5c7d4af69" providerId="LiveId" clId="{B6D096D9-5D12-4270-91A6-2CABDC65E384}" dt="2024-08-12T00:44:44.208" v="654" actId="1076"/>
+          <ac:spMkLst>
+            <pc:docMk/>
+            <pc:sldMk cId="2551086154" sldId="259"/>
+            <ac:spMk id="31" creationId="{B3288B1E-F6E5-1120-C76D-3E16011B2B07}"/>
+          </ac:spMkLst>
+        </pc:spChg>
+        <pc:spChg chg="mod">
+          <ac:chgData name="Raju Rayavarapu" userId="d72698f5c7d4af69" providerId="LiveId" clId="{B6D096D9-5D12-4270-91A6-2CABDC65E384}" dt="2024-08-12T00:44:49.188" v="659" actId="20577"/>
+          <ac:spMkLst>
+            <pc:docMk/>
+            <pc:sldMk cId="2551086154" sldId="259"/>
+            <ac:spMk id="34" creationId="{39F66580-BC56-3A02-80AE-8B1AE2C40CAE}"/>
+          </ac:spMkLst>
+        </pc:spChg>
+        <pc:spChg chg="mod">
+          <ac:chgData name="Raju Rayavarapu" userId="d72698f5c7d4af69" providerId="LiveId" clId="{B6D096D9-5D12-4270-91A6-2CABDC65E384}" dt="2024-08-12T00:44:46.798" v="657" actId="20577"/>
+          <ac:spMkLst>
+            <pc:docMk/>
+            <pc:sldMk cId="2551086154" sldId="259"/>
+            <ac:spMk id="35" creationId="{2CBAD7E7-F6DA-1B90-9564-5AFC6D3F7CE4}"/>
+          </ac:spMkLst>
+        </pc:spChg>
+        <pc:spChg chg="mod">
+          <ac:chgData name="Raju Rayavarapu" userId="d72698f5c7d4af69" providerId="LiveId" clId="{B6D096D9-5D12-4270-91A6-2CABDC65E384}" dt="2024-08-11T23:28:23.002" v="406" actId="1076"/>
+          <ac:spMkLst>
+            <pc:docMk/>
+            <pc:sldMk cId="2551086154" sldId="259"/>
+            <ac:spMk id="37" creationId="{025CB498-CB6A-4391-1DF5-E7133275309A}"/>
+          </ac:spMkLst>
+        </pc:spChg>
+        <pc:spChg chg="mod">
+          <ac:chgData name="Raju Rayavarapu" userId="d72698f5c7d4af69" providerId="LiveId" clId="{B6D096D9-5D12-4270-91A6-2CABDC65E384}" dt="2024-08-11T23:27:56.457" v="395" actId="20577"/>
+          <ac:spMkLst>
+            <pc:docMk/>
+            <pc:sldMk cId="2551086154" sldId="259"/>
+            <ac:spMk id="43" creationId="{DAFFB3EA-26A2-6C27-E8E4-DC2F55537F88}"/>
+          </ac:spMkLst>
+        </pc:spChg>
+        <pc:spChg chg="mod">
+          <ac:chgData name="Raju Rayavarapu" userId="d72698f5c7d4af69" providerId="LiveId" clId="{B6D096D9-5D12-4270-91A6-2CABDC65E384}" dt="2024-08-11T23:28:09.623" v="404" actId="20577"/>
+          <ac:spMkLst>
+            <pc:docMk/>
+            <pc:sldMk cId="2551086154" sldId="259"/>
+            <ac:spMk id="49" creationId="{29019D50-DC22-9D05-175A-713B58D72DB4}"/>
+          </ac:spMkLst>
+        </pc:spChg>
+        <pc:spChg chg="mod">
+          <ac:chgData name="Raju Rayavarapu" userId="d72698f5c7d4af69" providerId="LiveId" clId="{B6D096D9-5D12-4270-91A6-2CABDC65E384}" dt="2024-08-11T23:27:34.841" v="375" actId="20577"/>
+          <ac:spMkLst>
+            <pc:docMk/>
+            <pc:sldMk cId="2551086154" sldId="259"/>
+            <ac:spMk id="51" creationId="{6AFA9E76-8C98-C192-5844-781754A7A139}"/>
+          </ac:spMkLst>
+        </pc:spChg>
+      </pc:sldChg>
+      <pc:sldChg chg="modSp add mod">
+        <pc:chgData name="Raju Rayavarapu" userId="d72698f5c7d4af69" providerId="LiveId" clId="{B6D096D9-5D12-4270-91A6-2CABDC65E384}" dt="2024-08-12T02:25:57.714" v="1063" actId="20577"/>
+        <pc:sldMkLst>
+          <pc:docMk/>
+          <pc:sldMk cId="1834091052" sldId="260"/>
+        </pc:sldMkLst>
+        <pc:spChg chg="mod">
+          <ac:chgData name="Raju Rayavarapu" userId="d72698f5c7d4af69" providerId="LiveId" clId="{B6D096D9-5D12-4270-91A6-2CABDC65E384}" dt="2024-08-12T02:24:00.013" v="784" actId="20577"/>
+          <ac:spMkLst>
+            <pc:docMk/>
+            <pc:sldMk cId="1834091052" sldId="260"/>
+            <ac:spMk id="2" creationId="{5D35052D-B0F3-32BF-DD7E-B90AB0D41A23}"/>
+          </ac:spMkLst>
+        </pc:spChg>
+        <pc:spChg chg="mod">
+          <ac:chgData name="Raju Rayavarapu" userId="d72698f5c7d4af69" providerId="LiveId" clId="{B6D096D9-5D12-4270-91A6-2CABDC65E384}" dt="2024-08-12T02:24:39.544" v="957" actId="20577"/>
+          <ac:spMkLst>
+            <pc:docMk/>
+            <pc:sldMk cId="1834091052" sldId="260"/>
+            <ac:spMk id="3" creationId="{FC224A32-ACFC-4D94-F3D0-15C02D6C99B7}"/>
+          </ac:spMkLst>
+        </pc:spChg>
+        <pc:spChg chg="mod">
+          <ac:chgData name="Raju Rayavarapu" userId="d72698f5c7d4af69" providerId="LiveId" clId="{B6D096D9-5D12-4270-91A6-2CABDC65E384}" dt="2024-08-12T02:25:02.905" v="995" actId="20577"/>
+          <ac:spMkLst>
+            <pc:docMk/>
+            <pc:sldMk cId="1834091052" sldId="260"/>
+            <ac:spMk id="31" creationId="{B3288B1E-F6E5-1120-C76D-3E16011B2B07}"/>
+          </ac:spMkLst>
+        </pc:spChg>
+        <pc:spChg chg="mod">
+          <ac:chgData name="Raju Rayavarapu" userId="d72698f5c7d4af69" providerId="LiveId" clId="{B6D096D9-5D12-4270-91A6-2CABDC65E384}" dt="2024-08-12T02:25:44.260" v="1053" actId="20577"/>
+          <ac:spMkLst>
+            <pc:docMk/>
+            <pc:sldMk cId="1834091052" sldId="260"/>
+            <ac:spMk id="43" creationId="{DAFFB3EA-26A2-6C27-E8E4-DC2F55537F88}"/>
+          </ac:spMkLst>
+        </pc:spChg>
+        <pc:spChg chg="mod">
+          <ac:chgData name="Raju Rayavarapu" userId="d72698f5c7d4af69" providerId="LiveId" clId="{B6D096D9-5D12-4270-91A6-2CABDC65E384}" dt="2024-08-12T02:25:57.714" v="1063" actId="20577"/>
+          <ac:spMkLst>
+            <pc:docMk/>
+            <pc:sldMk cId="1834091052" sldId="260"/>
+            <ac:spMk id="49" creationId="{29019D50-DC22-9D05-175A-713B58D72DB4}"/>
+          </ac:spMkLst>
+        </pc:spChg>
+        <pc:spChg chg="mod">
+          <ac:chgData name="Raju Rayavarapu" userId="d72698f5c7d4af69" providerId="LiveId" clId="{B6D096D9-5D12-4270-91A6-2CABDC65E384}" dt="2024-08-12T02:25:17.145" v="1001" actId="20577"/>
+          <ac:spMkLst>
+            <pc:docMk/>
+            <pc:sldMk cId="1834091052" sldId="260"/>
+            <ac:spMk id="51" creationId="{6AFA9E76-8C98-C192-5844-781754A7A139}"/>
+          </ac:spMkLst>
+        </pc:spChg>
       </pc:sldChg>
     </pc:docChg>
   </pc:docChgLst>
@@ -3797,7 +3925,7 @@
           <a:p>
             <a:r>
               <a:rPr lang="en-US" dirty="0"/>
-              <a:t>The PDF Page Flow</a:t>
+              <a:t>The PDF Extraction Flow</a:t>
             </a:r>
           </a:p>
         </p:txBody>
@@ -5161,7 +5289,7 @@
         <p:spPr>
           <a:xfrm>
             <a:off x="9844021" y="1921851"/>
-            <a:ext cx="1793148" cy="738664"/>
+            <a:ext cx="1793148" cy="954107"/>
           </a:xfrm>
           <a:prstGeom prst="rect">
             <a:avLst/>
@@ -5197,8 +5325,13 @@
             </a:pPr>
             <a:r>
               <a:rPr lang="en-US" sz="1400" dirty="0"/>
-              <a:t>Tabula/Camelot</a:t>
-            </a:r>
+              <a:t>Tabula/ </a:t>
+            </a:r>
+            <a:r>
+              <a:rPr lang="en-US" sz="1400" dirty="0" err="1"/>
+              <a:t>pdfplumber</a:t>
+            </a:r>
+            <a:endParaRPr lang="en-US" sz="1400" dirty="0"/>
           </a:p>
           <a:p>
             <a:pPr marL="342900" indent="-342900">
@@ -5362,7 +5495,7 @@
         <p:spPr>
           <a:xfrm>
             <a:off x="7434056" y="4405337"/>
-            <a:ext cx="1793148" cy="523220"/>
+            <a:ext cx="1793148" cy="738664"/>
           </a:xfrm>
           <a:prstGeom prst="rect">
             <a:avLst/>
@@ -5398,8 +5531,13 @@
             </a:pPr>
             <a:r>
               <a:rPr lang="en-US" sz="1400" dirty="0"/>
-              <a:t>Tabula/Camelot</a:t>
-            </a:r>
+              <a:t>Tabula/ </a:t>
+            </a:r>
+            <a:r>
+              <a:rPr lang="en-US" sz="1400" dirty="0" err="1"/>
+              <a:t>pdfplumber</a:t>
+            </a:r>
+            <a:endParaRPr lang="en-US" sz="1400" dirty="0"/>
           </a:p>
         </p:txBody>
       </p:sp>
@@ -5552,7 +5690,7 @@
           <a:p>
             <a:r>
               <a:rPr lang="en-US" dirty="0"/>
-              <a:t>The PDF Data Flow</a:t>
+              <a:t>The PDF Extractor Choice Flow</a:t>
             </a:r>
           </a:p>
         </p:txBody>
@@ -6435,8 +6573,8 @@
         </p:nvSpPr>
         <p:spPr>
           <a:xfrm>
-            <a:off x="5143414" y="2028486"/>
-            <a:ext cx="1460024" cy="923330"/>
+            <a:off x="5202682" y="2117803"/>
+            <a:ext cx="1460024" cy="830997"/>
           </a:xfrm>
           <a:prstGeom prst="rect">
             <a:avLst/>
@@ -6451,8 +6589,8 @@
           <a:p>
             <a:pPr algn="ctr"/>
             <a:r>
-              <a:rPr lang="en-US" dirty="0"/>
-              <a:t>Does it contain tables?</a:t>
+              <a:rPr lang="en-US" sz="1600" dirty="0"/>
+              <a:t>Does speed of extraction matter?</a:t>
             </a:r>
           </a:p>
         </p:txBody>
@@ -6570,7 +6708,7 @@
             <a:pPr algn="ctr"/>
             <a:r>
               <a:rPr lang="en-US" dirty="0"/>
-              <a:t>Yes</a:t>
+              <a:t>No</a:t>
             </a:r>
           </a:p>
         </p:txBody>
@@ -6606,7 +6744,7 @@
             <a:pPr algn="ctr"/>
             <a:r>
               <a:rPr lang="en-US" dirty="0"/>
-              <a:t>No</a:t>
+              <a:t>Yes</a:t>
             </a:r>
           </a:p>
         </p:txBody>
@@ -6676,8 +6814,8 @@
         </p:nvSpPr>
         <p:spPr>
           <a:xfrm>
-            <a:off x="7553379" y="2037077"/>
-            <a:ext cx="1460024" cy="923330"/>
+            <a:off x="7628183" y="1974689"/>
+            <a:ext cx="1385220" cy="923330"/>
           </a:xfrm>
           <a:prstGeom prst="rect">
             <a:avLst/>
@@ -6693,7 +6831,7 @@
             <a:pPr algn="ctr"/>
             <a:r>
               <a:rPr lang="en-US" dirty="0"/>
-              <a:t>Does it contain Images?</a:t>
+              <a:t>Does it contain two columns?</a:t>
             </a:r>
           </a:p>
         </p:txBody>
@@ -6916,7 +7054,7 @@
         <p:spPr>
           <a:xfrm>
             <a:off x="9844021" y="1921851"/>
-            <a:ext cx="1793148" cy="738664"/>
+            <a:ext cx="1793148" cy="307777"/>
           </a:xfrm>
           <a:prstGeom prst="rect">
             <a:avLst/>
@@ -6933,35 +7071,8 @@
               <a:buAutoNum type="arabicParenR"/>
             </a:pPr>
             <a:r>
-              <a:rPr lang="en-US" sz="1400" dirty="0" err="1"/>
-              <a:t>PyPDF</a:t>
-            </a:r>
-            <a:r>
               <a:rPr lang="en-US" sz="1400" dirty="0"/>
-              <a:t>/</a:t>
-            </a:r>
-            <a:r>
-              <a:rPr lang="en-US" sz="1400" dirty="0" err="1"/>
-              <a:t>PyMuDF</a:t>
-            </a:r>
-            <a:endParaRPr lang="en-US" sz="1400" dirty="0"/>
-          </a:p>
-          <a:p>
-            <a:pPr marL="342900" indent="-342900">
-              <a:buAutoNum type="arabicParenR"/>
-            </a:pPr>
-            <a:r>
-              <a:rPr lang="en-US" sz="1400" dirty="0"/>
-              <a:t>Tabula/Camelot</a:t>
-            </a:r>
-          </a:p>
-          <a:p>
-            <a:pPr marL="342900" indent="-342900">
-              <a:buAutoNum type="arabicParenR"/>
-            </a:pPr>
-            <a:r>
-              <a:rPr lang="en-US" sz="1400" dirty="0"/>
-              <a:t>Tesseract</a:t>
+              <a:t>PyPDF2</a:t>
             </a:r>
           </a:p>
         </p:txBody>
@@ -7137,14 +7248,6 @@
               <a:rPr lang="en-US" sz="1400" dirty="0" err="1"/>
               <a:t>PyPDF</a:t>
             </a:r>
-            <a:r>
-              <a:rPr lang="en-US" sz="1400" dirty="0"/>
-              <a:t>/</a:t>
-            </a:r>
-            <a:r>
-              <a:rPr lang="en-US" sz="1400" dirty="0" err="1"/>
-              <a:t>PyMuDF</a:t>
-            </a:r>
             <a:endParaRPr lang="en-US" sz="1400" dirty="0"/>
           </a:p>
           <a:p>
@@ -7152,9 +7255,10 @@
               <a:buAutoNum type="arabicParenR"/>
             </a:pPr>
             <a:r>
-              <a:rPr lang="en-US" sz="1400" dirty="0"/>
-              <a:t>Tabula/Camelot</a:t>
-            </a:r>
+              <a:rPr lang="en-US" sz="1400" dirty="0" err="1"/>
+              <a:t>PyMuPDF</a:t>
+            </a:r>
+            <a:endParaRPr lang="en-US" sz="1400" dirty="0"/>
           </a:p>
         </p:txBody>
       </p:sp>
@@ -7240,17 +7344,53 @@
             </a:pPr>
             <a:r>
               <a:rPr lang="en-US" sz="1400" dirty="0" err="1"/>
+              <a:t>PyMuPDF</a:t>
+            </a:r>
+            <a:endParaRPr lang="en-US" sz="1400" dirty="0"/>
+          </a:p>
+        </p:txBody>
+      </p:sp>
+      <p:sp>
+        <p:nvSpPr>
+          <p:cNvPr id="3" name="TextBox 2">
+            <a:extLst>
+              <a:ext uri="{FF2B5EF4-FFF2-40B4-BE49-F238E27FC236}">
+                <a16:creationId xmlns:a16="http://schemas.microsoft.com/office/drawing/2014/main" id="{FC224A32-ACFC-4D94-F3D0-15C02D6C99B7}"/>
+              </a:ext>
+            </a:extLst>
+          </p:cNvPr>
+          <p:cNvSpPr txBox="1"/>
+          <p:nvPr/>
+        </p:nvSpPr>
+        <p:spPr>
+          <a:xfrm>
+            <a:off x="650182" y="5430505"/>
+            <a:ext cx="10432170" cy="338554"/>
+          </a:xfrm>
+          <a:prstGeom prst="rect">
+            <a:avLst/>
+          </a:prstGeom>
+          <a:noFill/>
+        </p:spPr>
+        <p:txBody>
+          <a:bodyPr wrap="square" rtlCol="0">
+            <a:spAutoFit/>
+          </a:bodyPr>
+          <a:lstStyle/>
+          <a:p>
+            <a:pPr algn="ctr"/>
+            <a:r>
+              <a:rPr lang="en-US" sz="1600" dirty="0"/>
+              <a:t>- Generally, </a:t>
+            </a:r>
+            <a:r>
+              <a:rPr lang="en-US" sz="1600" dirty="0" err="1"/>
               <a:t>PyPDF</a:t>
             </a:r>
             <a:r>
-              <a:rPr lang="en-US" sz="1400" dirty="0"/>
-              <a:t>/</a:t>
-            </a:r>
-            <a:r>
-              <a:rPr lang="en-US" sz="1400" dirty="0" err="1"/>
-              <a:t>PyMuDF</a:t>
-            </a:r>
-            <a:endParaRPr lang="en-US" sz="1400" dirty="0"/>
+              <a:rPr lang="en-US" sz="1600" dirty="0"/>
+              <a:t>/PyPDF2 is used across the board as it can be little better at handling funky PDF formatting. </a:t>
+            </a:r>
           </a:p>
         </p:txBody>
       </p:sp>
@@ -7258,6 +7398,1741 @@
     <p:extLst>
       <p:ext uri="{BB962C8B-B14F-4D97-AF65-F5344CB8AC3E}">
         <p14:creationId xmlns:p14="http://schemas.microsoft.com/office/powerpoint/2010/main" val="2551086154"/>
+      </p:ext>
+    </p:extLst>
+  </p:cSld>
+  <p:clrMapOvr>
+    <a:masterClrMapping/>
+  </p:clrMapOvr>
+</p:sld>
+</file>
+
+<file path=ppt/slides/slide5.xml><?xml version="1.0" encoding="utf-8"?>
+<p:sld xmlns:a="http://schemas.openxmlformats.org/drawingml/2006/main" xmlns:r="http://schemas.openxmlformats.org/officeDocument/2006/relationships" xmlns:p="http://schemas.openxmlformats.org/presentationml/2006/main">
+  <p:cSld>
+    <p:spTree>
+      <p:nvGrpSpPr>
+        <p:cNvPr id="1" name=""/>
+        <p:cNvGrpSpPr/>
+        <p:nvPr/>
+      </p:nvGrpSpPr>
+      <p:grpSpPr>
+        <a:xfrm>
+          <a:off x="0" y="0"/>
+          <a:ext cx="0" cy="0"/>
+          <a:chOff x="0" y="0"/>
+          <a:chExt cx="0" cy="0"/>
+        </a:xfrm>
+      </p:grpSpPr>
+      <p:sp>
+        <p:nvSpPr>
+          <p:cNvPr id="2" name="Title 1">
+            <a:extLst>
+              <a:ext uri="{FF2B5EF4-FFF2-40B4-BE49-F238E27FC236}">
+                <a16:creationId xmlns:a16="http://schemas.microsoft.com/office/drawing/2014/main" id="{5D35052D-B0F3-32BF-DD7E-B90AB0D41A23}"/>
+              </a:ext>
+            </a:extLst>
+          </p:cNvPr>
+          <p:cNvSpPr>
+            <a:spLocks noGrp="1"/>
+          </p:cNvSpPr>
+          <p:nvPr>
+            <p:ph type="title"/>
+          </p:nvPr>
+        </p:nvSpPr>
+        <p:spPr/>
+        <p:txBody>
+          <a:bodyPr/>
+          <a:lstStyle/>
+          <a:p>
+            <a:r>
+              <a:rPr lang="en-US" dirty="0"/>
+              <a:t>The PDF Table Extractor Choice Flow</a:t>
+            </a:r>
+          </a:p>
+        </p:txBody>
+      </p:sp>
+      <p:grpSp>
+        <p:nvGrpSpPr>
+          <p:cNvPr id="25" name="Group 24">
+            <a:extLst>
+              <a:ext uri="{FF2B5EF4-FFF2-40B4-BE49-F238E27FC236}">
+                <a16:creationId xmlns:a16="http://schemas.microsoft.com/office/drawing/2014/main" id="{6D98842C-7E35-A429-647B-9EBE55404137}"/>
+              </a:ext>
+            </a:extLst>
+          </p:cNvPr>
+          <p:cNvGrpSpPr/>
+          <p:nvPr/>
+        </p:nvGrpSpPr>
+        <p:grpSpPr>
+          <a:xfrm>
+            <a:off x="751148" y="1976086"/>
+            <a:ext cx="776943" cy="920537"/>
+            <a:chOff x="751148" y="1976086"/>
+            <a:chExt cx="776943" cy="920537"/>
+          </a:xfrm>
+        </p:grpSpPr>
+        <p:sp>
+          <p:nvSpPr>
+            <p:cNvPr id="4" name="Rectangle 3">
+              <a:extLst>
+                <a:ext uri="{FF2B5EF4-FFF2-40B4-BE49-F238E27FC236}">
+                  <a16:creationId xmlns:a16="http://schemas.microsoft.com/office/drawing/2014/main" id="{F18140EF-C289-BE52-E96B-E22062E2B818}"/>
+                </a:ext>
+              </a:extLst>
+            </p:cNvPr>
+            <p:cNvSpPr/>
+            <p:nvPr/>
+          </p:nvSpPr>
+          <p:spPr>
+            <a:xfrm>
+              <a:off x="754840" y="1976086"/>
+              <a:ext cx="773251" cy="920537"/>
+            </a:xfrm>
+            <a:prstGeom prst="rect">
+              <a:avLst/>
+            </a:prstGeom>
+            <a:noFill/>
+          </p:spPr>
+          <p:style>
+            <a:lnRef idx="2">
+              <a:schemeClr val="accent1">
+                <a:shade val="15000"/>
+              </a:schemeClr>
+            </a:lnRef>
+            <a:fillRef idx="1">
+              <a:schemeClr val="accent1"/>
+            </a:fillRef>
+            <a:effectRef idx="0">
+              <a:schemeClr val="accent1"/>
+            </a:effectRef>
+            <a:fontRef idx="minor">
+              <a:schemeClr val="lt1"/>
+            </a:fontRef>
+          </p:style>
+          <p:txBody>
+            <a:bodyPr rtlCol="0" anchor="ctr"/>
+            <a:lstStyle/>
+            <a:p>
+              <a:pPr algn="ctr"/>
+              <a:endParaRPr lang="en-US"/>
+            </a:p>
+          </p:txBody>
+        </p:sp>
+        <p:cxnSp>
+          <p:nvCxnSpPr>
+            <p:cNvPr id="6" name="Straight Connector 5">
+              <a:extLst>
+                <a:ext uri="{FF2B5EF4-FFF2-40B4-BE49-F238E27FC236}">
+                  <a16:creationId xmlns:a16="http://schemas.microsoft.com/office/drawing/2014/main" id="{8C46865D-AE25-1393-0FC5-EF3FDB0D5155}"/>
+                </a:ext>
+              </a:extLst>
+            </p:cNvPr>
+            <p:cNvCxnSpPr>
+              <a:cxnSpLocks/>
+            </p:cNvCxnSpPr>
+            <p:nvPr/>
+          </p:nvCxnSpPr>
+          <p:spPr>
+            <a:xfrm>
+              <a:off x="871441" y="2061109"/>
+              <a:ext cx="540048" cy="0"/>
+            </a:xfrm>
+            <a:prstGeom prst="line">
+              <a:avLst/>
+            </a:prstGeom>
+          </p:spPr>
+          <p:style>
+            <a:lnRef idx="2">
+              <a:schemeClr val="accent1"/>
+            </a:lnRef>
+            <a:fillRef idx="0">
+              <a:schemeClr val="accent1"/>
+            </a:fillRef>
+            <a:effectRef idx="1">
+              <a:schemeClr val="accent1"/>
+            </a:effectRef>
+            <a:fontRef idx="minor">
+              <a:schemeClr val="tx1"/>
+            </a:fontRef>
+          </p:style>
+        </p:cxnSp>
+        <p:cxnSp>
+          <p:nvCxnSpPr>
+            <p:cNvPr id="8" name="Straight Connector 7">
+              <a:extLst>
+                <a:ext uri="{FF2B5EF4-FFF2-40B4-BE49-F238E27FC236}">
+                  <a16:creationId xmlns:a16="http://schemas.microsoft.com/office/drawing/2014/main" id="{58541D3B-53E8-499D-C1F7-1DC4EBDD489F}"/>
+                </a:ext>
+              </a:extLst>
+            </p:cNvPr>
+            <p:cNvCxnSpPr>
+              <a:cxnSpLocks/>
+            </p:cNvCxnSpPr>
+            <p:nvPr/>
+          </p:nvCxnSpPr>
+          <p:spPr>
+            <a:xfrm>
+              <a:off x="871441" y="2154771"/>
+              <a:ext cx="540048" cy="0"/>
+            </a:xfrm>
+            <a:prstGeom prst="line">
+              <a:avLst/>
+            </a:prstGeom>
+          </p:spPr>
+          <p:style>
+            <a:lnRef idx="2">
+              <a:schemeClr val="accent1"/>
+            </a:lnRef>
+            <a:fillRef idx="0">
+              <a:schemeClr val="accent1"/>
+            </a:fillRef>
+            <a:effectRef idx="1">
+              <a:schemeClr val="accent1"/>
+            </a:effectRef>
+            <a:fontRef idx="minor">
+              <a:schemeClr val="tx1"/>
+            </a:fontRef>
+          </p:style>
+        </p:cxnSp>
+        <p:cxnSp>
+          <p:nvCxnSpPr>
+            <p:cNvPr id="9" name="Straight Connector 8">
+              <a:extLst>
+                <a:ext uri="{FF2B5EF4-FFF2-40B4-BE49-F238E27FC236}">
+                  <a16:creationId xmlns:a16="http://schemas.microsoft.com/office/drawing/2014/main" id="{C498810E-CFB9-513A-6FE0-14F44C845A52}"/>
+                </a:ext>
+              </a:extLst>
+            </p:cNvPr>
+            <p:cNvCxnSpPr>
+              <a:cxnSpLocks/>
+            </p:cNvCxnSpPr>
+            <p:nvPr/>
+          </p:nvCxnSpPr>
+          <p:spPr>
+            <a:xfrm>
+              <a:off x="874614" y="2246846"/>
+              <a:ext cx="540048" cy="0"/>
+            </a:xfrm>
+            <a:prstGeom prst="line">
+              <a:avLst/>
+            </a:prstGeom>
+          </p:spPr>
+          <p:style>
+            <a:lnRef idx="2">
+              <a:schemeClr val="accent1"/>
+            </a:lnRef>
+            <a:fillRef idx="0">
+              <a:schemeClr val="accent1"/>
+            </a:fillRef>
+            <a:effectRef idx="1">
+              <a:schemeClr val="accent1"/>
+            </a:effectRef>
+            <a:fontRef idx="minor">
+              <a:schemeClr val="tx1"/>
+            </a:fontRef>
+          </p:style>
+        </p:cxnSp>
+        <p:cxnSp>
+          <p:nvCxnSpPr>
+            <p:cNvPr id="10" name="Straight Connector 9">
+              <a:extLst>
+                <a:ext uri="{FF2B5EF4-FFF2-40B4-BE49-F238E27FC236}">
+                  <a16:creationId xmlns:a16="http://schemas.microsoft.com/office/drawing/2014/main" id="{9DAECB26-B7ED-D771-5070-6B4A432155E7}"/>
+                </a:ext>
+              </a:extLst>
+            </p:cNvPr>
+            <p:cNvCxnSpPr>
+              <a:cxnSpLocks/>
+            </p:cNvCxnSpPr>
+            <p:nvPr/>
+          </p:nvCxnSpPr>
+          <p:spPr>
+            <a:xfrm>
+              <a:off x="876202" y="2348446"/>
+              <a:ext cx="540048" cy="0"/>
+            </a:xfrm>
+            <a:prstGeom prst="line">
+              <a:avLst/>
+            </a:prstGeom>
+          </p:spPr>
+          <p:style>
+            <a:lnRef idx="2">
+              <a:schemeClr val="accent1"/>
+            </a:lnRef>
+            <a:fillRef idx="0">
+              <a:schemeClr val="accent1"/>
+            </a:fillRef>
+            <a:effectRef idx="1">
+              <a:schemeClr val="accent1"/>
+            </a:effectRef>
+            <a:fontRef idx="minor">
+              <a:schemeClr val="tx1"/>
+            </a:fontRef>
+          </p:style>
+        </p:cxnSp>
+        <p:pic>
+          <p:nvPicPr>
+            <p:cNvPr id="15" name="Graphic 14" descr="Unicorn">
+              <a:extLst>
+                <a:ext uri="{FF2B5EF4-FFF2-40B4-BE49-F238E27FC236}">
+                  <a16:creationId xmlns:a16="http://schemas.microsoft.com/office/drawing/2014/main" id="{F89D9CE4-C0A5-6471-5D55-F3A90902B373}"/>
+                </a:ext>
+              </a:extLst>
+            </p:cNvPr>
+            <p:cNvPicPr>
+              <a:picLocks noChangeAspect="1"/>
+            </p:cNvPicPr>
+            <p:nvPr/>
+          </p:nvPicPr>
+          <p:blipFill>
+            <a:blip r:embed="rId2">
+              <a:extLst>
+                <a:ext uri="{96DAC541-7B7A-43D3-8B79-37D633B846F1}">
+                  <asvg:svgBlip xmlns:asvg="http://schemas.microsoft.com/office/drawing/2016/SVG/main" r:embed="rId3"/>
+                </a:ext>
+              </a:extLst>
+            </a:blip>
+            <a:stretch>
+              <a:fillRect/>
+            </a:stretch>
+          </p:blipFill>
+          <p:spPr>
+            <a:xfrm>
+              <a:off x="751148" y="2361538"/>
+              <a:ext cx="392646" cy="392646"/>
+            </a:xfrm>
+            <a:prstGeom prst="rect">
+              <a:avLst/>
+            </a:prstGeom>
+          </p:spPr>
+        </p:pic>
+        <p:cxnSp>
+          <p:nvCxnSpPr>
+            <p:cNvPr id="16" name="Straight Connector 15">
+              <a:extLst>
+                <a:ext uri="{FF2B5EF4-FFF2-40B4-BE49-F238E27FC236}">
+                  <a16:creationId xmlns:a16="http://schemas.microsoft.com/office/drawing/2014/main" id="{B4FB91DB-31BC-4E73-E6FC-618D676E1EF1}"/>
+                </a:ext>
+              </a:extLst>
+            </p:cNvPr>
+            <p:cNvCxnSpPr>
+              <a:cxnSpLocks/>
+            </p:cNvCxnSpPr>
+            <p:nvPr/>
+          </p:nvCxnSpPr>
+          <p:spPr>
+            <a:xfrm>
+              <a:off x="790042" y="2737383"/>
+              <a:ext cx="314858" cy="0"/>
+            </a:xfrm>
+            <a:prstGeom prst="line">
+              <a:avLst/>
+            </a:prstGeom>
+          </p:spPr>
+          <p:style>
+            <a:lnRef idx="2">
+              <a:schemeClr val="accent1"/>
+            </a:lnRef>
+            <a:fillRef idx="0">
+              <a:schemeClr val="accent1"/>
+            </a:fillRef>
+            <a:effectRef idx="1">
+              <a:schemeClr val="accent1"/>
+            </a:effectRef>
+            <a:fontRef idx="minor">
+              <a:schemeClr val="tx1"/>
+            </a:fontRef>
+          </p:style>
+        </p:cxnSp>
+        <p:cxnSp>
+          <p:nvCxnSpPr>
+            <p:cNvPr id="18" name="Straight Connector 17">
+              <a:extLst>
+                <a:ext uri="{FF2B5EF4-FFF2-40B4-BE49-F238E27FC236}">
+                  <a16:creationId xmlns:a16="http://schemas.microsoft.com/office/drawing/2014/main" id="{6B4E4592-8A53-ACED-8478-2F026AE33404}"/>
+                </a:ext>
+              </a:extLst>
+            </p:cNvPr>
+            <p:cNvCxnSpPr>
+              <a:cxnSpLocks/>
+            </p:cNvCxnSpPr>
+            <p:nvPr/>
+          </p:nvCxnSpPr>
+          <p:spPr>
+            <a:xfrm>
+              <a:off x="1190358" y="2557861"/>
+              <a:ext cx="260214" cy="0"/>
+            </a:xfrm>
+            <a:prstGeom prst="line">
+              <a:avLst/>
+            </a:prstGeom>
+          </p:spPr>
+          <p:style>
+            <a:lnRef idx="2">
+              <a:schemeClr val="accent1"/>
+            </a:lnRef>
+            <a:fillRef idx="0">
+              <a:schemeClr val="accent1"/>
+            </a:fillRef>
+            <a:effectRef idx="1">
+              <a:schemeClr val="accent1"/>
+            </a:effectRef>
+            <a:fontRef idx="minor">
+              <a:schemeClr val="tx1"/>
+            </a:fontRef>
+          </p:style>
+        </p:cxnSp>
+        <p:cxnSp>
+          <p:nvCxnSpPr>
+            <p:cNvPr id="19" name="Straight Connector 18">
+              <a:extLst>
+                <a:ext uri="{FF2B5EF4-FFF2-40B4-BE49-F238E27FC236}">
+                  <a16:creationId xmlns:a16="http://schemas.microsoft.com/office/drawing/2014/main" id="{CDF49319-D158-BAD5-AB67-2BA9C6303A91}"/>
+                </a:ext>
+              </a:extLst>
+            </p:cNvPr>
+            <p:cNvCxnSpPr>
+              <a:cxnSpLocks/>
+            </p:cNvCxnSpPr>
+            <p:nvPr/>
+          </p:nvCxnSpPr>
+          <p:spPr>
+            <a:xfrm>
+              <a:off x="1312124" y="2452664"/>
+              <a:ext cx="0" cy="392517"/>
+            </a:xfrm>
+            <a:prstGeom prst="line">
+              <a:avLst/>
+            </a:prstGeom>
+          </p:spPr>
+          <p:style>
+            <a:lnRef idx="2">
+              <a:schemeClr val="accent1"/>
+            </a:lnRef>
+            <a:fillRef idx="0">
+              <a:schemeClr val="accent1"/>
+            </a:fillRef>
+            <a:effectRef idx="1">
+              <a:schemeClr val="accent1"/>
+            </a:effectRef>
+            <a:fontRef idx="minor">
+              <a:schemeClr val="tx1"/>
+            </a:fontRef>
+          </p:style>
+        </p:cxnSp>
+        <p:sp>
+          <p:nvSpPr>
+            <p:cNvPr id="13" name="Rectangle 12">
+              <a:extLst>
+                <a:ext uri="{FF2B5EF4-FFF2-40B4-BE49-F238E27FC236}">
+                  <a16:creationId xmlns:a16="http://schemas.microsoft.com/office/drawing/2014/main" id="{D3837663-D65A-DADF-D43B-92AF84E8B7A4}"/>
+                </a:ext>
+              </a:extLst>
+            </p:cNvPr>
+            <p:cNvSpPr/>
+            <p:nvPr/>
+          </p:nvSpPr>
+          <p:spPr>
+            <a:xfrm>
+              <a:off x="1182688" y="2456215"/>
+              <a:ext cx="272378" cy="397545"/>
+            </a:xfrm>
+            <a:prstGeom prst="rect">
+              <a:avLst/>
+            </a:prstGeom>
+            <a:noFill/>
+          </p:spPr>
+          <p:style>
+            <a:lnRef idx="2">
+              <a:schemeClr val="accent1">
+                <a:shade val="15000"/>
+              </a:schemeClr>
+            </a:lnRef>
+            <a:fillRef idx="1">
+              <a:schemeClr val="accent1"/>
+            </a:fillRef>
+            <a:effectRef idx="0">
+              <a:schemeClr val="accent1"/>
+            </a:effectRef>
+            <a:fontRef idx="minor">
+              <a:schemeClr val="lt1"/>
+            </a:fontRef>
+          </p:style>
+          <p:txBody>
+            <a:bodyPr rtlCol="0" anchor="ctr"/>
+            <a:lstStyle/>
+            <a:p>
+              <a:pPr algn="ctr"/>
+              <a:endParaRPr lang="en-US"/>
+            </a:p>
+          </p:txBody>
+        </p:sp>
+        <p:cxnSp>
+          <p:nvCxnSpPr>
+            <p:cNvPr id="22" name="Straight Connector 21">
+              <a:extLst>
+                <a:ext uri="{FF2B5EF4-FFF2-40B4-BE49-F238E27FC236}">
+                  <a16:creationId xmlns:a16="http://schemas.microsoft.com/office/drawing/2014/main" id="{957F016F-E5AB-B5A0-E9F1-04593C8AB97B}"/>
+                </a:ext>
+              </a:extLst>
+            </p:cNvPr>
+            <p:cNvCxnSpPr>
+              <a:cxnSpLocks/>
+            </p:cNvCxnSpPr>
+            <p:nvPr/>
+          </p:nvCxnSpPr>
+          <p:spPr>
+            <a:xfrm>
+              <a:off x="1190358" y="2626124"/>
+              <a:ext cx="260214" cy="0"/>
+            </a:xfrm>
+            <a:prstGeom prst="line">
+              <a:avLst/>
+            </a:prstGeom>
+          </p:spPr>
+          <p:style>
+            <a:lnRef idx="2">
+              <a:schemeClr val="accent1"/>
+            </a:lnRef>
+            <a:fillRef idx="0">
+              <a:schemeClr val="accent1"/>
+            </a:fillRef>
+            <a:effectRef idx="1">
+              <a:schemeClr val="accent1"/>
+            </a:effectRef>
+            <a:fontRef idx="minor">
+              <a:schemeClr val="tx1"/>
+            </a:fontRef>
+          </p:style>
+        </p:cxnSp>
+        <p:cxnSp>
+          <p:nvCxnSpPr>
+            <p:cNvPr id="23" name="Straight Connector 22">
+              <a:extLst>
+                <a:ext uri="{FF2B5EF4-FFF2-40B4-BE49-F238E27FC236}">
+                  <a16:creationId xmlns:a16="http://schemas.microsoft.com/office/drawing/2014/main" id="{82A56E81-A132-A4D3-AA66-AD5B12BD3B48}"/>
+                </a:ext>
+              </a:extLst>
+            </p:cNvPr>
+            <p:cNvCxnSpPr>
+              <a:cxnSpLocks/>
+            </p:cNvCxnSpPr>
+            <p:nvPr/>
+          </p:nvCxnSpPr>
+          <p:spPr>
+            <a:xfrm>
+              <a:off x="1190358" y="2702324"/>
+              <a:ext cx="260214" cy="0"/>
+            </a:xfrm>
+            <a:prstGeom prst="line">
+              <a:avLst/>
+            </a:prstGeom>
+          </p:spPr>
+          <p:style>
+            <a:lnRef idx="2">
+              <a:schemeClr val="accent1"/>
+            </a:lnRef>
+            <a:fillRef idx="0">
+              <a:schemeClr val="accent1"/>
+            </a:fillRef>
+            <a:effectRef idx="1">
+              <a:schemeClr val="accent1"/>
+            </a:effectRef>
+            <a:fontRef idx="minor">
+              <a:schemeClr val="tx1"/>
+            </a:fontRef>
+          </p:style>
+        </p:cxnSp>
+        <p:cxnSp>
+          <p:nvCxnSpPr>
+            <p:cNvPr id="24" name="Straight Connector 23">
+              <a:extLst>
+                <a:ext uri="{FF2B5EF4-FFF2-40B4-BE49-F238E27FC236}">
+                  <a16:creationId xmlns:a16="http://schemas.microsoft.com/office/drawing/2014/main" id="{DD9D59DA-F1B0-F104-2A33-8F1E36BE0D15}"/>
+                </a:ext>
+              </a:extLst>
+            </p:cNvPr>
+            <p:cNvCxnSpPr>
+              <a:cxnSpLocks/>
+            </p:cNvCxnSpPr>
+            <p:nvPr/>
+          </p:nvCxnSpPr>
+          <p:spPr>
+            <a:xfrm>
+              <a:off x="1190358" y="2770587"/>
+              <a:ext cx="260214" cy="0"/>
+            </a:xfrm>
+            <a:prstGeom prst="line">
+              <a:avLst/>
+            </a:prstGeom>
+          </p:spPr>
+          <p:style>
+            <a:lnRef idx="2">
+              <a:schemeClr val="accent1"/>
+            </a:lnRef>
+            <a:fillRef idx="0">
+              <a:schemeClr val="accent1"/>
+            </a:fillRef>
+            <a:effectRef idx="1">
+              <a:schemeClr val="accent1"/>
+            </a:effectRef>
+            <a:fontRef idx="minor">
+              <a:schemeClr val="tx1"/>
+            </a:fontRef>
+          </p:style>
+        </p:cxnSp>
+      </p:grpSp>
+      <p:cxnSp>
+        <p:nvCxnSpPr>
+          <p:cNvPr id="5" name="Straight Arrow Connector 4">
+            <a:extLst>
+              <a:ext uri="{FF2B5EF4-FFF2-40B4-BE49-F238E27FC236}">
+                <a16:creationId xmlns:a16="http://schemas.microsoft.com/office/drawing/2014/main" id="{C2D3E783-AE59-DB74-6D7F-A205DE1950F9}"/>
+              </a:ext>
+            </a:extLst>
+          </p:cNvPr>
+          <p:cNvCxnSpPr>
+            <a:cxnSpLocks/>
+          </p:cNvCxnSpPr>
+          <p:nvPr/>
+        </p:nvCxnSpPr>
+        <p:spPr>
+          <a:xfrm>
+            <a:off x="1601734" y="2452664"/>
+            <a:ext cx="1031002" cy="0"/>
+          </a:xfrm>
+          <a:prstGeom prst="straightConnector1">
+            <a:avLst/>
+          </a:prstGeom>
+          <a:ln>
+            <a:tailEnd type="triangle"/>
+          </a:ln>
+        </p:spPr>
+        <p:style>
+          <a:lnRef idx="2">
+            <a:schemeClr val="accent1"/>
+          </a:lnRef>
+          <a:fillRef idx="0">
+            <a:schemeClr val="accent1"/>
+          </a:fillRef>
+          <a:effectRef idx="1">
+            <a:schemeClr val="accent1"/>
+          </a:effectRef>
+          <a:fontRef idx="minor">
+            <a:schemeClr val="tx1"/>
+          </a:fontRef>
+        </p:style>
+      </p:cxnSp>
+      <p:sp>
+        <p:nvSpPr>
+          <p:cNvPr id="12" name="Rectangle 11">
+            <a:extLst>
+              <a:ext uri="{FF2B5EF4-FFF2-40B4-BE49-F238E27FC236}">
+                <a16:creationId xmlns:a16="http://schemas.microsoft.com/office/drawing/2014/main" id="{1D96362B-FF15-3E18-C7DD-C2B8BA9025C2}"/>
+              </a:ext>
+            </a:extLst>
+          </p:cNvPr>
+          <p:cNvSpPr>
+            <a:spLocks noChangeAspect="1"/>
+          </p:cNvSpPr>
+          <p:nvPr/>
+        </p:nvSpPr>
+        <p:spPr>
+          <a:xfrm rot="18944431">
+            <a:off x="2874737" y="1868254"/>
+            <a:ext cx="1168817" cy="1168817"/>
+          </a:xfrm>
+          <a:prstGeom prst="rect">
+            <a:avLst/>
+          </a:prstGeom>
+          <a:solidFill>
+            <a:schemeClr val="bg1"/>
+          </a:solidFill>
+        </p:spPr>
+        <p:style>
+          <a:lnRef idx="2">
+            <a:schemeClr val="accent1">
+              <a:shade val="15000"/>
+            </a:schemeClr>
+          </a:lnRef>
+          <a:fillRef idx="1">
+            <a:schemeClr val="accent1"/>
+          </a:fillRef>
+          <a:effectRef idx="0">
+            <a:schemeClr val="accent1"/>
+          </a:effectRef>
+          <a:fontRef idx="minor">
+            <a:schemeClr val="lt1"/>
+          </a:fontRef>
+        </p:style>
+        <p:txBody>
+          <a:bodyPr rtlCol="0" anchor="ctr"/>
+          <a:lstStyle/>
+          <a:p>
+            <a:pPr algn="ctr"/>
+            <a:endParaRPr lang="en-US"/>
+          </a:p>
+        </p:txBody>
+      </p:sp>
+      <p:sp>
+        <p:nvSpPr>
+          <p:cNvPr id="14" name="TextBox 13">
+            <a:extLst>
+              <a:ext uri="{FF2B5EF4-FFF2-40B4-BE49-F238E27FC236}">
+                <a16:creationId xmlns:a16="http://schemas.microsoft.com/office/drawing/2014/main" id="{401260A8-F25D-C16A-1236-812491A942F1}"/>
+              </a:ext>
+            </a:extLst>
+          </p:cNvPr>
+          <p:cNvSpPr txBox="1"/>
+          <p:nvPr/>
+        </p:nvSpPr>
+        <p:spPr>
+          <a:xfrm>
+            <a:off x="2759989" y="2173452"/>
+            <a:ext cx="1460024" cy="646331"/>
+          </a:xfrm>
+          <a:prstGeom prst="rect">
+            <a:avLst/>
+          </a:prstGeom>
+          <a:noFill/>
+        </p:spPr>
+        <p:txBody>
+          <a:bodyPr wrap="square" rtlCol="0">
+            <a:spAutoFit/>
+          </a:bodyPr>
+          <a:lstStyle/>
+          <a:p>
+            <a:pPr algn="ctr"/>
+            <a:r>
+              <a:rPr lang="en-US" dirty="0"/>
+              <a:t>Is it machine readable? </a:t>
+            </a:r>
+          </a:p>
+        </p:txBody>
+      </p:sp>
+      <p:cxnSp>
+        <p:nvCxnSpPr>
+          <p:cNvPr id="17" name="Straight Arrow Connector 16">
+            <a:extLst>
+              <a:ext uri="{FF2B5EF4-FFF2-40B4-BE49-F238E27FC236}">
+                <a16:creationId xmlns:a16="http://schemas.microsoft.com/office/drawing/2014/main" id="{B7793141-5B39-608A-873F-42DD23626518}"/>
+              </a:ext>
+            </a:extLst>
+          </p:cNvPr>
+          <p:cNvCxnSpPr>
+            <a:cxnSpLocks/>
+          </p:cNvCxnSpPr>
+          <p:nvPr/>
+        </p:nvCxnSpPr>
+        <p:spPr>
+          <a:xfrm>
+            <a:off x="3440290" y="3279072"/>
+            <a:ext cx="0" cy="728572"/>
+          </a:xfrm>
+          <a:prstGeom prst="straightConnector1">
+            <a:avLst/>
+          </a:prstGeom>
+          <a:ln>
+            <a:tailEnd type="triangle"/>
+          </a:ln>
+        </p:spPr>
+        <p:style>
+          <a:lnRef idx="2">
+            <a:schemeClr val="accent1"/>
+          </a:lnRef>
+          <a:fillRef idx="0">
+            <a:schemeClr val="accent1"/>
+          </a:fillRef>
+          <a:effectRef idx="1">
+            <a:schemeClr val="accent1"/>
+          </a:effectRef>
+          <a:fontRef idx="minor">
+            <a:schemeClr val="tx1"/>
+          </a:fontRef>
+        </p:style>
+      </p:cxnSp>
+      <p:cxnSp>
+        <p:nvCxnSpPr>
+          <p:cNvPr id="21" name="Straight Arrow Connector 20">
+            <a:extLst>
+              <a:ext uri="{FF2B5EF4-FFF2-40B4-BE49-F238E27FC236}">
+                <a16:creationId xmlns:a16="http://schemas.microsoft.com/office/drawing/2014/main" id="{59FA3ECE-116C-24EE-3D00-9F271091C97A}"/>
+              </a:ext>
+            </a:extLst>
+          </p:cNvPr>
+          <p:cNvCxnSpPr>
+            <a:cxnSpLocks/>
+          </p:cNvCxnSpPr>
+          <p:nvPr/>
+        </p:nvCxnSpPr>
+        <p:spPr>
+          <a:xfrm>
+            <a:off x="4285555" y="2452663"/>
+            <a:ext cx="765076" cy="1"/>
+          </a:xfrm>
+          <a:prstGeom prst="straightConnector1">
+            <a:avLst/>
+          </a:prstGeom>
+          <a:ln>
+            <a:tailEnd type="triangle"/>
+          </a:ln>
+        </p:spPr>
+        <p:style>
+          <a:lnRef idx="2">
+            <a:schemeClr val="accent1"/>
+          </a:lnRef>
+          <a:fillRef idx="0">
+            <a:schemeClr val="accent1"/>
+          </a:fillRef>
+          <a:effectRef idx="1">
+            <a:schemeClr val="accent1"/>
+          </a:effectRef>
+          <a:fontRef idx="minor">
+            <a:schemeClr val="tx1"/>
+          </a:fontRef>
+        </p:style>
+      </p:cxnSp>
+      <p:sp>
+        <p:nvSpPr>
+          <p:cNvPr id="26" name="TextBox 25">
+            <a:extLst>
+              <a:ext uri="{FF2B5EF4-FFF2-40B4-BE49-F238E27FC236}">
+                <a16:creationId xmlns:a16="http://schemas.microsoft.com/office/drawing/2014/main" id="{4166D07B-E436-BD8D-3671-B21006602114}"/>
+              </a:ext>
+            </a:extLst>
+          </p:cNvPr>
+          <p:cNvSpPr txBox="1"/>
+          <p:nvPr/>
+        </p:nvSpPr>
+        <p:spPr>
+          <a:xfrm>
+            <a:off x="4220013" y="2148586"/>
+            <a:ext cx="780612" cy="369332"/>
+          </a:xfrm>
+          <a:prstGeom prst="rect">
+            <a:avLst/>
+          </a:prstGeom>
+          <a:noFill/>
+        </p:spPr>
+        <p:txBody>
+          <a:bodyPr wrap="square" rtlCol="0">
+            <a:spAutoFit/>
+          </a:bodyPr>
+          <a:lstStyle/>
+          <a:p>
+            <a:pPr algn="ctr"/>
+            <a:r>
+              <a:rPr lang="en-US" dirty="0"/>
+              <a:t>Yes</a:t>
+            </a:r>
+          </a:p>
+        </p:txBody>
+      </p:sp>
+      <p:sp>
+        <p:nvSpPr>
+          <p:cNvPr id="27" name="TextBox 26">
+            <a:extLst>
+              <a:ext uri="{FF2B5EF4-FFF2-40B4-BE49-F238E27FC236}">
+                <a16:creationId xmlns:a16="http://schemas.microsoft.com/office/drawing/2014/main" id="{F1FA706A-98C7-B7F4-2A73-DC740F229D06}"/>
+              </a:ext>
+            </a:extLst>
+          </p:cNvPr>
+          <p:cNvSpPr txBox="1"/>
+          <p:nvPr/>
+        </p:nvSpPr>
+        <p:spPr>
+          <a:xfrm rot="5400000">
+            <a:off x="3169128" y="3436105"/>
+            <a:ext cx="834663" cy="369332"/>
+          </a:xfrm>
+          <a:prstGeom prst="rect">
+            <a:avLst/>
+          </a:prstGeom>
+          <a:noFill/>
+        </p:spPr>
+        <p:txBody>
+          <a:bodyPr wrap="square" rtlCol="0">
+            <a:spAutoFit/>
+          </a:bodyPr>
+          <a:lstStyle/>
+          <a:p>
+            <a:pPr algn="ctr"/>
+            <a:r>
+              <a:rPr lang="en-US" dirty="0"/>
+              <a:t>No</a:t>
+            </a:r>
+          </a:p>
+        </p:txBody>
+      </p:sp>
+      <p:sp>
+        <p:nvSpPr>
+          <p:cNvPr id="30" name="Rectangle 29">
+            <a:extLst>
+              <a:ext uri="{FF2B5EF4-FFF2-40B4-BE49-F238E27FC236}">
+                <a16:creationId xmlns:a16="http://schemas.microsoft.com/office/drawing/2014/main" id="{A4B900D9-D74B-11E5-4C62-62544E30A819}"/>
+              </a:ext>
+            </a:extLst>
+          </p:cNvPr>
+          <p:cNvSpPr>
+            <a:spLocks noChangeAspect="1"/>
+          </p:cNvSpPr>
+          <p:nvPr/>
+        </p:nvSpPr>
+        <p:spPr>
+          <a:xfrm rot="18944431">
+            <a:off x="5308168" y="1868254"/>
+            <a:ext cx="1168817" cy="1168817"/>
+          </a:xfrm>
+          <a:prstGeom prst="rect">
+            <a:avLst/>
+          </a:prstGeom>
+          <a:solidFill>
+            <a:schemeClr val="bg1"/>
+          </a:solidFill>
+        </p:spPr>
+        <p:style>
+          <a:lnRef idx="2">
+            <a:schemeClr val="accent1">
+              <a:shade val="15000"/>
+            </a:schemeClr>
+          </a:lnRef>
+          <a:fillRef idx="1">
+            <a:schemeClr val="accent1"/>
+          </a:fillRef>
+          <a:effectRef idx="0">
+            <a:schemeClr val="accent1"/>
+          </a:effectRef>
+          <a:fontRef idx="minor">
+            <a:schemeClr val="lt1"/>
+          </a:fontRef>
+        </p:style>
+        <p:txBody>
+          <a:bodyPr rtlCol="0" anchor="ctr"/>
+          <a:lstStyle/>
+          <a:p>
+            <a:pPr algn="ctr"/>
+            <a:endParaRPr lang="en-US"/>
+          </a:p>
+        </p:txBody>
+      </p:sp>
+      <p:sp>
+        <p:nvSpPr>
+          <p:cNvPr id="31" name="TextBox 30">
+            <a:extLst>
+              <a:ext uri="{FF2B5EF4-FFF2-40B4-BE49-F238E27FC236}">
+                <a16:creationId xmlns:a16="http://schemas.microsoft.com/office/drawing/2014/main" id="{B3288B1E-F6E5-1120-C76D-3E16011B2B07}"/>
+              </a:ext>
+            </a:extLst>
+          </p:cNvPr>
+          <p:cNvSpPr txBox="1"/>
+          <p:nvPr/>
+        </p:nvSpPr>
+        <p:spPr>
+          <a:xfrm>
+            <a:off x="5202682" y="2117803"/>
+            <a:ext cx="1460024" cy="830997"/>
+          </a:xfrm>
+          <a:prstGeom prst="rect">
+            <a:avLst/>
+          </a:prstGeom>
+          <a:noFill/>
+        </p:spPr>
+        <p:txBody>
+          <a:bodyPr wrap="square" rtlCol="0">
+            <a:spAutoFit/>
+          </a:bodyPr>
+          <a:lstStyle/>
+          <a:p>
+            <a:pPr algn="ctr"/>
+            <a:r>
+              <a:rPr lang="en-US" sz="1600" dirty="0"/>
+              <a:t>Do you have a configured JRE? </a:t>
+            </a:r>
+          </a:p>
+        </p:txBody>
+      </p:sp>
+      <p:cxnSp>
+        <p:nvCxnSpPr>
+          <p:cNvPr id="32" name="Straight Arrow Connector 31">
+            <a:extLst>
+              <a:ext uri="{FF2B5EF4-FFF2-40B4-BE49-F238E27FC236}">
+                <a16:creationId xmlns:a16="http://schemas.microsoft.com/office/drawing/2014/main" id="{140887D8-4944-6CFF-67D9-169B03257B49}"/>
+              </a:ext>
+            </a:extLst>
+          </p:cNvPr>
+          <p:cNvCxnSpPr>
+            <a:cxnSpLocks/>
+          </p:cNvCxnSpPr>
+          <p:nvPr/>
+        </p:nvCxnSpPr>
+        <p:spPr>
+          <a:xfrm>
+            <a:off x="5873721" y="3279072"/>
+            <a:ext cx="0" cy="728572"/>
+          </a:xfrm>
+          <a:prstGeom prst="straightConnector1">
+            <a:avLst/>
+          </a:prstGeom>
+          <a:ln>
+            <a:tailEnd type="triangle"/>
+          </a:ln>
+        </p:spPr>
+        <p:style>
+          <a:lnRef idx="2">
+            <a:schemeClr val="accent1"/>
+          </a:lnRef>
+          <a:fillRef idx="0">
+            <a:schemeClr val="accent1"/>
+          </a:fillRef>
+          <a:effectRef idx="1">
+            <a:schemeClr val="accent1"/>
+          </a:effectRef>
+          <a:fontRef idx="minor">
+            <a:schemeClr val="tx1"/>
+          </a:fontRef>
+        </p:style>
+      </p:cxnSp>
+      <p:cxnSp>
+        <p:nvCxnSpPr>
+          <p:cNvPr id="33" name="Straight Arrow Connector 32">
+            <a:extLst>
+              <a:ext uri="{FF2B5EF4-FFF2-40B4-BE49-F238E27FC236}">
+                <a16:creationId xmlns:a16="http://schemas.microsoft.com/office/drawing/2014/main" id="{F8749B16-B61B-4E64-C388-C6745372191B}"/>
+              </a:ext>
+            </a:extLst>
+          </p:cNvPr>
+          <p:cNvCxnSpPr>
+            <a:cxnSpLocks/>
+          </p:cNvCxnSpPr>
+          <p:nvPr/>
+        </p:nvCxnSpPr>
+        <p:spPr>
+          <a:xfrm>
+            <a:off x="6718986" y="2452663"/>
+            <a:ext cx="765076" cy="1"/>
+          </a:xfrm>
+          <a:prstGeom prst="straightConnector1">
+            <a:avLst/>
+          </a:prstGeom>
+          <a:ln>
+            <a:tailEnd type="triangle"/>
+          </a:ln>
+        </p:spPr>
+        <p:style>
+          <a:lnRef idx="2">
+            <a:schemeClr val="accent1"/>
+          </a:lnRef>
+          <a:fillRef idx="0">
+            <a:schemeClr val="accent1"/>
+          </a:fillRef>
+          <a:effectRef idx="1">
+            <a:schemeClr val="accent1"/>
+          </a:effectRef>
+          <a:fontRef idx="minor">
+            <a:schemeClr val="tx1"/>
+          </a:fontRef>
+        </p:style>
+      </p:cxnSp>
+      <p:sp>
+        <p:nvSpPr>
+          <p:cNvPr id="34" name="TextBox 33">
+            <a:extLst>
+              <a:ext uri="{FF2B5EF4-FFF2-40B4-BE49-F238E27FC236}">
+                <a16:creationId xmlns:a16="http://schemas.microsoft.com/office/drawing/2014/main" id="{39F66580-BC56-3A02-80AE-8B1AE2C40CAE}"/>
+              </a:ext>
+            </a:extLst>
+          </p:cNvPr>
+          <p:cNvSpPr txBox="1"/>
+          <p:nvPr/>
+        </p:nvSpPr>
+        <p:spPr>
+          <a:xfrm>
+            <a:off x="6653444" y="2148586"/>
+            <a:ext cx="780612" cy="369332"/>
+          </a:xfrm>
+          <a:prstGeom prst="rect">
+            <a:avLst/>
+          </a:prstGeom>
+          <a:noFill/>
+        </p:spPr>
+        <p:txBody>
+          <a:bodyPr wrap="square" rtlCol="0">
+            <a:spAutoFit/>
+          </a:bodyPr>
+          <a:lstStyle/>
+          <a:p>
+            <a:pPr algn="ctr"/>
+            <a:r>
+              <a:rPr lang="en-US" dirty="0"/>
+              <a:t>No</a:t>
+            </a:r>
+          </a:p>
+        </p:txBody>
+      </p:sp>
+      <p:sp>
+        <p:nvSpPr>
+          <p:cNvPr id="35" name="TextBox 34">
+            <a:extLst>
+              <a:ext uri="{FF2B5EF4-FFF2-40B4-BE49-F238E27FC236}">
+                <a16:creationId xmlns:a16="http://schemas.microsoft.com/office/drawing/2014/main" id="{2CBAD7E7-F6DA-1B90-9564-5AFC6D3F7CE4}"/>
+              </a:ext>
+            </a:extLst>
+          </p:cNvPr>
+          <p:cNvSpPr txBox="1"/>
+          <p:nvPr/>
+        </p:nvSpPr>
+        <p:spPr>
+          <a:xfrm rot="5400000">
+            <a:off x="5602559" y="3436105"/>
+            <a:ext cx="834663" cy="369332"/>
+          </a:xfrm>
+          <a:prstGeom prst="rect">
+            <a:avLst/>
+          </a:prstGeom>
+          <a:noFill/>
+        </p:spPr>
+        <p:txBody>
+          <a:bodyPr wrap="square" rtlCol="0">
+            <a:spAutoFit/>
+          </a:bodyPr>
+          <a:lstStyle/>
+          <a:p>
+            <a:pPr algn="ctr"/>
+            <a:r>
+              <a:rPr lang="en-US" dirty="0"/>
+              <a:t>Yes</a:t>
+            </a:r>
+          </a:p>
+        </p:txBody>
+      </p:sp>
+      <p:sp>
+        <p:nvSpPr>
+          <p:cNvPr id="36" name="Rectangle 35">
+            <a:extLst>
+              <a:ext uri="{FF2B5EF4-FFF2-40B4-BE49-F238E27FC236}">
+                <a16:creationId xmlns:a16="http://schemas.microsoft.com/office/drawing/2014/main" id="{60778220-247C-7082-FEE0-6291FD380D55}"/>
+              </a:ext>
+            </a:extLst>
+          </p:cNvPr>
+          <p:cNvSpPr>
+            <a:spLocks noChangeAspect="1"/>
+          </p:cNvSpPr>
+          <p:nvPr/>
+        </p:nvSpPr>
+        <p:spPr>
+          <a:xfrm rot="18944431">
+            <a:off x="7718133" y="1876845"/>
+            <a:ext cx="1168817" cy="1168817"/>
+          </a:xfrm>
+          <a:prstGeom prst="rect">
+            <a:avLst/>
+          </a:prstGeom>
+          <a:solidFill>
+            <a:schemeClr val="bg1"/>
+          </a:solidFill>
+        </p:spPr>
+        <p:style>
+          <a:lnRef idx="2">
+            <a:schemeClr val="accent1">
+              <a:shade val="15000"/>
+            </a:schemeClr>
+          </a:lnRef>
+          <a:fillRef idx="1">
+            <a:schemeClr val="accent1"/>
+          </a:fillRef>
+          <a:effectRef idx="0">
+            <a:schemeClr val="accent1"/>
+          </a:effectRef>
+          <a:fontRef idx="minor">
+            <a:schemeClr val="lt1"/>
+          </a:fontRef>
+        </p:style>
+        <p:txBody>
+          <a:bodyPr rtlCol="0" anchor="ctr"/>
+          <a:lstStyle/>
+          <a:p>
+            <a:pPr algn="ctr"/>
+            <a:endParaRPr lang="en-US"/>
+          </a:p>
+        </p:txBody>
+      </p:sp>
+      <p:sp>
+        <p:nvSpPr>
+          <p:cNvPr id="37" name="TextBox 36">
+            <a:extLst>
+              <a:ext uri="{FF2B5EF4-FFF2-40B4-BE49-F238E27FC236}">
+                <a16:creationId xmlns:a16="http://schemas.microsoft.com/office/drawing/2014/main" id="{025CB498-CB6A-4391-1DF5-E7133275309A}"/>
+              </a:ext>
+            </a:extLst>
+          </p:cNvPr>
+          <p:cNvSpPr txBox="1"/>
+          <p:nvPr/>
+        </p:nvSpPr>
+        <p:spPr>
+          <a:xfrm>
+            <a:off x="7628183" y="1974689"/>
+            <a:ext cx="1385220" cy="923330"/>
+          </a:xfrm>
+          <a:prstGeom prst="rect">
+            <a:avLst/>
+          </a:prstGeom>
+          <a:noFill/>
+        </p:spPr>
+        <p:txBody>
+          <a:bodyPr wrap="square" rtlCol="0">
+            <a:spAutoFit/>
+          </a:bodyPr>
+          <a:lstStyle/>
+          <a:p>
+            <a:pPr algn="ctr"/>
+            <a:r>
+              <a:rPr lang="en-US" dirty="0"/>
+              <a:t>Does it contain two columns?</a:t>
+            </a:r>
+          </a:p>
+        </p:txBody>
+      </p:sp>
+      <p:cxnSp>
+        <p:nvCxnSpPr>
+          <p:cNvPr id="38" name="Straight Arrow Connector 37">
+            <a:extLst>
+              <a:ext uri="{FF2B5EF4-FFF2-40B4-BE49-F238E27FC236}">
+                <a16:creationId xmlns:a16="http://schemas.microsoft.com/office/drawing/2014/main" id="{4230F2A4-E281-852F-67B2-81656F278150}"/>
+              </a:ext>
+            </a:extLst>
+          </p:cNvPr>
+          <p:cNvCxnSpPr>
+            <a:cxnSpLocks/>
+          </p:cNvCxnSpPr>
+          <p:nvPr/>
+        </p:nvCxnSpPr>
+        <p:spPr>
+          <a:xfrm>
+            <a:off x="8283686" y="3287663"/>
+            <a:ext cx="0" cy="728572"/>
+          </a:xfrm>
+          <a:prstGeom prst="straightConnector1">
+            <a:avLst/>
+          </a:prstGeom>
+          <a:ln>
+            <a:tailEnd type="triangle"/>
+          </a:ln>
+        </p:spPr>
+        <p:style>
+          <a:lnRef idx="2">
+            <a:schemeClr val="accent1"/>
+          </a:lnRef>
+          <a:fillRef idx="0">
+            <a:schemeClr val="accent1"/>
+          </a:fillRef>
+          <a:effectRef idx="1">
+            <a:schemeClr val="accent1"/>
+          </a:effectRef>
+          <a:fontRef idx="minor">
+            <a:schemeClr val="tx1"/>
+          </a:fontRef>
+        </p:style>
+      </p:cxnSp>
+      <p:cxnSp>
+        <p:nvCxnSpPr>
+          <p:cNvPr id="39" name="Straight Arrow Connector 38">
+            <a:extLst>
+              <a:ext uri="{FF2B5EF4-FFF2-40B4-BE49-F238E27FC236}">
+                <a16:creationId xmlns:a16="http://schemas.microsoft.com/office/drawing/2014/main" id="{1DF482AE-26D1-FF9A-11E0-60F636EF6DC1}"/>
+              </a:ext>
+            </a:extLst>
+          </p:cNvPr>
+          <p:cNvCxnSpPr>
+            <a:cxnSpLocks/>
+          </p:cNvCxnSpPr>
+          <p:nvPr/>
+        </p:nvCxnSpPr>
+        <p:spPr>
+          <a:xfrm>
+            <a:off x="9128951" y="2461254"/>
+            <a:ext cx="765076" cy="1"/>
+          </a:xfrm>
+          <a:prstGeom prst="straightConnector1">
+            <a:avLst/>
+          </a:prstGeom>
+          <a:ln>
+            <a:tailEnd type="triangle"/>
+          </a:ln>
+        </p:spPr>
+        <p:style>
+          <a:lnRef idx="2">
+            <a:schemeClr val="accent1"/>
+          </a:lnRef>
+          <a:fillRef idx="0">
+            <a:schemeClr val="accent1"/>
+          </a:fillRef>
+          <a:effectRef idx="1">
+            <a:schemeClr val="accent1"/>
+          </a:effectRef>
+          <a:fontRef idx="minor">
+            <a:schemeClr val="tx1"/>
+          </a:fontRef>
+        </p:style>
+      </p:cxnSp>
+      <p:sp>
+        <p:nvSpPr>
+          <p:cNvPr id="40" name="TextBox 39">
+            <a:extLst>
+              <a:ext uri="{FF2B5EF4-FFF2-40B4-BE49-F238E27FC236}">
+                <a16:creationId xmlns:a16="http://schemas.microsoft.com/office/drawing/2014/main" id="{C6ECBE1C-DCE3-83C1-3DC4-4229DDA5F219}"/>
+              </a:ext>
+            </a:extLst>
+          </p:cNvPr>
+          <p:cNvSpPr txBox="1"/>
+          <p:nvPr/>
+        </p:nvSpPr>
+        <p:spPr>
+          <a:xfrm>
+            <a:off x="9063409" y="2157177"/>
+            <a:ext cx="780612" cy="369332"/>
+          </a:xfrm>
+          <a:prstGeom prst="rect">
+            <a:avLst/>
+          </a:prstGeom>
+          <a:noFill/>
+        </p:spPr>
+        <p:txBody>
+          <a:bodyPr wrap="square" rtlCol="0">
+            <a:spAutoFit/>
+          </a:bodyPr>
+          <a:lstStyle/>
+          <a:p>
+            <a:pPr algn="ctr"/>
+            <a:r>
+              <a:rPr lang="en-US" dirty="0"/>
+              <a:t>Yes</a:t>
+            </a:r>
+          </a:p>
+        </p:txBody>
+      </p:sp>
+      <p:sp>
+        <p:nvSpPr>
+          <p:cNvPr id="41" name="TextBox 40">
+            <a:extLst>
+              <a:ext uri="{FF2B5EF4-FFF2-40B4-BE49-F238E27FC236}">
+                <a16:creationId xmlns:a16="http://schemas.microsoft.com/office/drawing/2014/main" id="{0C599B12-11DE-79FF-D92E-81442506B23C}"/>
+              </a:ext>
+            </a:extLst>
+          </p:cNvPr>
+          <p:cNvSpPr txBox="1"/>
+          <p:nvPr/>
+        </p:nvSpPr>
+        <p:spPr>
+          <a:xfrm rot="5400000">
+            <a:off x="8012524" y="3444696"/>
+            <a:ext cx="834663" cy="369332"/>
+          </a:xfrm>
+          <a:prstGeom prst="rect">
+            <a:avLst/>
+          </a:prstGeom>
+          <a:noFill/>
+        </p:spPr>
+        <p:txBody>
+          <a:bodyPr wrap="square" rtlCol="0">
+            <a:spAutoFit/>
+          </a:bodyPr>
+          <a:lstStyle/>
+          <a:p>
+            <a:pPr algn="ctr"/>
+            <a:r>
+              <a:rPr lang="en-US" dirty="0"/>
+              <a:t>No</a:t>
+            </a:r>
+          </a:p>
+        </p:txBody>
+      </p:sp>
+      <p:sp>
+        <p:nvSpPr>
+          <p:cNvPr id="42" name="Rectangle 41">
+            <a:extLst>
+              <a:ext uri="{FF2B5EF4-FFF2-40B4-BE49-F238E27FC236}">
+                <a16:creationId xmlns:a16="http://schemas.microsoft.com/office/drawing/2014/main" id="{DCD0EDC6-0B25-70AC-AB7F-F5B6110BB98D}"/>
+              </a:ext>
+            </a:extLst>
+          </p:cNvPr>
+          <p:cNvSpPr/>
+          <p:nvPr/>
+        </p:nvSpPr>
+        <p:spPr>
+          <a:xfrm>
+            <a:off x="9930507" y="1863304"/>
+            <a:ext cx="1600200" cy="1178716"/>
+          </a:xfrm>
+          <a:prstGeom prst="rect">
+            <a:avLst/>
+          </a:prstGeom>
+          <a:solidFill>
+            <a:schemeClr val="accent6"/>
+          </a:solidFill>
+        </p:spPr>
+        <p:style>
+          <a:lnRef idx="2">
+            <a:schemeClr val="accent1">
+              <a:shade val="15000"/>
+            </a:schemeClr>
+          </a:lnRef>
+          <a:fillRef idx="1">
+            <a:schemeClr val="accent1"/>
+          </a:fillRef>
+          <a:effectRef idx="0">
+            <a:schemeClr val="accent1"/>
+          </a:effectRef>
+          <a:fontRef idx="minor">
+            <a:schemeClr val="lt1"/>
+          </a:fontRef>
+        </p:style>
+        <p:txBody>
+          <a:bodyPr rtlCol="0" anchor="ctr"/>
+          <a:lstStyle/>
+          <a:p>
+            <a:pPr algn="ctr"/>
+            <a:endParaRPr lang="en-US"/>
+          </a:p>
+        </p:txBody>
+      </p:sp>
+      <p:sp>
+        <p:nvSpPr>
+          <p:cNvPr id="43" name="TextBox 42">
+            <a:extLst>
+              <a:ext uri="{FF2B5EF4-FFF2-40B4-BE49-F238E27FC236}">
+                <a16:creationId xmlns:a16="http://schemas.microsoft.com/office/drawing/2014/main" id="{DAFFB3EA-26A2-6C27-E8E4-DC2F55537F88}"/>
+              </a:ext>
+            </a:extLst>
+          </p:cNvPr>
+          <p:cNvSpPr txBox="1"/>
+          <p:nvPr/>
+        </p:nvSpPr>
+        <p:spPr>
+          <a:xfrm>
+            <a:off x="9988411" y="2061109"/>
+            <a:ext cx="1398664" cy="738664"/>
+          </a:xfrm>
+          <a:prstGeom prst="rect">
+            <a:avLst/>
+          </a:prstGeom>
+          <a:noFill/>
+        </p:spPr>
+        <p:txBody>
+          <a:bodyPr wrap="square" rtlCol="0">
+            <a:spAutoFit/>
+          </a:bodyPr>
+          <a:lstStyle/>
+          <a:p>
+            <a:r>
+              <a:rPr lang="en-US" sz="1400" dirty="0"/>
+              <a:t>Both options will run into the same issue</a:t>
+            </a:r>
+          </a:p>
+        </p:txBody>
+      </p:sp>
+      <p:sp>
+        <p:nvSpPr>
+          <p:cNvPr id="44" name="Rectangle 43">
+            <a:extLst>
+              <a:ext uri="{FF2B5EF4-FFF2-40B4-BE49-F238E27FC236}">
+                <a16:creationId xmlns:a16="http://schemas.microsoft.com/office/drawing/2014/main" id="{DDC8B154-82D2-2F36-3B51-CFBE93484E18}"/>
+              </a:ext>
+            </a:extLst>
+          </p:cNvPr>
+          <p:cNvSpPr/>
+          <p:nvPr/>
+        </p:nvSpPr>
+        <p:spPr>
+          <a:xfrm>
+            <a:off x="2698584" y="4113736"/>
+            <a:ext cx="1600200" cy="1178716"/>
+          </a:xfrm>
+          <a:prstGeom prst="rect">
+            <a:avLst/>
+          </a:prstGeom>
+          <a:solidFill>
+            <a:schemeClr val="accent6"/>
+          </a:solidFill>
+        </p:spPr>
+        <p:style>
+          <a:lnRef idx="2">
+            <a:schemeClr val="accent1">
+              <a:shade val="15000"/>
+            </a:schemeClr>
+          </a:lnRef>
+          <a:fillRef idx="1">
+            <a:schemeClr val="accent1"/>
+          </a:fillRef>
+          <a:effectRef idx="0">
+            <a:schemeClr val="accent1"/>
+          </a:effectRef>
+          <a:fontRef idx="minor">
+            <a:schemeClr val="lt1"/>
+          </a:fontRef>
+        </p:style>
+        <p:txBody>
+          <a:bodyPr rtlCol="0" anchor="ctr"/>
+          <a:lstStyle/>
+          <a:p>
+            <a:pPr algn="ctr"/>
+            <a:endParaRPr lang="en-US"/>
+          </a:p>
+        </p:txBody>
+      </p:sp>
+      <p:sp>
+        <p:nvSpPr>
+          <p:cNvPr id="45" name="TextBox 44">
+            <a:extLst>
+              <a:ext uri="{FF2B5EF4-FFF2-40B4-BE49-F238E27FC236}">
+                <a16:creationId xmlns:a16="http://schemas.microsoft.com/office/drawing/2014/main" id="{4F7D2A2D-58B7-7655-A85A-DA5AE55673CF}"/>
+              </a:ext>
+            </a:extLst>
+          </p:cNvPr>
+          <p:cNvSpPr txBox="1"/>
+          <p:nvPr/>
+        </p:nvSpPr>
+        <p:spPr>
+          <a:xfrm>
+            <a:off x="2771476" y="4480060"/>
+            <a:ext cx="1793148" cy="307777"/>
+          </a:xfrm>
+          <a:prstGeom prst="rect">
+            <a:avLst/>
+          </a:prstGeom>
+          <a:noFill/>
+        </p:spPr>
+        <p:txBody>
+          <a:bodyPr wrap="square" rtlCol="0">
+            <a:spAutoFit/>
+          </a:bodyPr>
+          <a:lstStyle/>
+          <a:p>
+            <a:pPr marL="342900" indent="-342900">
+              <a:buAutoNum type="arabicParenR"/>
+            </a:pPr>
+            <a:r>
+              <a:rPr lang="en-US" sz="1400" dirty="0"/>
+              <a:t>Tesseract</a:t>
+            </a:r>
+          </a:p>
+        </p:txBody>
+      </p:sp>
+      <p:sp>
+        <p:nvSpPr>
+          <p:cNvPr id="48" name="Rectangle 47">
+            <a:extLst>
+              <a:ext uri="{FF2B5EF4-FFF2-40B4-BE49-F238E27FC236}">
+                <a16:creationId xmlns:a16="http://schemas.microsoft.com/office/drawing/2014/main" id="{B0A6761E-2220-75C2-9F2A-CA1F6F315507}"/>
+              </a:ext>
+            </a:extLst>
+          </p:cNvPr>
+          <p:cNvSpPr/>
+          <p:nvPr/>
+        </p:nvSpPr>
+        <p:spPr>
+          <a:xfrm>
+            <a:off x="7520542" y="4122327"/>
+            <a:ext cx="1600200" cy="1178716"/>
+          </a:xfrm>
+          <a:prstGeom prst="rect">
+            <a:avLst/>
+          </a:prstGeom>
+          <a:solidFill>
+            <a:schemeClr val="accent6"/>
+          </a:solidFill>
+        </p:spPr>
+        <p:style>
+          <a:lnRef idx="2">
+            <a:schemeClr val="accent1">
+              <a:shade val="15000"/>
+            </a:schemeClr>
+          </a:lnRef>
+          <a:fillRef idx="1">
+            <a:schemeClr val="accent1"/>
+          </a:fillRef>
+          <a:effectRef idx="0">
+            <a:schemeClr val="accent1"/>
+          </a:effectRef>
+          <a:fontRef idx="minor">
+            <a:schemeClr val="lt1"/>
+          </a:fontRef>
+        </p:style>
+        <p:txBody>
+          <a:bodyPr rtlCol="0" anchor="ctr"/>
+          <a:lstStyle/>
+          <a:p>
+            <a:pPr algn="ctr"/>
+            <a:endParaRPr lang="en-US"/>
+          </a:p>
+        </p:txBody>
+      </p:sp>
+      <p:sp>
+        <p:nvSpPr>
+          <p:cNvPr id="49" name="TextBox 48">
+            <a:extLst>
+              <a:ext uri="{FF2B5EF4-FFF2-40B4-BE49-F238E27FC236}">
+                <a16:creationId xmlns:a16="http://schemas.microsoft.com/office/drawing/2014/main" id="{29019D50-DC22-9D05-175A-713B58D72DB4}"/>
+              </a:ext>
+            </a:extLst>
+          </p:cNvPr>
+          <p:cNvSpPr txBox="1"/>
+          <p:nvPr/>
+        </p:nvSpPr>
+        <p:spPr>
+          <a:xfrm>
+            <a:off x="7434056" y="4405337"/>
+            <a:ext cx="1793148" cy="307777"/>
+          </a:xfrm>
+          <a:prstGeom prst="rect">
+            <a:avLst/>
+          </a:prstGeom>
+          <a:noFill/>
+        </p:spPr>
+        <p:txBody>
+          <a:bodyPr wrap="square" rtlCol="0">
+            <a:spAutoFit/>
+          </a:bodyPr>
+          <a:lstStyle/>
+          <a:p>
+            <a:pPr marL="342900" indent="-342900">
+              <a:buAutoNum type="arabicParenR"/>
+            </a:pPr>
+            <a:r>
+              <a:rPr lang="en-US" sz="1400" dirty="0" err="1"/>
+              <a:t>pdfplumber</a:t>
+            </a:r>
+            <a:endParaRPr lang="en-US" sz="1400" dirty="0"/>
+          </a:p>
+        </p:txBody>
+      </p:sp>
+      <p:sp>
+        <p:nvSpPr>
+          <p:cNvPr id="50" name="Rectangle 49">
+            <a:extLst>
+              <a:ext uri="{FF2B5EF4-FFF2-40B4-BE49-F238E27FC236}">
+                <a16:creationId xmlns:a16="http://schemas.microsoft.com/office/drawing/2014/main" id="{FD22E7B1-6ABC-1AD7-FAC2-10A229A55D58}"/>
+              </a:ext>
+            </a:extLst>
+          </p:cNvPr>
+          <p:cNvSpPr/>
+          <p:nvPr/>
+        </p:nvSpPr>
+        <p:spPr>
+          <a:xfrm>
+            <a:off x="5066167" y="4109357"/>
+            <a:ext cx="1600200" cy="1178716"/>
+          </a:xfrm>
+          <a:prstGeom prst="rect">
+            <a:avLst/>
+          </a:prstGeom>
+          <a:solidFill>
+            <a:schemeClr val="accent6"/>
+          </a:solidFill>
+        </p:spPr>
+        <p:style>
+          <a:lnRef idx="2">
+            <a:schemeClr val="accent1">
+              <a:shade val="15000"/>
+            </a:schemeClr>
+          </a:lnRef>
+          <a:fillRef idx="1">
+            <a:schemeClr val="accent1"/>
+          </a:fillRef>
+          <a:effectRef idx="0">
+            <a:schemeClr val="accent1"/>
+          </a:effectRef>
+          <a:fontRef idx="minor">
+            <a:schemeClr val="lt1"/>
+          </a:fontRef>
+        </p:style>
+        <p:txBody>
+          <a:bodyPr rtlCol="0" anchor="ctr"/>
+          <a:lstStyle/>
+          <a:p>
+            <a:pPr algn="ctr"/>
+            <a:endParaRPr lang="en-US"/>
+          </a:p>
+        </p:txBody>
+      </p:sp>
+      <p:sp>
+        <p:nvSpPr>
+          <p:cNvPr id="51" name="TextBox 50">
+            <a:extLst>
+              <a:ext uri="{FF2B5EF4-FFF2-40B4-BE49-F238E27FC236}">
+                <a16:creationId xmlns:a16="http://schemas.microsoft.com/office/drawing/2014/main" id="{6AFA9E76-8C98-C192-5844-781754A7A139}"/>
+              </a:ext>
+            </a:extLst>
+          </p:cNvPr>
+          <p:cNvSpPr txBox="1"/>
+          <p:nvPr/>
+        </p:nvSpPr>
+        <p:spPr>
+          <a:xfrm>
+            <a:off x="4979681" y="4392367"/>
+            <a:ext cx="1793148" cy="307777"/>
+          </a:xfrm>
+          <a:prstGeom prst="rect">
+            <a:avLst/>
+          </a:prstGeom>
+          <a:noFill/>
+        </p:spPr>
+        <p:txBody>
+          <a:bodyPr wrap="square" rtlCol="0">
+            <a:spAutoFit/>
+          </a:bodyPr>
+          <a:lstStyle/>
+          <a:p>
+            <a:pPr marL="342900" indent="-342900">
+              <a:buAutoNum type="arabicParenR"/>
+            </a:pPr>
+            <a:r>
+              <a:rPr lang="en-US" sz="1400" dirty="0"/>
+              <a:t>Tabula</a:t>
+            </a:r>
+          </a:p>
+        </p:txBody>
+      </p:sp>
+      <p:sp>
+        <p:nvSpPr>
+          <p:cNvPr id="3" name="TextBox 2">
+            <a:extLst>
+              <a:ext uri="{FF2B5EF4-FFF2-40B4-BE49-F238E27FC236}">
+                <a16:creationId xmlns:a16="http://schemas.microsoft.com/office/drawing/2014/main" id="{FC224A32-ACFC-4D94-F3D0-15C02D6C99B7}"/>
+              </a:ext>
+            </a:extLst>
+          </p:cNvPr>
+          <p:cNvSpPr txBox="1"/>
+          <p:nvPr/>
+        </p:nvSpPr>
+        <p:spPr>
+          <a:xfrm>
+            <a:off x="650182" y="5430505"/>
+            <a:ext cx="10432170" cy="338554"/>
+          </a:xfrm>
+          <a:prstGeom prst="rect">
+            <a:avLst/>
+          </a:prstGeom>
+          <a:noFill/>
+        </p:spPr>
+        <p:txBody>
+          <a:bodyPr wrap="square" rtlCol="0">
+            <a:spAutoFit/>
+          </a:bodyPr>
+          <a:lstStyle/>
+          <a:p>
+            <a:pPr algn="ctr"/>
+            <a:r>
+              <a:rPr lang="en-US" sz="1600" dirty="0"/>
+              <a:t>- Tabula is the best option I have found for most of my use cases. </a:t>
+            </a:r>
+          </a:p>
+        </p:txBody>
+      </p:sp>
+    </p:spTree>
+    <p:extLst>
+      <p:ext uri="{BB962C8B-B14F-4D97-AF65-F5344CB8AC3E}">
+        <p14:creationId xmlns:p14="http://schemas.microsoft.com/office/powerpoint/2010/main" val="1834091052"/>
       </p:ext>
     </p:extLst>
   </p:cSld>

</xml_diff>